<commit_message>
updated template to be modified
</commit_message>
<xml_diff>
--- a/Validate_template.pptx
+++ b/Validate_template.pptx
@@ -1,6 +1,6 @@
 
 <file path=ppt/presentation.xml><?xml version="1.0" encoding="utf-8"?>
-<p:presentation xmlns:a="http://schemas.openxmlformats.org/drawingml/2006/main" xmlns:r="http://schemas.openxmlformats.org/officeDocument/2006/relationships" xmlns:p="http://schemas.openxmlformats.org/presentationml/2006/main" saveSubsetFonts="1">
+<p:presentation xmlns:a="http://schemas.openxmlformats.org/drawingml/2006/main" xmlns:r="http://schemas.openxmlformats.org/officeDocument/2006/relationships" xmlns:p="http://schemas.openxmlformats.org/presentationml/2006/main" saveSubsetFonts="1" autoCompressPictures="0">
   <p:sldMasterIdLst>
     <p:sldMasterId id="2147483648" r:id="rId1"/>
   </p:sldMasterIdLst>
@@ -16,7 +16,7 @@
     <a:defPPr>
       <a:defRPr lang="en-US"/>
     </a:defPPr>
-    <a:lvl1pPr marL="0" algn="l" defTabSz="914400" rtl="0" eaLnBrk="1" latinLnBrk="0" hangingPunct="1">
+    <a:lvl1pPr marL="0" algn="l" defTabSz="457200" rtl="0" eaLnBrk="1" latinLnBrk="0" hangingPunct="1">
       <a:defRPr sz="1800" kern="1200">
         <a:solidFill>
           <a:schemeClr val="tx1"/>
@@ -26,7 +26,7 @@
         <a:cs typeface="+mn-cs"/>
       </a:defRPr>
     </a:lvl1pPr>
-    <a:lvl2pPr marL="457200" algn="l" defTabSz="914400" rtl="0" eaLnBrk="1" latinLnBrk="0" hangingPunct="1">
+    <a:lvl2pPr marL="457200" algn="l" defTabSz="457200" rtl="0" eaLnBrk="1" latinLnBrk="0" hangingPunct="1">
       <a:defRPr sz="1800" kern="1200">
         <a:solidFill>
           <a:schemeClr val="tx1"/>
@@ -36,7 +36,7 @@
         <a:cs typeface="+mn-cs"/>
       </a:defRPr>
     </a:lvl2pPr>
-    <a:lvl3pPr marL="914400" algn="l" defTabSz="914400" rtl="0" eaLnBrk="1" latinLnBrk="0" hangingPunct="1">
+    <a:lvl3pPr marL="914400" algn="l" defTabSz="457200" rtl="0" eaLnBrk="1" latinLnBrk="0" hangingPunct="1">
       <a:defRPr sz="1800" kern="1200">
         <a:solidFill>
           <a:schemeClr val="tx1"/>
@@ -46,7 +46,7 @@
         <a:cs typeface="+mn-cs"/>
       </a:defRPr>
     </a:lvl3pPr>
-    <a:lvl4pPr marL="1371600" algn="l" defTabSz="914400" rtl="0" eaLnBrk="1" latinLnBrk="0" hangingPunct="1">
+    <a:lvl4pPr marL="1371600" algn="l" defTabSz="457200" rtl="0" eaLnBrk="1" latinLnBrk="0" hangingPunct="1">
       <a:defRPr sz="1800" kern="1200">
         <a:solidFill>
           <a:schemeClr val="tx1"/>
@@ -56,7 +56,7 @@
         <a:cs typeface="+mn-cs"/>
       </a:defRPr>
     </a:lvl4pPr>
-    <a:lvl5pPr marL="1828800" algn="l" defTabSz="914400" rtl="0" eaLnBrk="1" latinLnBrk="0" hangingPunct="1">
+    <a:lvl5pPr marL="1828800" algn="l" defTabSz="457200" rtl="0" eaLnBrk="1" latinLnBrk="0" hangingPunct="1">
       <a:defRPr sz="1800" kern="1200">
         <a:solidFill>
           <a:schemeClr val="tx1"/>
@@ -66,7 +66,7 @@
         <a:cs typeface="+mn-cs"/>
       </a:defRPr>
     </a:lvl5pPr>
-    <a:lvl6pPr marL="2286000" algn="l" defTabSz="914400" rtl="0" eaLnBrk="1" latinLnBrk="0" hangingPunct="1">
+    <a:lvl6pPr marL="2286000" algn="l" defTabSz="457200" rtl="0" eaLnBrk="1" latinLnBrk="0" hangingPunct="1">
       <a:defRPr sz="1800" kern="1200">
         <a:solidFill>
           <a:schemeClr val="tx1"/>
@@ -76,7 +76,7 @@
         <a:cs typeface="+mn-cs"/>
       </a:defRPr>
     </a:lvl6pPr>
-    <a:lvl7pPr marL="2743200" algn="l" defTabSz="914400" rtl="0" eaLnBrk="1" latinLnBrk="0" hangingPunct="1">
+    <a:lvl7pPr marL="2743200" algn="l" defTabSz="457200" rtl="0" eaLnBrk="1" latinLnBrk="0" hangingPunct="1">
       <a:defRPr sz="1800" kern="1200">
         <a:solidFill>
           <a:schemeClr val="tx1"/>
@@ -86,7 +86,7 @@
         <a:cs typeface="+mn-cs"/>
       </a:defRPr>
     </a:lvl7pPr>
-    <a:lvl8pPr marL="3200400" algn="l" defTabSz="914400" rtl="0" eaLnBrk="1" latinLnBrk="0" hangingPunct="1">
+    <a:lvl8pPr marL="3200400" algn="l" defTabSz="457200" rtl="0" eaLnBrk="1" latinLnBrk="0" hangingPunct="1">
       <a:defRPr sz="1800" kern="1200">
         <a:solidFill>
           <a:schemeClr val="tx1"/>
@@ -96,7 +96,7 @@
         <a:cs typeface="+mn-cs"/>
       </a:defRPr>
     </a:lvl8pPr>
-    <a:lvl9pPr marL="3657600" algn="l" defTabSz="914400" rtl="0" eaLnBrk="1" latinLnBrk="0" hangingPunct="1">
+    <a:lvl9pPr marL="3657600" algn="l" defTabSz="457200" rtl="0" eaLnBrk="1" latinLnBrk="0" hangingPunct="1">
       <a:defRPr sz="1800" kern="1200">
         <a:solidFill>
           <a:schemeClr val="tx1"/>
@@ -109,14 +109,25 @@
   </p:defaultTextStyle>
   <p:extLst>
     <p:ext uri="{EFAFB233-063F-42B5-8137-9DF3F51BA10A}">
-      <p15:sldGuideLst xmlns:p15="http://schemas.microsoft.com/office/powerpoint/2012/main"/>
+      <p15:sldGuideLst xmlns:p15="http://schemas.microsoft.com/office/powerpoint/2012/main">
+        <p15:guide id="1" orient="horz" pos="2160" userDrawn="1">
+          <p15:clr>
+            <a:srgbClr val="A4A3A4"/>
+          </p15:clr>
+        </p15:guide>
+        <p15:guide id="2" pos="3840" userDrawn="1">
+          <p15:clr>
+            <a:srgbClr val="A4A3A4"/>
+          </p15:clr>
+        </p15:guide>
+      </p15:sldGuideLst>
     </p:ext>
   </p:extLst>
 </p:presentation>
 </file>
 
 <file path=ppt/slideLayouts/slideLayout1.xml><?xml version="1.0" encoding="utf-8"?>
-<p:sldLayout xmlns:a="http://schemas.openxmlformats.org/drawingml/2006/main" xmlns:r="http://schemas.openxmlformats.org/officeDocument/2006/relationships" xmlns:p="http://schemas.openxmlformats.org/presentationml/2006/main" showMasterSp="0" type="title" preserve="1">
+<p:sldLayout xmlns:a="http://schemas.openxmlformats.org/drawingml/2006/main" xmlns:r="http://schemas.openxmlformats.org/officeDocument/2006/relationships" xmlns:p="http://schemas.openxmlformats.org/presentationml/2006/main" showMasterSp="0" preserve="1" userDrawn="1">
   <p:cSld name="Title Slide">
     <p:spTree>
       <p:nvGrpSpPr>
@@ -134,49 +145,364 @@
       </p:grpSpPr>
       <p:sp>
         <p:nvSpPr>
-          <p:cNvPr id="2" name="Title 1">
+          <p:cNvPr id="15" name="Date Placeholder 3">
             <a:extLst>
               <a:ext uri="{FF2B5EF4-FFF2-40B4-BE49-F238E27FC236}">
-                <a16:creationId xmlns:a16="http://schemas.microsoft.com/office/drawing/2014/main" id="{5EE2210C-D8FC-4318-A7C6-35D841DBCB2E}"/>
+                <a16:creationId xmlns:a16="http://schemas.microsoft.com/office/drawing/2014/main" id="{B877A74C-1024-4697-82A9-518471D90BF2}"/>
               </a:ext>
             </a:extLst>
           </p:cNvPr>
-          <p:cNvSpPr>
-            <a:spLocks noGrp="1"/>
+          <p:cNvSpPr txBox="1">
+            <a:spLocks/>
           </p:cNvSpPr>
-          <p:nvPr>
-            <p:ph type="ctrTitle"/>
-          </p:nvPr>
+          <p:nvPr userDrawn="1"/>
         </p:nvSpPr>
         <p:spPr>
           <a:xfrm>
-            <a:off x="676102" y="2169621"/>
-            <a:ext cx="5940829" cy="1356967"/>
+            <a:off x="838200" y="6356350"/>
+            <a:ext cx="2743200" cy="365125"/>
           </a:xfrm>
+          <a:prstGeom prst="rect">
+            <a:avLst/>
+          </a:prstGeom>
         </p:spPr>
         <p:txBody>
-          <a:bodyPr anchor="b">
-            <a:noAutofit/>
-          </a:bodyPr>
+          <a:bodyPr vert="horz" lIns="91440" tIns="45720" rIns="91440" bIns="45720" rtlCol="0" anchor="ctr"/>
           <a:lstStyle>
-            <a:lvl1pPr algn="l">
-              <a:defRPr sz="3200"/>
+            <a:defPPr>
+              <a:defRPr lang="en-US"/>
+            </a:defPPr>
+            <a:lvl1pPr marL="0" algn="l" defTabSz="914400" rtl="0" eaLnBrk="1" latinLnBrk="0" hangingPunct="1">
+              <a:defRPr sz="1200" kern="1200">
+                <a:solidFill>
+                  <a:schemeClr val="tx1">
+                    <a:tint val="75000"/>
+                  </a:schemeClr>
+                </a:solidFill>
+                <a:latin typeface="+mn-lt"/>
+                <a:ea typeface="+mn-ea"/>
+                <a:cs typeface="+mn-cs"/>
+              </a:defRPr>
             </a:lvl1pPr>
+            <a:lvl2pPr marL="457200" algn="l" defTabSz="914400" rtl="0" eaLnBrk="1" latinLnBrk="0" hangingPunct="1">
+              <a:defRPr sz="1800" kern="1200">
+                <a:solidFill>
+                  <a:schemeClr val="tx1"/>
+                </a:solidFill>
+                <a:latin typeface="+mn-lt"/>
+                <a:ea typeface="+mn-ea"/>
+                <a:cs typeface="+mn-cs"/>
+              </a:defRPr>
+            </a:lvl2pPr>
+            <a:lvl3pPr marL="914400" algn="l" defTabSz="914400" rtl="0" eaLnBrk="1" latinLnBrk="0" hangingPunct="1">
+              <a:defRPr sz="1800" kern="1200">
+                <a:solidFill>
+                  <a:schemeClr val="tx1"/>
+                </a:solidFill>
+                <a:latin typeface="+mn-lt"/>
+                <a:ea typeface="+mn-ea"/>
+                <a:cs typeface="+mn-cs"/>
+              </a:defRPr>
+            </a:lvl3pPr>
+            <a:lvl4pPr marL="1371600" algn="l" defTabSz="914400" rtl="0" eaLnBrk="1" latinLnBrk="0" hangingPunct="1">
+              <a:defRPr sz="1800" kern="1200">
+                <a:solidFill>
+                  <a:schemeClr val="tx1"/>
+                </a:solidFill>
+                <a:latin typeface="+mn-lt"/>
+                <a:ea typeface="+mn-ea"/>
+                <a:cs typeface="+mn-cs"/>
+              </a:defRPr>
+            </a:lvl4pPr>
+            <a:lvl5pPr marL="1828800" algn="l" defTabSz="914400" rtl="0" eaLnBrk="1" latinLnBrk="0" hangingPunct="1">
+              <a:defRPr sz="1800" kern="1200">
+                <a:solidFill>
+                  <a:schemeClr val="tx1"/>
+                </a:solidFill>
+                <a:latin typeface="+mn-lt"/>
+                <a:ea typeface="+mn-ea"/>
+                <a:cs typeface="+mn-cs"/>
+              </a:defRPr>
+            </a:lvl5pPr>
+            <a:lvl6pPr marL="2286000" algn="l" defTabSz="914400" rtl="0" eaLnBrk="1" latinLnBrk="0" hangingPunct="1">
+              <a:defRPr sz="1800" kern="1200">
+                <a:solidFill>
+                  <a:schemeClr val="tx1"/>
+                </a:solidFill>
+                <a:latin typeface="+mn-lt"/>
+                <a:ea typeface="+mn-ea"/>
+                <a:cs typeface="+mn-cs"/>
+              </a:defRPr>
+            </a:lvl6pPr>
+            <a:lvl7pPr marL="2743200" algn="l" defTabSz="914400" rtl="0" eaLnBrk="1" latinLnBrk="0" hangingPunct="1">
+              <a:defRPr sz="1800" kern="1200">
+                <a:solidFill>
+                  <a:schemeClr val="tx1"/>
+                </a:solidFill>
+                <a:latin typeface="+mn-lt"/>
+                <a:ea typeface="+mn-ea"/>
+                <a:cs typeface="+mn-cs"/>
+              </a:defRPr>
+            </a:lvl7pPr>
+            <a:lvl8pPr marL="3200400" algn="l" defTabSz="914400" rtl="0" eaLnBrk="1" latinLnBrk="0" hangingPunct="1">
+              <a:defRPr sz="1800" kern="1200">
+                <a:solidFill>
+                  <a:schemeClr val="tx1"/>
+                </a:solidFill>
+                <a:latin typeface="+mn-lt"/>
+                <a:ea typeface="+mn-ea"/>
+                <a:cs typeface="+mn-cs"/>
+              </a:defRPr>
+            </a:lvl8pPr>
+            <a:lvl9pPr marL="3657600" algn="l" defTabSz="914400" rtl="0" eaLnBrk="1" latinLnBrk="0" hangingPunct="1">
+              <a:defRPr sz="1800" kern="1200">
+                <a:solidFill>
+                  <a:schemeClr val="tx1"/>
+                </a:solidFill>
+                <a:latin typeface="+mn-lt"/>
+                <a:ea typeface="+mn-ea"/>
+                <a:cs typeface="+mn-cs"/>
+              </a:defRPr>
+            </a:lvl9pPr>
           </a:lstStyle>
           <a:p>
-            <a:r>
-              <a:rPr lang="en-US" dirty="0"/>
-              <a:t>Click to edit Master title style</a:t>
-            </a:r>
+            <a:pPr marL="0" marR="0" lvl="0" indent="0" algn="l" defTabSz="914400" rtl="0" eaLnBrk="1" fontAlgn="auto" latinLnBrk="0" hangingPunct="1">
+              <a:lnSpc>
+                <a:spcPct val="100000"/>
+              </a:lnSpc>
+              <a:spcBef>
+                <a:spcPts val="0"/>
+              </a:spcBef>
+              <a:spcAft>
+                <a:spcPts val="0"/>
+              </a:spcAft>
+              <a:buClrTx/>
+              <a:buSzTx/>
+              <a:buFontTx/>
+              <a:buNone/>
+              <a:tabLst/>
+              <a:defRPr/>
+            </a:pPr>
+            <a:fld id="{4036D906-24D5-4DAF-BF6E-4E33F265CDAD}" type="datetimeFigureOut">
+              <a:rPr kumimoji="0" lang="en-US" sz="1200" b="0" i="0" u="none" strike="noStrike" kern="1200" cap="none" spc="0" normalizeH="0" baseline="0" noProof="0" smtClean="0">
+                <a:ln>
+                  <a:noFill/>
+                </a:ln>
+                <a:solidFill>
+                  <a:srgbClr val="000000">
+                    <a:tint val="75000"/>
+                  </a:srgbClr>
+                </a:solidFill>
+                <a:effectLst/>
+                <a:uLnTx/>
+                <a:uFillTx/>
+                <a:latin typeface="Calibri" panose="020F0502020204030204"/>
+                <a:ea typeface="+mn-ea"/>
+                <a:cs typeface="+mn-cs"/>
+              </a:rPr>
+              <a:pPr marL="0" marR="0" lvl="0" indent="0" algn="l" defTabSz="914400" rtl="0" eaLnBrk="1" fontAlgn="auto" latinLnBrk="0" hangingPunct="1">
+                <a:lnSpc>
+                  <a:spcPct val="100000"/>
+                </a:lnSpc>
+                <a:spcBef>
+                  <a:spcPts val="0"/>
+                </a:spcBef>
+                <a:spcAft>
+                  <a:spcPts val="0"/>
+                </a:spcAft>
+                <a:buClrTx/>
+                <a:buSzTx/>
+                <a:buFontTx/>
+                <a:buNone/>
+                <a:tabLst/>
+                <a:defRPr/>
+              </a:pPr>
+              <a:t>4/17/2020</a:t>
+            </a:fld>
+            <a:endParaRPr kumimoji="0" lang="en-US" sz="1200" b="0" i="0" u="none" strike="noStrike" kern="1200" cap="none" spc="0" normalizeH="0" baseline="0" noProof="0">
+              <a:ln>
+                <a:noFill/>
+              </a:ln>
+              <a:solidFill>
+                <a:srgbClr val="000000">
+                  <a:tint val="75000"/>
+                </a:srgbClr>
+              </a:solidFill>
+              <a:effectLst/>
+              <a:uLnTx/>
+              <a:uFillTx/>
+              <a:latin typeface="Calibri" panose="020F0502020204030204"/>
+              <a:ea typeface="+mn-ea"/>
+              <a:cs typeface="+mn-cs"/>
+            </a:endParaRPr>
           </a:p>
         </p:txBody>
       </p:sp>
       <p:sp>
         <p:nvSpPr>
-          <p:cNvPr id="3" name="Subtitle 2">
+          <p:cNvPr id="16" name="Footer Placeholder 4">
             <a:extLst>
               <a:ext uri="{FF2B5EF4-FFF2-40B4-BE49-F238E27FC236}">
-                <a16:creationId xmlns:a16="http://schemas.microsoft.com/office/drawing/2014/main" id="{6AEF19E3-1CA0-4568-A1B4-1669B8BDE0D0}"/>
+                <a16:creationId xmlns:a16="http://schemas.microsoft.com/office/drawing/2014/main" id="{F1C1021A-BD55-4A7B-BB7D-B402692E598E}"/>
+              </a:ext>
+            </a:extLst>
+          </p:cNvPr>
+          <p:cNvSpPr txBox="1">
+            <a:spLocks/>
+          </p:cNvSpPr>
+          <p:nvPr userDrawn="1"/>
+        </p:nvSpPr>
+        <p:spPr>
+          <a:xfrm>
+            <a:off x="4038600" y="6356350"/>
+            <a:ext cx="4114800" cy="365125"/>
+          </a:xfrm>
+          <a:prstGeom prst="rect">
+            <a:avLst/>
+          </a:prstGeom>
+        </p:spPr>
+        <p:txBody>
+          <a:bodyPr vert="horz" lIns="91440" tIns="45720" rIns="91440" bIns="45720" rtlCol="0" anchor="ctr"/>
+          <a:lstStyle>
+            <a:defPPr>
+              <a:defRPr lang="en-US"/>
+            </a:defPPr>
+            <a:lvl1pPr marL="0" algn="ctr" defTabSz="914400" rtl="0" eaLnBrk="1" latinLnBrk="0" hangingPunct="1">
+              <a:defRPr sz="1200" kern="1200">
+                <a:solidFill>
+                  <a:schemeClr val="tx1">
+                    <a:tint val="75000"/>
+                  </a:schemeClr>
+                </a:solidFill>
+                <a:latin typeface="+mn-lt"/>
+                <a:ea typeface="+mn-ea"/>
+                <a:cs typeface="+mn-cs"/>
+              </a:defRPr>
+            </a:lvl1pPr>
+            <a:lvl2pPr marL="457200" algn="l" defTabSz="914400" rtl="0" eaLnBrk="1" latinLnBrk="0" hangingPunct="1">
+              <a:defRPr sz="1800" kern="1200">
+                <a:solidFill>
+                  <a:schemeClr val="tx1"/>
+                </a:solidFill>
+                <a:latin typeface="+mn-lt"/>
+                <a:ea typeface="+mn-ea"/>
+                <a:cs typeface="+mn-cs"/>
+              </a:defRPr>
+            </a:lvl2pPr>
+            <a:lvl3pPr marL="914400" algn="l" defTabSz="914400" rtl="0" eaLnBrk="1" latinLnBrk="0" hangingPunct="1">
+              <a:defRPr sz="1800" kern="1200">
+                <a:solidFill>
+                  <a:schemeClr val="tx1"/>
+                </a:solidFill>
+                <a:latin typeface="+mn-lt"/>
+                <a:ea typeface="+mn-ea"/>
+                <a:cs typeface="+mn-cs"/>
+              </a:defRPr>
+            </a:lvl3pPr>
+            <a:lvl4pPr marL="1371600" algn="l" defTabSz="914400" rtl="0" eaLnBrk="1" latinLnBrk="0" hangingPunct="1">
+              <a:defRPr sz="1800" kern="1200">
+                <a:solidFill>
+                  <a:schemeClr val="tx1"/>
+                </a:solidFill>
+                <a:latin typeface="+mn-lt"/>
+                <a:ea typeface="+mn-ea"/>
+                <a:cs typeface="+mn-cs"/>
+              </a:defRPr>
+            </a:lvl4pPr>
+            <a:lvl5pPr marL="1828800" algn="l" defTabSz="914400" rtl="0" eaLnBrk="1" latinLnBrk="0" hangingPunct="1">
+              <a:defRPr sz="1800" kern="1200">
+                <a:solidFill>
+                  <a:schemeClr val="tx1"/>
+                </a:solidFill>
+                <a:latin typeface="+mn-lt"/>
+                <a:ea typeface="+mn-ea"/>
+                <a:cs typeface="+mn-cs"/>
+              </a:defRPr>
+            </a:lvl5pPr>
+            <a:lvl6pPr marL="2286000" algn="l" defTabSz="914400" rtl="0" eaLnBrk="1" latinLnBrk="0" hangingPunct="1">
+              <a:defRPr sz="1800" kern="1200">
+                <a:solidFill>
+                  <a:schemeClr val="tx1"/>
+                </a:solidFill>
+                <a:latin typeface="+mn-lt"/>
+                <a:ea typeface="+mn-ea"/>
+                <a:cs typeface="+mn-cs"/>
+              </a:defRPr>
+            </a:lvl6pPr>
+            <a:lvl7pPr marL="2743200" algn="l" defTabSz="914400" rtl="0" eaLnBrk="1" latinLnBrk="0" hangingPunct="1">
+              <a:defRPr sz="1800" kern="1200">
+                <a:solidFill>
+                  <a:schemeClr val="tx1"/>
+                </a:solidFill>
+                <a:latin typeface="+mn-lt"/>
+                <a:ea typeface="+mn-ea"/>
+                <a:cs typeface="+mn-cs"/>
+              </a:defRPr>
+            </a:lvl7pPr>
+            <a:lvl8pPr marL="3200400" algn="l" defTabSz="914400" rtl="0" eaLnBrk="1" latinLnBrk="0" hangingPunct="1">
+              <a:defRPr sz="1800" kern="1200">
+                <a:solidFill>
+                  <a:schemeClr val="tx1"/>
+                </a:solidFill>
+                <a:latin typeface="+mn-lt"/>
+                <a:ea typeface="+mn-ea"/>
+                <a:cs typeface="+mn-cs"/>
+              </a:defRPr>
+            </a:lvl8pPr>
+            <a:lvl9pPr marL="3657600" algn="l" defTabSz="914400" rtl="0" eaLnBrk="1" latinLnBrk="0" hangingPunct="1">
+              <a:defRPr sz="1800" kern="1200">
+                <a:solidFill>
+                  <a:schemeClr val="tx1"/>
+                </a:solidFill>
+                <a:latin typeface="+mn-lt"/>
+                <a:ea typeface="+mn-ea"/>
+                <a:cs typeface="+mn-cs"/>
+              </a:defRPr>
+            </a:lvl9pPr>
+          </a:lstStyle>
+          <a:p>
+            <a:pPr marL="0" marR="0" lvl="0" indent="0" algn="ctr" defTabSz="914400" rtl="0" eaLnBrk="1" fontAlgn="auto" latinLnBrk="0" hangingPunct="1">
+              <a:lnSpc>
+                <a:spcPct val="100000"/>
+              </a:lnSpc>
+              <a:spcBef>
+                <a:spcPts val="0"/>
+              </a:spcBef>
+              <a:spcAft>
+                <a:spcPts val="0"/>
+              </a:spcAft>
+              <a:buClrTx/>
+              <a:buSzTx/>
+              <a:buFontTx/>
+              <a:buNone/>
+              <a:tabLst/>
+              <a:defRPr/>
+            </a:pPr>
+            <a:endParaRPr kumimoji="0" lang="en-US" sz="1200" b="0" i="0" u="none" strike="noStrike" kern="1200" cap="none" spc="0" normalizeH="0" baseline="0" noProof="0">
+              <a:ln>
+                <a:noFill/>
+              </a:ln>
+              <a:solidFill>
+                <a:srgbClr val="000000">
+                  <a:tint val="75000"/>
+                </a:srgbClr>
+              </a:solidFill>
+              <a:effectLst/>
+              <a:uLnTx/>
+              <a:uFillTx/>
+              <a:latin typeface="Calibri" panose="020F0502020204030204"/>
+              <a:ea typeface="+mn-ea"/>
+              <a:cs typeface="+mn-cs"/>
+            </a:endParaRPr>
+          </a:p>
+        </p:txBody>
+      </p:sp>
+      <p:sp>
+        <p:nvSpPr>
+          <p:cNvPr id="9" name="Subtitle 2">
+            <a:extLst>
+              <a:ext uri="{FF2B5EF4-FFF2-40B4-BE49-F238E27FC236}">
+                <a16:creationId xmlns:a16="http://schemas.microsoft.com/office/drawing/2014/main" id="{3D17F202-16EF-4F58-9581-D0DAAE11F7A7}"/>
               </a:ext>
             </a:extLst>
           </p:cNvPr>
@@ -189,20 +515,19 @@
         </p:nvSpPr>
         <p:spPr>
           <a:xfrm>
-            <a:off x="676102" y="3635289"/>
-            <a:ext cx="5940829" cy="1655762"/>
+            <a:off x="533400" y="3602038"/>
+            <a:ext cx="8610600" cy="1655762"/>
           </a:xfrm>
+          <a:prstGeom prst="rect">
+            <a:avLst/>
+          </a:prstGeom>
         </p:spPr>
         <p:txBody>
           <a:bodyPr/>
           <a:lstStyle>
             <a:lvl1pPr marL="0" indent="0" algn="l">
               <a:buNone/>
-              <a:defRPr sz="2400" b="1">
-                <a:solidFill>
-                  <a:schemeClr val="accent1"/>
-                </a:solidFill>
-              </a:defRPr>
+              <a:defRPr sz="2400"/>
             </a:lvl1pPr>
             <a:lvl2pPr marL="457200" indent="0" algn="ctr">
               <a:buNone/>
@@ -239,101 +564,18 @@
           </a:lstStyle>
           <a:p>
             <a:r>
-              <a:rPr lang="en-US" dirty="0"/>
+              <a:rPr lang="en-US"/>
               <a:t>Click to edit Master subtitle style</a:t>
             </a:r>
-          </a:p>
-        </p:txBody>
-      </p:sp>
-      <p:sp>
-        <p:nvSpPr>
-          <p:cNvPr id="4" name="Date Placeholder 3">
-            <a:extLst>
-              <a:ext uri="{FF2B5EF4-FFF2-40B4-BE49-F238E27FC236}">
-                <a16:creationId xmlns:a16="http://schemas.microsoft.com/office/drawing/2014/main" id="{E8D417D1-5547-46FB-9130-34B5F691BB50}"/>
-              </a:ext>
-            </a:extLst>
-          </p:cNvPr>
-          <p:cNvSpPr>
-            <a:spLocks noGrp="1"/>
-          </p:cNvSpPr>
-          <p:nvPr>
-            <p:ph type="dt" sz="half" idx="10"/>
-          </p:nvPr>
-        </p:nvSpPr>
-        <p:spPr/>
-        <p:txBody>
-          <a:bodyPr/>
-          <a:lstStyle/>
-          <a:p>
-            <a:fld id="{4036D906-24D5-4DAF-BF6E-4E33F265CDAD}" type="datetimeFigureOut">
-              <a:rPr lang="en-US" smtClean="0"/>
-              <a:t>4/15/2020</a:t>
-            </a:fld>
-            <a:endParaRPr lang="en-US"/>
-          </a:p>
-        </p:txBody>
-      </p:sp>
-      <p:sp>
-        <p:nvSpPr>
-          <p:cNvPr id="5" name="Footer Placeholder 4">
-            <a:extLst>
-              <a:ext uri="{FF2B5EF4-FFF2-40B4-BE49-F238E27FC236}">
-                <a16:creationId xmlns:a16="http://schemas.microsoft.com/office/drawing/2014/main" id="{FF94D942-2693-4F1E-91E2-49E042515CA1}"/>
-              </a:ext>
-            </a:extLst>
-          </p:cNvPr>
-          <p:cNvSpPr>
-            <a:spLocks noGrp="1"/>
-          </p:cNvSpPr>
-          <p:nvPr>
-            <p:ph type="ftr" sz="quarter" idx="11"/>
-          </p:nvPr>
-        </p:nvSpPr>
-        <p:spPr/>
-        <p:txBody>
-          <a:bodyPr/>
-          <a:lstStyle/>
-          <a:p>
-            <a:endParaRPr lang="en-US"/>
-          </a:p>
-        </p:txBody>
-      </p:sp>
-      <p:sp>
-        <p:nvSpPr>
-          <p:cNvPr id="6" name="Slide Number Placeholder 5">
-            <a:extLst>
-              <a:ext uri="{FF2B5EF4-FFF2-40B4-BE49-F238E27FC236}">
-                <a16:creationId xmlns:a16="http://schemas.microsoft.com/office/drawing/2014/main" id="{2583BBB1-A889-4267-A89A-90339E707269}"/>
-              </a:ext>
-            </a:extLst>
-          </p:cNvPr>
-          <p:cNvSpPr>
-            <a:spLocks noGrp="1"/>
-          </p:cNvSpPr>
-          <p:nvPr>
-            <p:ph type="sldNum" sz="quarter" idx="12"/>
-          </p:nvPr>
-        </p:nvSpPr>
-        <p:spPr/>
-        <p:txBody>
-          <a:bodyPr/>
-          <a:lstStyle/>
-          <a:p>
-            <a:fld id="{DAE21BBA-8137-4F87-A1AB-9B87866F9985}" type="slidenum">
-              <a:rPr lang="en-US" smtClean="0"/>
-              <a:t>‹#›</a:t>
-            </a:fld>
-            <a:endParaRPr lang="en-US"/>
           </a:p>
         </p:txBody>
       </p:sp>
       <p:pic>
         <p:nvPicPr>
-          <p:cNvPr id="7" name="Picture 6">
+          <p:cNvPr id="10" name="Picture 9">
             <a:extLst>
               <a:ext uri="{FF2B5EF4-FFF2-40B4-BE49-F238E27FC236}">
-                <a16:creationId xmlns:a16="http://schemas.microsoft.com/office/drawing/2014/main" id="{FDE7745E-9766-4437-99C7-9C1C56B23E4A}"/>
+                <a16:creationId xmlns:a16="http://schemas.microsoft.com/office/drawing/2014/main" id="{83E260F2-2DF3-4003-B004-AA8AE13C045B}"/>
               </a:ext>
             </a:extLst>
           </p:cNvPr>
@@ -363,10 +605,607 @@
           </a:prstGeom>
         </p:spPr>
       </p:pic>
+      <p:sp>
+        <p:nvSpPr>
+          <p:cNvPr id="21" name="Parallelogram 53">
+            <a:extLst>
+              <a:ext uri="{FF2B5EF4-FFF2-40B4-BE49-F238E27FC236}">
+                <a16:creationId xmlns:a16="http://schemas.microsoft.com/office/drawing/2014/main" id="{1B360DC6-0ACF-44E4-AA16-EAEDA7F0618A}"/>
+              </a:ext>
+            </a:extLst>
+          </p:cNvPr>
+          <p:cNvSpPr/>
+          <p:nvPr userDrawn="1"/>
+        </p:nvSpPr>
+        <p:spPr>
+          <a:xfrm flipV="1">
+            <a:off x="9439150" y="-23008"/>
+            <a:ext cx="2743199" cy="4270010"/>
+          </a:xfrm>
+          <a:custGeom>
+            <a:avLst/>
+            <a:gdLst>
+              <a:gd name="connsiteX0" fmla="*/ 0 w 7211832"/>
+              <a:gd name="connsiteY0" fmla="*/ 5143500 h 5143500"/>
+              <a:gd name="connsiteX1" fmla="*/ 2747195 w 7211832"/>
+              <a:gd name="connsiteY1" fmla="*/ 0 h 5143500"/>
+              <a:gd name="connsiteX2" fmla="*/ 7211832 w 7211832"/>
+              <a:gd name="connsiteY2" fmla="*/ 0 h 5143500"/>
+              <a:gd name="connsiteX3" fmla="*/ 4464637 w 7211832"/>
+              <a:gd name="connsiteY3" fmla="*/ 5143500 h 5143500"/>
+              <a:gd name="connsiteX4" fmla="*/ 0 w 7211832"/>
+              <a:gd name="connsiteY4" fmla="*/ 5143500 h 5143500"/>
+              <a:gd name="connsiteX0" fmla="*/ 0 w 5249218"/>
+              <a:gd name="connsiteY0" fmla="*/ 5143500 h 5143500"/>
+              <a:gd name="connsiteX1" fmla="*/ 2747195 w 5249218"/>
+              <a:gd name="connsiteY1" fmla="*/ 0 h 5143500"/>
+              <a:gd name="connsiteX2" fmla="*/ 5249218 w 5249218"/>
+              <a:gd name="connsiteY2" fmla="*/ 0 h 5143500"/>
+              <a:gd name="connsiteX3" fmla="*/ 4464637 w 5249218"/>
+              <a:gd name="connsiteY3" fmla="*/ 5143500 h 5143500"/>
+              <a:gd name="connsiteX4" fmla="*/ 0 w 5249218"/>
+              <a:gd name="connsiteY4" fmla="*/ 5143500 h 5143500"/>
+              <a:gd name="connsiteX0" fmla="*/ 0 w 5472242"/>
+              <a:gd name="connsiteY0" fmla="*/ 5143500 h 5143500"/>
+              <a:gd name="connsiteX1" fmla="*/ 2747195 w 5472242"/>
+              <a:gd name="connsiteY1" fmla="*/ 0 h 5143500"/>
+              <a:gd name="connsiteX2" fmla="*/ 5472242 w 5472242"/>
+              <a:gd name="connsiteY2" fmla="*/ 7434 h 5143500"/>
+              <a:gd name="connsiteX3" fmla="*/ 4464637 w 5472242"/>
+              <a:gd name="connsiteY3" fmla="*/ 5143500 h 5143500"/>
+              <a:gd name="connsiteX4" fmla="*/ 0 w 5472242"/>
+              <a:gd name="connsiteY4" fmla="*/ 5143500 h 5143500"/>
+              <a:gd name="connsiteX0" fmla="*/ 0 w 5472242"/>
+              <a:gd name="connsiteY0" fmla="*/ 5143500 h 5165803"/>
+              <a:gd name="connsiteX1" fmla="*/ 2747195 w 5472242"/>
+              <a:gd name="connsiteY1" fmla="*/ 0 h 5165803"/>
+              <a:gd name="connsiteX2" fmla="*/ 5472242 w 5472242"/>
+              <a:gd name="connsiteY2" fmla="*/ 7434 h 5165803"/>
+              <a:gd name="connsiteX3" fmla="*/ 5468246 w 5472242"/>
+              <a:gd name="connsiteY3" fmla="*/ 5165803 h 5165803"/>
+              <a:gd name="connsiteX4" fmla="*/ 0 w 5472242"/>
+              <a:gd name="connsiteY4" fmla="*/ 5143500 h 5165803"/>
+              <a:gd name="connsiteX0" fmla="*/ 0 w 5472242"/>
+              <a:gd name="connsiteY0" fmla="*/ 5143500 h 5143500"/>
+              <a:gd name="connsiteX1" fmla="*/ 2747195 w 5472242"/>
+              <a:gd name="connsiteY1" fmla="*/ 0 h 5143500"/>
+              <a:gd name="connsiteX2" fmla="*/ 5472242 w 5472242"/>
+              <a:gd name="connsiteY2" fmla="*/ 7434 h 5143500"/>
+              <a:gd name="connsiteX3" fmla="*/ 3698919 w 5472242"/>
+              <a:gd name="connsiteY3" fmla="*/ 4942779 h 5143500"/>
+              <a:gd name="connsiteX4" fmla="*/ 0 w 5472242"/>
+              <a:gd name="connsiteY4" fmla="*/ 5143500 h 5143500"/>
+              <a:gd name="connsiteX0" fmla="*/ 0 w 5472242"/>
+              <a:gd name="connsiteY0" fmla="*/ 5143500 h 5150935"/>
+              <a:gd name="connsiteX1" fmla="*/ 2747195 w 5472242"/>
+              <a:gd name="connsiteY1" fmla="*/ 0 h 5150935"/>
+              <a:gd name="connsiteX2" fmla="*/ 5472242 w 5472242"/>
+              <a:gd name="connsiteY2" fmla="*/ 7434 h 5150935"/>
+              <a:gd name="connsiteX3" fmla="*/ 4301085 w 5472242"/>
+              <a:gd name="connsiteY3" fmla="*/ 5150935 h 5150935"/>
+              <a:gd name="connsiteX4" fmla="*/ 0 w 5472242"/>
+              <a:gd name="connsiteY4" fmla="*/ 5143500 h 5150935"/>
+              <a:gd name="connsiteX0" fmla="*/ 0 w 4728828"/>
+              <a:gd name="connsiteY0" fmla="*/ 5143500 h 5150935"/>
+              <a:gd name="connsiteX1" fmla="*/ 2747195 w 4728828"/>
+              <a:gd name="connsiteY1" fmla="*/ 0 h 5150935"/>
+              <a:gd name="connsiteX2" fmla="*/ 4728828 w 4728828"/>
+              <a:gd name="connsiteY2" fmla="*/ 223024 h 5150935"/>
+              <a:gd name="connsiteX3" fmla="*/ 4301085 w 4728828"/>
+              <a:gd name="connsiteY3" fmla="*/ 5150935 h 5150935"/>
+              <a:gd name="connsiteX4" fmla="*/ 0 w 4728828"/>
+              <a:gd name="connsiteY4" fmla="*/ 5143500 h 5150935"/>
+              <a:gd name="connsiteX0" fmla="*/ 0 w 4342253"/>
+              <a:gd name="connsiteY0" fmla="*/ 5173237 h 5180672"/>
+              <a:gd name="connsiteX1" fmla="*/ 2747195 w 4342253"/>
+              <a:gd name="connsiteY1" fmla="*/ 29737 h 5180672"/>
+              <a:gd name="connsiteX2" fmla="*/ 4342253 w 4342253"/>
+              <a:gd name="connsiteY2" fmla="*/ 0 h 5180672"/>
+              <a:gd name="connsiteX3" fmla="*/ 4301085 w 4342253"/>
+              <a:gd name="connsiteY3" fmla="*/ 5180672 h 5180672"/>
+              <a:gd name="connsiteX4" fmla="*/ 0 w 4342253"/>
+              <a:gd name="connsiteY4" fmla="*/ 5173237 h 5180672"/>
+              <a:gd name="connsiteX0" fmla="*/ 0 w 4342253"/>
+              <a:gd name="connsiteY0" fmla="*/ 6618452 h 6625887"/>
+              <a:gd name="connsiteX1" fmla="*/ 3531945 w 4342253"/>
+              <a:gd name="connsiteY1" fmla="*/ 0 h 6625887"/>
+              <a:gd name="connsiteX2" fmla="*/ 4342253 w 4342253"/>
+              <a:gd name="connsiteY2" fmla="*/ 1445215 h 6625887"/>
+              <a:gd name="connsiteX3" fmla="*/ 4301085 w 4342253"/>
+              <a:gd name="connsiteY3" fmla="*/ 6625887 h 6625887"/>
+              <a:gd name="connsiteX4" fmla="*/ 0 w 4342253"/>
+              <a:gd name="connsiteY4" fmla="*/ 6618452 h 6625887"/>
+              <a:gd name="connsiteX0" fmla="*/ 0 w 4301085"/>
+              <a:gd name="connsiteY0" fmla="*/ 6618452 h 6625887"/>
+              <a:gd name="connsiteX1" fmla="*/ 3531945 w 4301085"/>
+              <a:gd name="connsiteY1" fmla="*/ 0 h 6625887"/>
+              <a:gd name="connsiteX2" fmla="*/ 4228795 w 4301085"/>
+              <a:gd name="connsiteY2" fmla="*/ 8082 h 6625887"/>
+              <a:gd name="connsiteX3" fmla="*/ 4301085 w 4301085"/>
+              <a:gd name="connsiteY3" fmla="*/ 6625887 h 6625887"/>
+              <a:gd name="connsiteX4" fmla="*/ 0 w 4301085"/>
+              <a:gd name="connsiteY4" fmla="*/ 6618452 h 6625887"/>
+              <a:gd name="connsiteX0" fmla="*/ 0 w 4228795"/>
+              <a:gd name="connsiteY0" fmla="*/ 6618452 h 6618452"/>
+              <a:gd name="connsiteX1" fmla="*/ 3531945 w 4228795"/>
+              <a:gd name="connsiteY1" fmla="*/ 0 h 6618452"/>
+              <a:gd name="connsiteX2" fmla="*/ 4228795 w 4228795"/>
+              <a:gd name="connsiteY2" fmla="*/ 8082 h 6618452"/>
+              <a:gd name="connsiteX3" fmla="*/ 2707423 w 4228795"/>
+              <a:gd name="connsiteY3" fmla="*/ 6022880 h 6618452"/>
+              <a:gd name="connsiteX4" fmla="*/ 0 w 4228795"/>
+              <a:gd name="connsiteY4" fmla="*/ 6618452 h 6618452"/>
+              <a:gd name="connsiteX0" fmla="*/ 0 w 4228795"/>
+              <a:gd name="connsiteY0" fmla="*/ 6618452 h 6625887"/>
+              <a:gd name="connsiteX1" fmla="*/ 3531945 w 4228795"/>
+              <a:gd name="connsiteY1" fmla="*/ 0 h 6625887"/>
+              <a:gd name="connsiteX2" fmla="*/ 4228795 w 4228795"/>
+              <a:gd name="connsiteY2" fmla="*/ 8082 h 6625887"/>
+              <a:gd name="connsiteX3" fmla="*/ 2890479 w 4228795"/>
+              <a:gd name="connsiteY3" fmla="*/ 6625887 h 6625887"/>
+              <a:gd name="connsiteX4" fmla="*/ 0 w 4228795"/>
+              <a:gd name="connsiteY4" fmla="*/ 6618452 h 6625887"/>
+              <a:gd name="connsiteX0" fmla="*/ 0 w 3531945"/>
+              <a:gd name="connsiteY0" fmla="*/ 6618452 h 6625887"/>
+              <a:gd name="connsiteX1" fmla="*/ 3531945 w 3531945"/>
+              <a:gd name="connsiteY1" fmla="*/ 0 h 6625887"/>
+              <a:gd name="connsiteX2" fmla="*/ 2732044 w 3531945"/>
+              <a:gd name="connsiteY2" fmla="*/ 2075536 h 6625887"/>
+              <a:gd name="connsiteX3" fmla="*/ 2890479 w 3531945"/>
+              <a:gd name="connsiteY3" fmla="*/ 6625887 h 6625887"/>
+              <a:gd name="connsiteX4" fmla="*/ 0 w 3531945"/>
+              <a:gd name="connsiteY4" fmla="*/ 6618452 h 6625887"/>
+              <a:gd name="connsiteX0" fmla="*/ 0 w 3531945"/>
+              <a:gd name="connsiteY0" fmla="*/ 6618452 h 6625887"/>
+              <a:gd name="connsiteX1" fmla="*/ 3531945 w 3531945"/>
+              <a:gd name="connsiteY1" fmla="*/ 0 h 6625887"/>
+              <a:gd name="connsiteX2" fmla="*/ 2893564 w 3531945"/>
+              <a:gd name="connsiteY2" fmla="*/ 2010928 h 6625887"/>
+              <a:gd name="connsiteX3" fmla="*/ 2890479 w 3531945"/>
+              <a:gd name="connsiteY3" fmla="*/ 6625887 h 6625887"/>
+              <a:gd name="connsiteX4" fmla="*/ 0 w 3531945"/>
+              <a:gd name="connsiteY4" fmla="*/ 6618452 h 6625887"/>
+              <a:gd name="connsiteX0" fmla="*/ 0 w 2893564"/>
+              <a:gd name="connsiteY0" fmla="*/ 5369364 h 5376799"/>
+              <a:gd name="connsiteX1" fmla="*/ 2864330 w 2893564"/>
+              <a:gd name="connsiteY1" fmla="*/ 0 h 5376799"/>
+              <a:gd name="connsiteX2" fmla="*/ 2893564 w 2893564"/>
+              <a:gd name="connsiteY2" fmla="*/ 761840 h 5376799"/>
+              <a:gd name="connsiteX3" fmla="*/ 2890479 w 2893564"/>
+              <a:gd name="connsiteY3" fmla="*/ 5376799 h 5376799"/>
+              <a:gd name="connsiteX4" fmla="*/ 0 w 2893564"/>
+              <a:gd name="connsiteY4" fmla="*/ 5369364 h 5376799"/>
+              <a:gd name="connsiteX0" fmla="*/ 0 w 2896634"/>
+              <a:gd name="connsiteY0" fmla="*/ 5423205 h 5430640"/>
+              <a:gd name="connsiteX1" fmla="*/ 2896634 w 2896634"/>
+              <a:gd name="connsiteY1" fmla="*/ 0 h 5430640"/>
+              <a:gd name="connsiteX2" fmla="*/ 2893564 w 2896634"/>
+              <a:gd name="connsiteY2" fmla="*/ 815681 h 5430640"/>
+              <a:gd name="connsiteX3" fmla="*/ 2890479 w 2896634"/>
+              <a:gd name="connsiteY3" fmla="*/ 5430640 h 5430640"/>
+              <a:gd name="connsiteX4" fmla="*/ 0 w 2896634"/>
+              <a:gd name="connsiteY4" fmla="*/ 5423205 h 5430640"/>
+            </a:gdLst>
+            <a:ahLst/>
+            <a:cxnLst>
+              <a:cxn ang="0">
+                <a:pos x="connsiteX0" y="connsiteY0"/>
+              </a:cxn>
+              <a:cxn ang="0">
+                <a:pos x="connsiteX1" y="connsiteY1"/>
+              </a:cxn>
+              <a:cxn ang="0">
+                <a:pos x="connsiteX2" y="connsiteY2"/>
+              </a:cxn>
+              <a:cxn ang="0">
+                <a:pos x="connsiteX3" y="connsiteY3"/>
+              </a:cxn>
+              <a:cxn ang="0">
+                <a:pos x="connsiteX4" y="connsiteY4"/>
+              </a:cxn>
+            </a:cxnLst>
+            <a:rect l="l" t="t" r="r" b="b"/>
+            <a:pathLst>
+              <a:path w="2896634" h="5430640">
+                <a:moveTo>
+                  <a:pt x="0" y="5423205"/>
+                </a:moveTo>
+                <a:lnTo>
+                  <a:pt x="2896634" y="0"/>
+                </a:lnTo>
+                <a:cubicBezTo>
+                  <a:pt x="2895611" y="271894"/>
+                  <a:pt x="2894587" y="543787"/>
+                  <a:pt x="2893564" y="815681"/>
+                </a:cubicBezTo>
+                <a:cubicBezTo>
+                  <a:pt x="2892536" y="2354001"/>
+                  <a:pt x="2891507" y="3892320"/>
+                  <a:pt x="2890479" y="5430640"/>
+                </a:cubicBezTo>
+                <a:lnTo>
+                  <a:pt x="0" y="5423205"/>
+                </a:lnTo>
+                <a:close/>
+              </a:path>
+            </a:pathLst>
+          </a:custGeom>
+          <a:solidFill>
+            <a:schemeClr val="accent4"/>
+          </a:solidFill>
+          <a:ln>
+            <a:noFill/>
+          </a:ln>
+        </p:spPr>
+        <p:style>
+          <a:lnRef idx="2">
+            <a:schemeClr val="accent1">
+              <a:shade val="50000"/>
+            </a:schemeClr>
+          </a:lnRef>
+          <a:fillRef idx="1">
+            <a:schemeClr val="accent1"/>
+          </a:fillRef>
+          <a:effectRef idx="0">
+            <a:schemeClr val="accent1"/>
+          </a:effectRef>
+          <a:fontRef idx="minor">
+            <a:schemeClr val="lt1"/>
+          </a:fontRef>
+        </p:style>
+        <p:txBody>
+          <a:bodyPr rtlCol="0" anchor="ctr"/>
+          <a:lstStyle/>
+          <a:p>
+            <a:pPr algn="ctr"/>
+            <a:endParaRPr lang="en-US"/>
+          </a:p>
+        </p:txBody>
+      </p:sp>
+      <p:sp>
+        <p:nvSpPr>
+          <p:cNvPr id="22" name="Parallelogram 53">
+            <a:extLst>
+              <a:ext uri="{FF2B5EF4-FFF2-40B4-BE49-F238E27FC236}">
+                <a16:creationId xmlns:a16="http://schemas.microsoft.com/office/drawing/2014/main" id="{02E6BFAB-9CFD-45AD-AD73-79C52581C108}"/>
+              </a:ext>
+            </a:extLst>
+          </p:cNvPr>
+          <p:cNvSpPr/>
+          <p:nvPr userDrawn="1"/>
+        </p:nvSpPr>
+        <p:spPr>
+          <a:xfrm>
+            <a:off x="8715550" y="-44624"/>
+            <a:ext cx="3476450" cy="6321599"/>
+          </a:xfrm>
+          <a:custGeom>
+            <a:avLst/>
+            <a:gdLst>
+              <a:gd name="connsiteX0" fmla="*/ 0 w 7211832"/>
+              <a:gd name="connsiteY0" fmla="*/ 5143500 h 5143500"/>
+              <a:gd name="connsiteX1" fmla="*/ 2747195 w 7211832"/>
+              <a:gd name="connsiteY1" fmla="*/ 0 h 5143500"/>
+              <a:gd name="connsiteX2" fmla="*/ 7211832 w 7211832"/>
+              <a:gd name="connsiteY2" fmla="*/ 0 h 5143500"/>
+              <a:gd name="connsiteX3" fmla="*/ 4464637 w 7211832"/>
+              <a:gd name="connsiteY3" fmla="*/ 5143500 h 5143500"/>
+              <a:gd name="connsiteX4" fmla="*/ 0 w 7211832"/>
+              <a:gd name="connsiteY4" fmla="*/ 5143500 h 5143500"/>
+              <a:gd name="connsiteX0" fmla="*/ 0 w 5249218"/>
+              <a:gd name="connsiteY0" fmla="*/ 5143500 h 5143500"/>
+              <a:gd name="connsiteX1" fmla="*/ 2747195 w 5249218"/>
+              <a:gd name="connsiteY1" fmla="*/ 0 h 5143500"/>
+              <a:gd name="connsiteX2" fmla="*/ 5249218 w 5249218"/>
+              <a:gd name="connsiteY2" fmla="*/ 0 h 5143500"/>
+              <a:gd name="connsiteX3" fmla="*/ 4464637 w 5249218"/>
+              <a:gd name="connsiteY3" fmla="*/ 5143500 h 5143500"/>
+              <a:gd name="connsiteX4" fmla="*/ 0 w 5249218"/>
+              <a:gd name="connsiteY4" fmla="*/ 5143500 h 5143500"/>
+              <a:gd name="connsiteX0" fmla="*/ 0 w 5472242"/>
+              <a:gd name="connsiteY0" fmla="*/ 5143500 h 5143500"/>
+              <a:gd name="connsiteX1" fmla="*/ 2747195 w 5472242"/>
+              <a:gd name="connsiteY1" fmla="*/ 0 h 5143500"/>
+              <a:gd name="connsiteX2" fmla="*/ 5472242 w 5472242"/>
+              <a:gd name="connsiteY2" fmla="*/ 7434 h 5143500"/>
+              <a:gd name="connsiteX3" fmla="*/ 4464637 w 5472242"/>
+              <a:gd name="connsiteY3" fmla="*/ 5143500 h 5143500"/>
+              <a:gd name="connsiteX4" fmla="*/ 0 w 5472242"/>
+              <a:gd name="connsiteY4" fmla="*/ 5143500 h 5143500"/>
+              <a:gd name="connsiteX0" fmla="*/ 0 w 5472242"/>
+              <a:gd name="connsiteY0" fmla="*/ 5143500 h 5165803"/>
+              <a:gd name="connsiteX1" fmla="*/ 2747195 w 5472242"/>
+              <a:gd name="connsiteY1" fmla="*/ 0 h 5165803"/>
+              <a:gd name="connsiteX2" fmla="*/ 5472242 w 5472242"/>
+              <a:gd name="connsiteY2" fmla="*/ 7434 h 5165803"/>
+              <a:gd name="connsiteX3" fmla="*/ 5468246 w 5472242"/>
+              <a:gd name="connsiteY3" fmla="*/ 5165803 h 5165803"/>
+              <a:gd name="connsiteX4" fmla="*/ 0 w 5472242"/>
+              <a:gd name="connsiteY4" fmla="*/ 5143500 h 5165803"/>
+              <a:gd name="connsiteX0" fmla="*/ 0 w 5472242"/>
+              <a:gd name="connsiteY0" fmla="*/ 5143500 h 5143500"/>
+              <a:gd name="connsiteX1" fmla="*/ 2747195 w 5472242"/>
+              <a:gd name="connsiteY1" fmla="*/ 0 h 5143500"/>
+              <a:gd name="connsiteX2" fmla="*/ 5472242 w 5472242"/>
+              <a:gd name="connsiteY2" fmla="*/ 7434 h 5143500"/>
+              <a:gd name="connsiteX3" fmla="*/ 3698919 w 5472242"/>
+              <a:gd name="connsiteY3" fmla="*/ 4942779 h 5143500"/>
+              <a:gd name="connsiteX4" fmla="*/ 0 w 5472242"/>
+              <a:gd name="connsiteY4" fmla="*/ 5143500 h 5143500"/>
+              <a:gd name="connsiteX0" fmla="*/ 0 w 5472242"/>
+              <a:gd name="connsiteY0" fmla="*/ 5143500 h 5150935"/>
+              <a:gd name="connsiteX1" fmla="*/ 2747195 w 5472242"/>
+              <a:gd name="connsiteY1" fmla="*/ 0 h 5150935"/>
+              <a:gd name="connsiteX2" fmla="*/ 5472242 w 5472242"/>
+              <a:gd name="connsiteY2" fmla="*/ 7434 h 5150935"/>
+              <a:gd name="connsiteX3" fmla="*/ 4301085 w 5472242"/>
+              <a:gd name="connsiteY3" fmla="*/ 5150935 h 5150935"/>
+              <a:gd name="connsiteX4" fmla="*/ 0 w 5472242"/>
+              <a:gd name="connsiteY4" fmla="*/ 5143500 h 5150935"/>
+              <a:gd name="connsiteX0" fmla="*/ 0 w 4728828"/>
+              <a:gd name="connsiteY0" fmla="*/ 5143500 h 5150935"/>
+              <a:gd name="connsiteX1" fmla="*/ 2747195 w 4728828"/>
+              <a:gd name="connsiteY1" fmla="*/ 0 h 5150935"/>
+              <a:gd name="connsiteX2" fmla="*/ 4728828 w 4728828"/>
+              <a:gd name="connsiteY2" fmla="*/ 223024 h 5150935"/>
+              <a:gd name="connsiteX3" fmla="*/ 4301085 w 4728828"/>
+              <a:gd name="connsiteY3" fmla="*/ 5150935 h 5150935"/>
+              <a:gd name="connsiteX4" fmla="*/ 0 w 4728828"/>
+              <a:gd name="connsiteY4" fmla="*/ 5143500 h 5150935"/>
+              <a:gd name="connsiteX0" fmla="*/ 0 w 4342253"/>
+              <a:gd name="connsiteY0" fmla="*/ 5173237 h 5180672"/>
+              <a:gd name="connsiteX1" fmla="*/ 2747195 w 4342253"/>
+              <a:gd name="connsiteY1" fmla="*/ 29737 h 5180672"/>
+              <a:gd name="connsiteX2" fmla="*/ 4342253 w 4342253"/>
+              <a:gd name="connsiteY2" fmla="*/ 0 h 5180672"/>
+              <a:gd name="connsiteX3" fmla="*/ 4301085 w 4342253"/>
+              <a:gd name="connsiteY3" fmla="*/ 5180672 h 5180672"/>
+              <a:gd name="connsiteX4" fmla="*/ 0 w 4342253"/>
+              <a:gd name="connsiteY4" fmla="*/ 5173237 h 5180672"/>
+              <a:gd name="connsiteX0" fmla="*/ 0 w 4370700"/>
+              <a:gd name="connsiteY0" fmla="*/ 5143500 h 5150935"/>
+              <a:gd name="connsiteX1" fmla="*/ 2747195 w 4370700"/>
+              <a:gd name="connsiteY1" fmla="*/ 0 h 5150935"/>
+              <a:gd name="connsiteX2" fmla="*/ 4370700 w 4370700"/>
+              <a:gd name="connsiteY2" fmla="*/ 190735 h 5150935"/>
+              <a:gd name="connsiteX3" fmla="*/ 4301085 w 4370700"/>
+              <a:gd name="connsiteY3" fmla="*/ 5150935 h 5150935"/>
+              <a:gd name="connsiteX4" fmla="*/ 0 w 4370700"/>
+              <a:gd name="connsiteY4" fmla="*/ 5143500 h 5150935"/>
+              <a:gd name="connsiteX0" fmla="*/ 0 w 4370700"/>
+              <a:gd name="connsiteY0" fmla="*/ 4965700 h 4973135"/>
+              <a:gd name="connsiteX1" fmla="*/ 2647627 w 4370700"/>
+              <a:gd name="connsiteY1" fmla="*/ 0 h 4973135"/>
+              <a:gd name="connsiteX2" fmla="*/ 4370700 w 4370700"/>
+              <a:gd name="connsiteY2" fmla="*/ 12935 h 4973135"/>
+              <a:gd name="connsiteX3" fmla="*/ 4301085 w 4370700"/>
+              <a:gd name="connsiteY3" fmla="*/ 4973135 h 4973135"/>
+              <a:gd name="connsiteX4" fmla="*/ 0 w 4370700"/>
+              <a:gd name="connsiteY4" fmla="*/ 4965700 h 4973135"/>
+              <a:gd name="connsiteX0" fmla="*/ 0 w 4301085"/>
+              <a:gd name="connsiteY0" fmla="*/ 4965700 h 4973135"/>
+              <a:gd name="connsiteX1" fmla="*/ 2647627 w 4301085"/>
+              <a:gd name="connsiteY1" fmla="*/ 0 h 4973135"/>
+              <a:gd name="connsiteX2" fmla="*/ 3758106 w 4301085"/>
+              <a:gd name="connsiteY2" fmla="*/ 343414 h 4973135"/>
+              <a:gd name="connsiteX3" fmla="*/ 4301085 w 4301085"/>
+              <a:gd name="connsiteY3" fmla="*/ 4973135 h 4973135"/>
+              <a:gd name="connsiteX4" fmla="*/ 0 w 4301085"/>
+              <a:gd name="connsiteY4" fmla="*/ 4965700 h 4973135"/>
+              <a:gd name="connsiteX0" fmla="*/ 0 w 3758106"/>
+              <a:gd name="connsiteY0" fmla="*/ 4965700 h 4965700"/>
+              <a:gd name="connsiteX1" fmla="*/ 2647627 w 3758106"/>
+              <a:gd name="connsiteY1" fmla="*/ 0 h 4965700"/>
+              <a:gd name="connsiteX2" fmla="*/ 3758106 w 3758106"/>
+              <a:gd name="connsiteY2" fmla="*/ 343414 h 4965700"/>
+              <a:gd name="connsiteX3" fmla="*/ 3341893 w 3758106"/>
+              <a:gd name="connsiteY3" fmla="*/ 4868350 h 4965700"/>
+              <a:gd name="connsiteX4" fmla="*/ 0 w 3758106"/>
+              <a:gd name="connsiteY4" fmla="*/ 4965700 h 4965700"/>
+              <a:gd name="connsiteX0" fmla="*/ 0 w 3758106"/>
+              <a:gd name="connsiteY0" fmla="*/ 4965700 h 4965700"/>
+              <a:gd name="connsiteX1" fmla="*/ 2647627 w 3758106"/>
+              <a:gd name="connsiteY1" fmla="*/ 0 h 4965700"/>
+              <a:gd name="connsiteX2" fmla="*/ 3758106 w 3758106"/>
+              <a:gd name="connsiteY2" fmla="*/ 343414 h 4965700"/>
+              <a:gd name="connsiteX3" fmla="*/ 2995294 w 3758106"/>
+              <a:gd name="connsiteY3" fmla="*/ 4892532 h 4965700"/>
+              <a:gd name="connsiteX4" fmla="*/ 0 w 3758106"/>
+              <a:gd name="connsiteY4" fmla="*/ 4965700 h 4965700"/>
+              <a:gd name="connsiteX0" fmla="*/ 0 w 3758106"/>
+              <a:gd name="connsiteY0" fmla="*/ 4965700 h 4965700"/>
+              <a:gd name="connsiteX1" fmla="*/ 2647627 w 3758106"/>
+              <a:gd name="connsiteY1" fmla="*/ 0 h 4965700"/>
+              <a:gd name="connsiteX2" fmla="*/ 3758106 w 3758106"/>
+              <a:gd name="connsiteY2" fmla="*/ 343414 h 4965700"/>
+              <a:gd name="connsiteX3" fmla="*/ 3019475 w 3758106"/>
+              <a:gd name="connsiteY3" fmla="*/ 4715202 h 4965700"/>
+              <a:gd name="connsiteX4" fmla="*/ 0 w 3758106"/>
+              <a:gd name="connsiteY4" fmla="*/ 4965700 h 4965700"/>
+              <a:gd name="connsiteX0" fmla="*/ 0 w 3019475"/>
+              <a:gd name="connsiteY0" fmla="*/ 4965700 h 4965700"/>
+              <a:gd name="connsiteX1" fmla="*/ 2647627 w 3019475"/>
+              <a:gd name="connsiteY1" fmla="*/ 0 h 4965700"/>
+              <a:gd name="connsiteX2" fmla="*/ 2839216 w 3019475"/>
+              <a:gd name="connsiteY2" fmla="*/ 351475 h 4965700"/>
+              <a:gd name="connsiteX3" fmla="*/ 3019475 w 3019475"/>
+              <a:gd name="connsiteY3" fmla="*/ 4715202 h 4965700"/>
+              <a:gd name="connsiteX4" fmla="*/ 0 w 3019475"/>
+              <a:gd name="connsiteY4" fmla="*/ 4965700 h 4965700"/>
+              <a:gd name="connsiteX0" fmla="*/ 0 w 3306722"/>
+              <a:gd name="connsiteY0" fmla="*/ 4976945 h 4976945"/>
+              <a:gd name="connsiteX1" fmla="*/ 2647627 w 3306722"/>
+              <a:gd name="connsiteY1" fmla="*/ 11245 h 4976945"/>
+              <a:gd name="connsiteX2" fmla="*/ 3306722 w 3306722"/>
+              <a:gd name="connsiteY2" fmla="*/ 0 h 4976945"/>
+              <a:gd name="connsiteX3" fmla="*/ 3019475 w 3306722"/>
+              <a:gd name="connsiteY3" fmla="*/ 4726447 h 4976945"/>
+              <a:gd name="connsiteX4" fmla="*/ 0 w 3306722"/>
+              <a:gd name="connsiteY4" fmla="*/ 4976945 h 4976945"/>
+              <a:gd name="connsiteX0" fmla="*/ 0 w 3309651"/>
+              <a:gd name="connsiteY0" fmla="*/ 4976945 h 4976945"/>
+              <a:gd name="connsiteX1" fmla="*/ 2647627 w 3309651"/>
+              <a:gd name="connsiteY1" fmla="*/ 11245 h 4976945"/>
+              <a:gd name="connsiteX2" fmla="*/ 3306722 w 3309651"/>
+              <a:gd name="connsiteY2" fmla="*/ 0 h 4976945"/>
+              <a:gd name="connsiteX3" fmla="*/ 3309651 w 3309651"/>
+              <a:gd name="connsiteY3" fmla="*/ 4968261 h 4976945"/>
+              <a:gd name="connsiteX4" fmla="*/ 0 w 3309651"/>
+              <a:gd name="connsiteY4" fmla="*/ 4976945 h 4976945"/>
+            </a:gdLst>
+            <a:ahLst/>
+            <a:cxnLst>
+              <a:cxn ang="0">
+                <a:pos x="connsiteX0" y="connsiteY0"/>
+              </a:cxn>
+              <a:cxn ang="0">
+                <a:pos x="connsiteX1" y="connsiteY1"/>
+              </a:cxn>
+              <a:cxn ang="0">
+                <a:pos x="connsiteX2" y="connsiteY2"/>
+              </a:cxn>
+              <a:cxn ang="0">
+                <a:pos x="connsiteX3" y="connsiteY3"/>
+              </a:cxn>
+              <a:cxn ang="0">
+                <a:pos x="connsiteX4" y="connsiteY4"/>
+              </a:cxn>
+            </a:cxnLst>
+            <a:rect l="l" t="t" r="r" b="b"/>
+            <a:pathLst>
+              <a:path w="3309651" h="4976945">
+                <a:moveTo>
+                  <a:pt x="0" y="4976945"/>
+                </a:moveTo>
+                <a:lnTo>
+                  <a:pt x="2647627" y="11245"/>
+                </a:lnTo>
+                <a:lnTo>
+                  <a:pt x="3306722" y="0"/>
+                </a:lnTo>
+                <a:cubicBezTo>
+                  <a:pt x="3307698" y="1656087"/>
+                  <a:pt x="3308675" y="3312174"/>
+                  <a:pt x="3309651" y="4968261"/>
+                </a:cubicBezTo>
+                <a:lnTo>
+                  <a:pt x="0" y="4976945"/>
+                </a:lnTo>
+                <a:close/>
+              </a:path>
+            </a:pathLst>
+          </a:custGeom>
+          <a:solidFill>
+            <a:schemeClr val="accent3">
+              <a:alpha val="95000"/>
+            </a:schemeClr>
+          </a:solidFill>
+          <a:ln>
+            <a:noFill/>
+          </a:ln>
+        </p:spPr>
+        <p:style>
+          <a:lnRef idx="2">
+            <a:schemeClr val="accent1">
+              <a:shade val="50000"/>
+            </a:schemeClr>
+          </a:lnRef>
+          <a:fillRef idx="1">
+            <a:schemeClr val="accent1"/>
+          </a:fillRef>
+          <a:effectRef idx="0">
+            <a:schemeClr val="accent1"/>
+          </a:effectRef>
+          <a:fontRef idx="minor">
+            <a:schemeClr val="lt1"/>
+          </a:fontRef>
+        </p:style>
+        <p:txBody>
+          <a:bodyPr rtlCol="0" anchor="ctr"/>
+          <a:lstStyle/>
+          <a:p>
+            <a:pPr algn="ctr"/>
+            <a:endParaRPr lang="en-US"/>
+          </a:p>
+        </p:txBody>
+      </p:sp>
+      <p:sp>
+        <p:nvSpPr>
+          <p:cNvPr id="24" name="Title 1">
+            <a:extLst>
+              <a:ext uri="{FF2B5EF4-FFF2-40B4-BE49-F238E27FC236}">
+                <a16:creationId xmlns:a16="http://schemas.microsoft.com/office/drawing/2014/main" id="{0D7A203E-9D86-435D-BA54-5CC93375DD30}"/>
+              </a:ext>
+            </a:extLst>
+          </p:cNvPr>
+          <p:cNvSpPr>
+            <a:spLocks noGrp="1"/>
+          </p:cNvSpPr>
+          <p:nvPr>
+            <p:ph type="ctrTitle"/>
+          </p:nvPr>
+        </p:nvSpPr>
+        <p:spPr>
+          <a:xfrm>
+            <a:off x="533400" y="2169621"/>
+            <a:ext cx="8610600" cy="1356967"/>
+          </a:xfrm>
+          <a:prstGeom prst="rect">
+            <a:avLst/>
+          </a:prstGeom>
+        </p:spPr>
+        <p:txBody>
+          <a:bodyPr anchor="b">
+            <a:noAutofit/>
+          </a:bodyPr>
+          <a:lstStyle>
+            <a:lvl1pPr algn="l">
+              <a:defRPr sz="3200"/>
+            </a:lvl1pPr>
+          </a:lstStyle>
+          <a:p>
+            <a:r>
+              <a:rPr lang="en-US"/>
+              <a:t>Click to edit Master title style</a:t>
+            </a:r>
+            <a:endParaRPr lang="en-US" dirty="0"/>
+          </a:p>
+        </p:txBody>
+      </p:sp>
+      <p:pic>
+        <p:nvPicPr>
+          <p:cNvPr id="25" name="Picture 24">
+            <a:extLst>
+              <a:ext uri="{FF2B5EF4-FFF2-40B4-BE49-F238E27FC236}">
+                <a16:creationId xmlns:a16="http://schemas.microsoft.com/office/drawing/2014/main" id="{90E09BBF-9609-4AD5-97D1-E4C398E29482}"/>
+              </a:ext>
+            </a:extLst>
+          </p:cNvPr>
+          <p:cNvPicPr>
+            <a:picLocks noChangeAspect="1"/>
+          </p:cNvPicPr>
+          <p:nvPr userDrawn="1"/>
+        </p:nvPicPr>
+        <p:blipFill>
+          <a:blip r:embed="rId3"/>
+          <a:stretch>
+            <a:fillRect/>
+          </a:stretch>
+        </p:blipFill>
+        <p:spPr>
+          <a:xfrm>
+            <a:off x="9686924" y="6429378"/>
+            <a:ext cx="1431161" cy="365125"/>
+          </a:xfrm>
+          <a:prstGeom prst="rect">
+            <a:avLst/>
+          </a:prstGeom>
+        </p:spPr>
+      </p:pic>
     </p:spTree>
     <p:extLst>
       <p:ext uri="{BB962C8B-B14F-4D97-AF65-F5344CB8AC3E}">
-        <p14:creationId xmlns:p14="http://schemas.microsoft.com/office/powerpoint/2010/main" val="3150300637"/>
+        <p14:creationId xmlns:p14="http://schemas.microsoft.com/office/powerpoint/2010/main" val="1444357513"/>
       </p:ext>
     </p:extLst>
   </p:cSld>
@@ -395,13 +1234,7 @@
       </p:grpSpPr>
       <p:sp>
         <p:nvSpPr>
-          <p:cNvPr id="2" name="Title 1">
-            <a:extLst>
-              <a:ext uri="{FF2B5EF4-FFF2-40B4-BE49-F238E27FC236}">
-                <a16:creationId xmlns:a16="http://schemas.microsoft.com/office/drawing/2014/main" id="{50BDEA63-4C8C-4D67-A200-276E8C190ACB}"/>
-              </a:ext>
-            </a:extLst>
-          </p:cNvPr>
+          <p:cNvPr id="2" name="Title 1"/>
           <p:cNvSpPr>
             <a:spLocks noGrp="1"/>
           </p:cNvSpPr>
@@ -415,21 +1248,16 @@
           <a:lstStyle/>
           <a:p>
             <a:r>
-              <a:rPr lang="en-US"/>
+              <a:rPr lang="en-US" smtClean="0"/>
               <a:t>Click to edit Master title style</a:t>
             </a:r>
+            <a:endParaRPr lang="en-US"/>
           </a:p>
         </p:txBody>
       </p:sp>
       <p:sp>
         <p:nvSpPr>
-          <p:cNvPr id="3" name="Vertical Text Placeholder 2">
-            <a:extLst>
-              <a:ext uri="{FF2B5EF4-FFF2-40B4-BE49-F238E27FC236}">
-                <a16:creationId xmlns:a16="http://schemas.microsoft.com/office/drawing/2014/main" id="{273BED61-0E08-4552-8083-E217DFF613AC}"/>
-              </a:ext>
-            </a:extLst>
-          </p:cNvPr>
+          <p:cNvPr id="3" name="Vertical Text Placeholder 2"/>
           <p:cNvSpPr>
             <a:spLocks noGrp="1"/>
           </p:cNvSpPr>
@@ -444,49 +1272,44 @@
           <a:p>
             <a:pPr lvl="0"/>
             <a:r>
-              <a:rPr lang="en-US"/>
+              <a:rPr lang="en-US" smtClean="0"/>
               <a:t>Click to edit Master text styles</a:t>
             </a:r>
           </a:p>
           <a:p>
             <a:pPr lvl="1"/>
             <a:r>
-              <a:rPr lang="en-US"/>
+              <a:rPr lang="en-US" smtClean="0"/>
               <a:t>Second level</a:t>
             </a:r>
           </a:p>
           <a:p>
             <a:pPr lvl="2"/>
             <a:r>
-              <a:rPr lang="en-US"/>
+              <a:rPr lang="en-US" smtClean="0"/>
               <a:t>Third level</a:t>
             </a:r>
           </a:p>
           <a:p>
             <a:pPr lvl="3"/>
             <a:r>
-              <a:rPr lang="en-US"/>
+              <a:rPr lang="en-US" smtClean="0"/>
               <a:t>Fourth level</a:t>
             </a:r>
           </a:p>
           <a:p>
             <a:pPr lvl="4"/>
             <a:r>
-              <a:rPr lang="en-US"/>
+              <a:rPr lang="en-US" smtClean="0"/>
               <a:t>Fifth level</a:t>
             </a:r>
+            <a:endParaRPr lang="en-US"/>
           </a:p>
         </p:txBody>
       </p:sp>
       <p:sp>
         <p:nvSpPr>
-          <p:cNvPr id="4" name="Date Placeholder 3">
-            <a:extLst>
-              <a:ext uri="{FF2B5EF4-FFF2-40B4-BE49-F238E27FC236}">
-                <a16:creationId xmlns:a16="http://schemas.microsoft.com/office/drawing/2014/main" id="{23F369ED-0AD8-4010-9CB0-CB78FD1EC10C}"/>
-              </a:ext>
-            </a:extLst>
-          </p:cNvPr>
+          <p:cNvPr id="4" name="Date Placeholder 3"/>
           <p:cNvSpPr>
             <a:spLocks noGrp="1"/>
           </p:cNvSpPr>
@@ -499,9 +1322,9 @@
           <a:bodyPr/>
           <a:lstStyle/>
           <a:p>
-            <a:fld id="{4036D906-24D5-4DAF-BF6E-4E33F265CDAD}" type="datetimeFigureOut">
+            <a:fld id="{241EB5C9-1307-BA42-ABA2-0BC069CD8E7F}" type="datetimeFigureOut">
               <a:rPr lang="en-US" smtClean="0"/>
-              <a:t>4/15/2020</a:t>
+              <a:t>2/17/2018</a:t>
             </a:fld>
             <a:endParaRPr lang="en-US"/>
           </a:p>
@@ -509,13 +1332,7 @@
       </p:sp>
       <p:sp>
         <p:nvSpPr>
-          <p:cNvPr id="5" name="Footer Placeholder 4">
-            <a:extLst>
-              <a:ext uri="{FF2B5EF4-FFF2-40B4-BE49-F238E27FC236}">
-                <a16:creationId xmlns:a16="http://schemas.microsoft.com/office/drawing/2014/main" id="{E0A7ABC8-BDEB-4555-9FC0-2D6AA7A76A04}"/>
-              </a:ext>
-            </a:extLst>
-          </p:cNvPr>
+          <p:cNvPr id="5" name="Footer Placeholder 4"/>
           <p:cNvSpPr>
             <a:spLocks noGrp="1"/>
           </p:cNvSpPr>
@@ -534,13 +1351,7 @@
       </p:sp>
       <p:sp>
         <p:nvSpPr>
-          <p:cNvPr id="6" name="Slide Number Placeholder 5">
-            <a:extLst>
-              <a:ext uri="{FF2B5EF4-FFF2-40B4-BE49-F238E27FC236}">
-                <a16:creationId xmlns:a16="http://schemas.microsoft.com/office/drawing/2014/main" id="{8F3DC10E-846F-4C2E-AC0F-95675A2965CB}"/>
-              </a:ext>
-            </a:extLst>
-          </p:cNvPr>
+          <p:cNvPr id="6" name="Slide Number Placeholder 5"/>
           <p:cNvSpPr>
             <a:spLocks noGrp="1"/>
           </p:cNvSpPr>
@@ -553,7 +1364,7 @@
           <a:bodyPr/>
           <a:lstStyle/>
           <a:p>
-            <a:fld id="{DAE21BBA-8137-4F87-A1AB-9B87866F9985}" type="slidenum">
+            <a:fld id="{C5EF2332-01BF-834F-8236-50238282D533}" type="slidenum">
               <a:rPr lang="en-US" smtClean="0"/>
               <a:t>‹#›</a:t>
             </a:fld>
@@ -564,7 +1375,7 @@
     </p:spTree>
     <p:extLst>
       <p:ext uri="{BB962C8B-B14F-4D97-AF65-F5344CB8AC3E}">
-        <p14:creationId xmlns:p14="http://schemas.microsoft.com/office/powerpoint/2010/main" val="1286033249"/>
+        <p14:creationId xmlns:p14="http://schemas.microsoft.com/office/powerpoint/2010/main" val="313914798"/>
       </p:ext>
     </p:extLst>
   </p:cSld>
@@ -593,13 +1404,7 @@
       </p:grpSpPr>
       <p:sp>
         <p:nvSpPr>
-          <p:cNvPr id="2" name="Vertical Title 1">
-            <a:extLst>
-              <a:ext uri="{FF2B5EF4-FFF2-40B4-BE49-F238E27FC236}">
-                <a16:creationId xmlns:a16="http://schemas.microsoft.com/office/drawing/2014/main" id="{C11D4A8B-0D50-400C-B644-95AF4EF41CF1}"/>
-              </a:ext>
-            </a:extLst>
-          </p:cNvPr>
+          <p:cNvPr id="2" name="Vertical Title 1"/>
           <p:cNvSpPr>
             <a:spLocks noGrp="1"/>
           </p:cNvSpPr>
@@ -609,8 +1414,8 @@
         </p:nvSpPr>
         <p:spPr>
           <a:xfrm>
-            <a:off x="8724900" y="365125"/>
-            <a:ext cx="2628900" cy="5811838"/>
+            <a:off x="6629400" y="274638"/>
+            <a:ext cx="2057400" cy="5851525"/>
           </a:xfrm>
         </p:spPr>
         <p:txBody>
@@ -618,21 +1423,16 @@
           <a:lstStyle/>
           <a:p>
             <a:r>
-              <a:rPr lang="en-US"/>
+              <a:rPr lang="en-US" smtClean="0"/>
               <a:t>Click to edit Master title style</a:t>
             </a:r>
+            <a:endParaRPr lang="en-US"/>
           </a:p>
         </p:txBody>
       </p:sp>
       <p:sp>
         <p:nvSpPr>
-          <p:cNvPr id="3" name="Vertical Text Placeholder 2">
-            <a:extLst>
-              <a:ext uri="{FF2B5EF4-FFF2-40B4-BE49-F238E27FC236}">
-                <a16:creationId xmlns:a16="http://schemas.microsoft.com/office/drawing/2014/main" id="{62FD7C88-84AB-49CE-ACC6-162F8F52484B}"/>
-              </a:ext>
-            </a:extLst>
-          </p:cNvPr>
+          <p:cNvPr id="3" name="Vertical Text Placeholder 2"/>
           <p:cNvSpPr>
             <a:spLocks noGrp="1"/>
           </p:cNvSpPr>
@@ -642,8 +1442,8 @@
         </p:nvSpPr>
         <p:spPr>
           <a:xfrm>
-            <a:off x="838200" y="365125"/>
-            <a:ext cx="7734300" cy="5811838"/>
+            <a:off x="457200" y="274638"/>
+            <a:ext cx="6019800" cy="5851525"/>
           </a:xfrm>
         </p:spPr>
         <p:txBody>
@@ -652,49 +1452,44 @@
           <a:p>
             <a:pPr lvl="0"/>
             <a:r>
-              <a:rPr lang="en-US"/>
+              <a:rPr lang="en-US" smtClean="0"/>
               <a:t>Click to edit Master text styles</a:t>
             </a:r>
           </a:p>
           <a:p>
             <a:pPr lvl="1"/>
             <a:r>
-              <a:rPr lang="en-US"/>
+              <a:rPr lang="en-US" smtClean="0"/>
               <a:t>Second level</a:t>
             </a:r>
           </a:p>
           <a:p>
             <a:pPr lvl="2"/>
             <a:r>
-              <a:rPr lang="en-US"/>
+              <a:rPr lang="en-US" smtClean="0"/>
               <a:t>Third level</a:t>
             </a:r>
           </a:p>
           <a:p>
             <a:pPr lvl="3"/>
             <a:r>
-              <a:rPr lang="en-US"/>
+              <a:rPr lang="en-US" smtClean="0"/>
               <a:t>Fourth level</a:t>
             </a:r>
           </a:p>
           <a:p>
             <a:pPr lvl="4"/>
             <a:r>
-              <a:rPr lang="en-US"/>
+              <a:rPr lang="en-US" smtClean="0"/>
               <a:t>Fifth level</a:t>
             </a:r>
+            <a:endParaRPr lang="en-US"/>
           </a:p>
         </p:txBody>
       </p:sp>
       <p:sp>
         <p:nvSpPr>
-          <p:cNvPr id="4" name="Date Placeholder 3">
-            <a:extLst>
-              <a:ext uri="{FF2B5EF4-FFF2-40B4-BE49-F238E27FC236}">
-                <a16:creationId xmlns:a16="http://schemas.microsoft.com/office/drawing/2014/main" id="{5842C267-C90E-4FD4-A8DF-14CF9428F96B}"/>
-              </a:ext>
-            </a:extLst>
-          </p:cNvPr>
+          <p:cNvPr id="4" name="Date Placeholder 3"/>
           <p:cNvSpPr>
             <a:spLocks noGrp="1"/>
           </p:cNvSpPr>
@@ -707,9 +1502,9 @@
           <a:bodyPr/>
           <a:lstStyle/>
           <a:p>
-            <a:fld id="{4036D906-24D5-4DAF-BF6E-4E33F265CDAD}" type="datetimeFigureOut">
+            <a:fld id="{241EB5C9-1307-BA42-ABA2-0BC069CD8E7F}" type="datetimeFigureOut">
               <a:rPr lang="en-US" smtClean="0"/>
-              <a:t>4/15/2020</a:t>
+              <a:t>2/17/2018</a:t>
             </a:fld>
             <a:endParaRPr lang="en-US"/>
           </a:p>
@@ -717,13 +1512,7 @@
       </p:sp>
       <p:sp>
         <p:nvSpPr>
-          <p:cNvPr id="5" name="Footer Placeholder 4">
-            <a:extLst>
-              <a:ext uri="{FF2B5EF4-FFF2-40B4-BE49-F238E27FC236}">
-                <a16:creationId xmlns:a16="http://schemas.microsoft.com/office/drawing/2014/main" id="{BE5CDE83-0438-47F3-A4B2-73D01FF6CDF9}"/>
-              </a:ext>
-            </a:extLst>
-          </p:cNvPr>
+          <p:cNvPr id="5" name="Footer Placeholder 4"/>
           <p:cNvSpPr>
             <a:spLocks noGrp="1"/>
           </p:cNvSpPr>
@@ -742,13 +1531,7 @@
       </p:sp>
       <p:sp>
         <p:nvSpPr>
-          <p:cNvPr id="6" name="Slide Number Placeholder 5">
-            <a:extLst>
-              <a:ext uri="{FF2B5EF4-FFF2-40B4-BE49-F238E27FC236}">
-                <a16:creationId xmlns:a16="http://schemas.microsoft.com/office/drawing/2014/main" id="{388B827F-5800-4800-B01E-F293DCA61F13}"/>
-              </a:ext>
-            </a:extLst>
-          </p:cNvPr>
+          <p:cNvPr id="6" name="Slide Number Placeholder 5"/>
           <p:cNvSpPr>
             <a:spLocks noGrp="1"/>
           </p:cNvSpPr>
@@ -761,7 +1544,7 @@
           <a:bodyPr/>
           <a:lstStyle/>
           <a:p>
-            <a:fld id="{DAE21BBA-8137-4F87-A1AB-9B87866F9985}" type="slidenum">
+            <a:fld id="{C5EF2332-01BF-834F-8236-50238282D533}" type="slidenum">
               <a:rPr lang="en-US" smtClean="0"/>
               <a:t>‹#›</a:t>
             </a:fld>
@@ -772,7 +1555,7 @@
     </p:spTree>
     <p:extLst>
       <p:ext uri="{BB962C8B-B14F-4D97-AF65-F5344CB8AC3E}">
-        <p14:creationId xmlns:p14="http://schemas.microsoft.com/office/powerpoint/2010/main" val="2858485394"/>
+        <p14:creationId xmlns:p14="http://schemas.microsoft.com/office/powerpoint/2010/main" val="2581529045"/>
       </p:ext>
     </p:extLst>
   </p:cSld>
@@ -783,7 +1566,7 @@
 </file>
 
 <file path=ppt/slideLayouts/slideLayout2.xml><?xml version="1.0" encoding="utf-8"?>
-<p:sldLayout xmlns:a="http://schemas.openxmlformats.org/drawingml/2006/main" xmlns:r="http://schemas.openxmlformats.org/officeDocument/2006/relationships" xmlns:p="http://schemas.openxmlformats.org/presentationml/2006/main" type="obj" preserve="1">
+<p:sldLayout xmlns:a="http://schemas.openxmlformats.org/drawingml/2006/main" xmlns:r="http://schemas.openxmlformats.org/officeDocument/2006/relationships" xmlns:p="http://schemas.openxmlformats.org/presentationml/2006/main" preserve="1" userDrawn="1">
   <p:cSld name="Title and Content">
     <p:spTree>
       <p:nvGrpSpPr>
@@ -801,98 +1584,7 @@
       </p:grpSpPr>
       <p:sp>
         <p:nvSpPr>
-          <p:cNvPr id="2" name="Title 1">
-            <a:extLst>
-              <a:ext uri="{FF2B5EF4-FFF2-40B4-BE49-F238E27FC236}">
-                <a16:creationId xmlns:a16="http://schemas.microsoft.com/office/drawing/2014/main" id="{CBAF8A09-F820-4DA7-9E82-F639A19B66D7}"/>
-              </a:ext>
-            </a:extLst>
-          </p:cNvPr>
-          <p:cNvSpPr>
-            <a:spLocks noGrp="1"/>
-          </p:cNvSpPr>
-          <p:nvPr>
-            <p:ph type="title"/>
-          </p:nvPr>
-        </p:nvSpPr>
-        <p:spPr/>
-        <p:txBody>
-          <a:bodyPr/>
-          <a:lstStyle/>
-          <a:p>
-            <a:r>
-              <a:rPr lang="en-US"/>
-              <a:t>Click to edit Master title style</a:t>
-            </a:r>
-          </a:p>
-        </p:txBody>
-      </p:sp>
-      <p:sp>
-        <p:nvSpPr>
-          <p:cNvPr id="3" name="Content Placeholder 2">
-            <a:extLst>
-              <a:ext uri="{FF2B5EF4-FFF2-40B4-BE49-F238E27FC236}">
-                <a16:creationId xmlns:a16="http://schemas.microsoft.com/office/drawing/2014/main" id="{B04430CC-2F44-4F95-B799-CEA42A95A10E}"/>
-              </a:ext>
-            </a:extLst>
-          </p:cNvPr>
-          <p:cNvSpPr>
-            <a:spLocks noGrp="1"/>
-          </p:cNvSpPr>
-          <p:nvPr>
-            <p:ph idx="1"/>
-          </p:nvPr>
-        </p:nvSpPr>
-        <p:spPr/>
-        <p:txBody>
-          <a:bodyPr/>
-          <a:lstStyle/>
-          <a:p>
-            <a:pPr lvl="0"/>
-            <a:r>
-              <a:rPr lang="en-US"/>
-              <a:t>Click to edit Master text styles</a:t>
-            </a:r>
-          </a:p>
-          <a:p>
-            <a:pPr lvl="1"/>
-            <a:r>
-              <a:rPr lang="en-US"/>
-              <a:t>Second level</a:t>
-            </a:r>
-          </a:p>
-          <a:p>
-            <a:pPr lvl="2"/>
-            <a:r>
-              <a:rPr lang="en-US"/>
-              <a:t>Third level</a:t>
-            </a:r>
-          </a:p>
-          <a:p>
-            <a:pPr lvl="3"/>
-            <a:r>
-              <a:rPr lang="en-US"/>
-              <a:t>Fourth level</a:t>
-            </a:r>
-          </a:p>
-          <a:p>
-            <a:pPr lvl="4"/>
-            <a:r>
-              <a:rPr lang="en-US"/>
-              <a:t>Fifth level</a:t>
-            </a:r>
-          </a:p>
-        </p:txBody>
-      </p:sp>
-      <p:sp>
-        <p:nvSpPr>
-          <p:cNvPr id="4" name="Date Placeholder 3">
-            <a:extLst>
-              <a:ext uri="{FF2B5EF4-FFF2-40B4-BE49-F238E27FC236}">
-                <a16:creationId xmlns:a16="http://schemas.microsoft.com/office/drawing/2014/main" id="{1A22A435-7E29-4F58-BA90-4D70E52C32BA}"/>
-              </a:ext>
-            </a:extLst>
-          </p:cNvPr>
+          <p:cNvPr id="4" name="Date Placeholder 3"/>
           <p:cNvSpPr>
             <a:spLocks noGrp="1"/>
           </p:cNvSpPr>
@@ -905,9 +1597,9 @@
           <a:bodyPr/>
           <a:lstStyle/>
           <a:p>
-            <a:fld id="{4036D906-24D5-4DAF-BF6E-4E33F265CDAD}" type="datetimeFigureOut">
+            <a:fld id="{241EB5C9-1307-BA42-ABA2-0BC069CD8E7F}" type="datetimeFigureOut">
               <a:rPr lang="en-US" smtClean="0"/>
-              <a:t>4/15/2020</a:t>
+              <a:t>4/17/2020</a:t>
             </a:fld>
             <a:endParaRPr lang="en-US"/>
           </a:p>
@@ -915,10 +1607,37 @@
       </p:sp>
       <p:sp>
         <p:nvSpPr>
-          <p:cNvPr id="5" name="Footer Placeholder 4">
+          <p:cNvPr id="5" name="Footer Placeholder 4"/>
+          <p:cNvSpPr>
+            <a:spLocks noGrp="1"/>
+          </p:cNvSpPr>
+          <p:nvPr>
+            <p:ph type="ftr" sz="quarter" idx="11"/>
+          </p:nvPr>
+        </p:nvSpPr>
+        <p:spPr>
+          <a:xfrm>
+            <a:off x="4165600" y="6356353"/>
+            <a:ext cx="3860800" cy="365125"/>
+          </a:xfrm>
+          <a:prstGeom prst="rect">
+            <a:avLst/>
+          </a:prstGeom>
+        </p:spPr>
+        <p:txBody>
+          <a:bodyPr/>
+          <a:lstStyle/>
+          <a:p>
+            <a:endParaRPr lang="en-US"/>
+          </a:p>
+        </p:txBody>
+      </p:sp>
+      <p:sp>
+        <p:nvSpPr>
+          <p:cNvPr id="15" name="Title 1">
             <a:extLst>
               <a:ext uri="{FF2B5EF4-FFF2-40B4-BE49-F238E27FC236}">
-                <a16:creationId xmlns:a16="http://schemas.microsoft.com/office/drawing/2014/main" id="{549C796D-2640-4911-8C87-3655A6CECBE5}"/>
+                <a16:creationId xmlns:a16="http://schemas.microsoft.com/office/drawing/2014/main" id="{FF0B0DC7-AAE0-4DD0-B6A3-68117DEBAEC5}"/>
               </a:ext>
             </a:extLst>
           </p:cNvPr>
@@ -926,24 +1645,35 @@
             <a:spLocks noGrp="1"/>
           </p:cNvSpPr>
           <p:nvPr>
-            <p:ph type="ftr" sz="quarter" idx="11"/>
+            <p:ph type="title"/>
           </p:nvPr>
         </p:nvSpPr>
-        <p:spPr/>
+        <p:spPr>
+          <a:xfrm>
+            <a:off x="838200" y="365125"/>
+            <a:ext cx="10515600" cy="1325563"/>
+          </a:xfrm>
+          <a:prstGeom prst="rect">
+            <a:avLst/>
+          </a:prstGeom>
+        </p:spPr>
         <p:txBody>
           <a:bodyPr/>
           <a:lstStyle/>
           <a:p>
-            <a:endParaRPr lang="en-US"/>
+            <a:r>
+              <a:rPr lang="en-US"/>
+              <a:t>Click to edit Master title style</a:t>
+            </a:r>
           </a:p>
         </p:txBody>
       </p:sp>
       <p:sp>
         <p:nvSpPr>
-          <p:cNvPr id="6" name="Slide Number Placeholder 5">
+          <p:cNvPr id="16" name="Content Placeholder 2">
             <a:extLst>
               <a:ext uri="{FF2B5EF4-FFF2-40B4-BE49-F238E27FC236}">
-                <a16:creationId xmlns:a16="http://schemas.microsoft.com/office/drawing/2014/main" id="{2F29BE62-BACD-459D-BDC5-E65A3FB46E27}"/>
+                <a16:creationId xmlns:a16="http://schemas.microsoft.com/office/drawing/2014/main" id="{940E374D-872C-4CBB-BACF-5E43E0A34D45}"/>
               </a:ext>
             </a:extLst>
           </p:cNvPr>
@@ -951,26 +1681,62 @@
             <a:spLocks noGrp="1"/>
           </p:cNvSpPr>
           <p:nvPr>
-            <p:ph type="sldNum" sz="quarter" idx="12"/>
+            <p:ph idx="1"/>
           </p:nvPr>
         </p:nvSpPr>
-        <p:spPr/>
+        <p:spPr>
+          <a:xfrm>
+            <a:off x="838200" y="1825625"/>
+            <a:ext cx="10515600" cy="4351338"/>
+          </a:xfrm>
+          <a:prstGeom prst="rect">
+            <a:avLst/>
+          </a:prstGeom>
+        </p:spPr>
         <p:txBody>
           <a:bodyPr/>
           <a:lstStyle/>
           <a:p>
-            <a:fld id="{DAE21BBA-8137-4F87-A1AB-9B87866F9985}" type="slidenum">
-              <a:rPr lang="en-US" smtClean="0"/>
-              <a:t>‹#›</a:t>
-            </a:fld>
-            <a:endParaRPr lang="en-US"/>
+            <a:pPr lvl="0"/>
+            <a:r>
+              <a:rPr lang="en-US" dirty="0"/>
+              <a:t>Click to edit Master text styles</a:t>
+            </a:r>
+          </a:p>
+          <a:p>
+            <a:pPr lvl="1"/>
+            <a:r>
+              <a:rPr lang="en-US" dirty="0"/>
+              <a:t>Second level</a:t>
+            </a:r>
+          </a:p>
+          <a:p>
+            <a:pPr lvl="2"/>
+            <a:r>
+              <a:rPr lang="en-US" dirty="0"/>
+              <a:t>Third level</a:t>
+            </a:r>
+          </a:p>
+          <a:p>
+            <a:pPr lvl="3"/>
+            <a:r>
+              <a:rPr lang="en-US" dirty="0"/>
+              <a:t>Fourth level</a:t>
+            </a:r>
+          </a:p>
+          <a:p>
+            <a:pPr lvl="4"/>
+            <a:r>
+              <a:rPr lang="en-US" dirty="0"/>
+              <a:t>Fifth level</a:t>
+            </a:r>
           </a:p>
         </p:txBody>
       </p:sp>
     </p:spTree>
     <p:extLst>
       <p:ext uri="{BB962C8B-B14F-4D97-AF65-F5344CB8AC3E}">
-        <p14:creationId xmlns:p14="http://schemas.microsoft.com/office/powerpoint/2010/main" val="3557124309"/>
+        <p14:creationId xmlns:p14="http://schemas.microsoft.com/office/powerpoint/2010/main" val="338346009"/>
       </p:ext>
     </p:extLst>
   </p:cSld>
@@ -981,7 +1747,7 @@
 </file>
 
 <file path=ppt/slideLayouts/slideLayout3.xml><?xml version="1.0" encoding="utf-8"?>
-<p:sldLayout xmlns:a="http://schemas.openxmlformats.org/drawingml/2006/main" xmlns:r="http://schemas.openxmlformats.org/officeDocument/2006/relationships" xmlns:p="http://schemas.openxmlformats.org/presentationml/2006/main" type="secHead" preserve="1">
+<p:sldLayout xmlns:a="http://schemas.openxmlformats.org/drawingml/2006/main" xmlns:r="http://schemas.openxmlformats.org/officeDocument/2006/relationships" xmlns:p="http://schemas.openxmlformats.org/presentationml/2006/main" preserve="1" userDrawn="1">
   <p:cSld name="Section Header">
     <p:spTree>
       <p:nvGrpSpPr>
@@ -999,10 +1765,182 @@
       </p:grpSpPr>
       <p:sp>
         <p:nvSpPr>
-          <p:cNvPr id="2" name="Title 1">
+          <p:cNvPr id="3" name="Text Placeholder 2"/>
+          <p:cNvSpPr>
+            <a:spLocks noGrp="1"/>
+          </p:cNvSpPr>
+          <p:nvPr>
+            <p:ph type="body" idx="1"/>
+          </p:nvPr>
+        </p:nvSpPr>
+        <p:spPr>
+          <a:xfrm>
+            <a:off x="963084" y="2906713"/>
+            <a:ext cx="10363200" cy="1500187"/>
+          </a:xfrm>
+          <a:prstGeom prst="rect">
+            <a:avLst/>
+          </a:prstGeom>
+        </p:spPr>
+        <p:txBody>
+          <a:bodyPr anchor="b"/>
+          <a:lstStyle>
+            <a:lvl1pPr marL="0" indent="0">
+              <a:buNone/>
+              <a:defRPr sz="2000">
+                <a:solidFill>
+                  <a:schemeClr val="tx1">
+                    <a:tint val="75000"/>
+                  </a:schemeClr>
+                </a:solidFill>
+              </a:defRPr>
+            </a:lvl1pPr>
+            <a:lvl2pPr marL="457200" indent="0">
+              <a:buNone/>
+              <a:defRPr sz="1800">
+                <a:solidFill>
+                  <a:schemeClr val="tx1">
+                    <a:tint val="75000"/>
+                  </a:schemeClr>
+                </a:solidFill>
+              </a:defRPr>
+            </a:lvl2pPr>
+            <a:lvl3pPr marL="914400" indent="0">
+              <a:buNone/>
+              <a:defRPr sz="1600">
+                <a:solidFill>
+                  <a:schemeClr val="tx1">
+                    <a:tint val="75000"/>
+                  </a:schemeClr>
+                </a:solidFill>
+              </a:defRPr>
+            </a:lvl3pPr>
+            <a:lvl4pPr marL="1371600" indent="0">
+              <a:buNone/>
+              <a:defRPr sz="1400">
+                <a:solidFill>
+                  <a:schemeClr val="tx1">
+                    <a:tint val="75000"/>
+                  </a:schemeClr>
+                </a:solidFill>
+              </a:defRPr>
+            </a:lvl4pPr>
+            <a:lvl5pPr marL="1828800" indent="0">
+              <a:buNone/>
+              <a:defRPr sz="1400">
+                <a:solidFill>
+                  <a:schemeClr val="tx1">
+                    <a:tint val="75000"/>
+                  </a:schemeClr>
+                </a:solidFill>
+              </a:defRPr>
+            </a:lvl5pPr>
+            <a:lvl6pPr marL="2286000" indent="0">
+              <a:buNone/>
+              <a:defRPr sz="1400">
+                <a:solidFill>
+                  <a:schemeClr val="tx1">
+                    <a:tint val="75000"/>
+                  </a:schemeClr>
+                </a:solidFill>
+              </a:defRPr>
+            </a:lvl6pPr>
+            <a:lvl7pPr marL="2743200" indent="0">
+              <a:buNone/>
+              <a:defRPr sz="1400">
+                <a:solidFill>
+                  <a:schemeClr val="tx1">
+                    <a:tint val="75000"/>
+                  </a:schemeClr>
+                </a:solidFill>
+              </a:defRPr>
+            </a:lvl7pPr>
+            <a:lvl8pPr marL="3200400" indent="0">
+              <a:buNone/>
+              <a:defRPr sz="1400">
+                <a:solidFill>
+                  <a:schemeClr val="tx1">
+                    <a:tint val="75000"/>
+                  </a:schemeClr>
+                </a:solidFill>
+              </a:defRPr>
+            </a:lvl8pPr>
+            <a:lvl9pPr marL="3657600" indent="0">
+              <a:buNone/>
+              <a:defRPr sz="1400">
+                <a:solidFill>
+                  <a:schemeClr val="tx1">
+                    <a:tint val="75000"/>
+                  </a:schemeClr>
+                </a:solidFill>
+              </a:defRPr>
+            </a:lvl9pPr>
+          </a:lstStyle>
+          <a:p>
+            <a:pPr lvl="0"/>
+            <a:r>
+              <a:rPr lang="en-US" dirty="0"/>
+              <a:t>Click to edit Master text styles</a:t>
+            </a:r>
+          </a:p>
+        </p:txBody>
+      </p:sp>
+      <p:sp>
+        <p:nvSpPr>
+          <p:cNvPr id="4" name="Date Placeholder 3"/>
+          <p:cNvSpPr>
+            <a:spLocks noGrp="1"/>
+          </p:cNvSpPr>
+          <p:nvPr>
+            <p:ph type="dt" sz="half" idx="10"/>
+          </p:nvPr>
+        </p:nvSpPr>
+        <p:spPr/>
+        <p:txBody>
+          <a:bodyPr/>
+          <a:lstStyle/>
+          <a:p>
+            <a:fld id="{241EB5C9-1307-BA42-ABA2-0BC069CD8E7F}" type="datetimeFigureOut">
+              <a:rPr lang="en-US" smtClean="0"/>
+              <a:t>4/17/2020</a:t>
+            </a:fld>
+            <a:endParaRPr lang="en-US"/>
+          </a:p>
+        </p:txBody>
+      </p:sp>
+      <p:sp>
+        <p:nvSpPr>
+          <p:cNvPr id="5" name="Footer Placeholder 4"/>
+          <p:cNvSpPr>
+            <a:spLocks noGrp="1"/>
+          </p:cNvSpPr>
+          <p:nvPr>
+            <p:ph type="ftr" sz="quarter" idx="11"/>
+          </p:nvPr>
+        </p:nvSpPr>
+        <p:spPr>
+          <a:xfrm>
+            <a:off x="4165600" y="6356353"/>
+            <a:ext cx="3860800" cy="365125"/>
+          </a:xfrm>
+          <a:prstGeom prst="rect">
+            <a:avLst/>
+          </a:prstGeom>
+        </p:spPr>
+        <p:txBody>
+          <a:bodyPr/>
+          <a:lstStyle/>
+          <a:p>
+            <a:endParaRPr lang="en-US"/>
+          </a:p>
+        </p:txBody>
+      </p:sp>
+      <p:sp>
+        <p:nvSpPr>
+          <p:cNvPr id="8" name="Title 7">
             <a:extLst>
               <a:ext uri="{FF2B5EF4-FFF2-40B4-BE49-F238E27FC236}">
-                <a16:creationId xmlns:a16="http://schemas.microsoft.com/office/drawing/2014/main" id="{E290AB09-2C98-4573-A895-FB1925BF9C64}"/>
+                <a16:creationId xmlns:a16="http://schemas.microsoft.com/office/drawing/2014/main" id="{0F51186D-E076-4056-9C34-68B2F7BAFB24}"/>
               </a:ext>
             </a:extLst>
           </p:cNvPr>
@@ -1015,237 +1953,28 @@
         </p:nvSpPr>
         <p:spPr>
           <a:xfrm>
-            <a:off x="831850" y="1709738"/>
-            <a:ext cx="10515600" cy="2852737"/>
+            <a:off x="838200" y="365125"/>
+            <a:ext cx="10515600" cy="1325563"/>
           </a:xfrm>
-        </p:spPr>
-        <p:txBody>
-          <a:bodyPr anchor="b"/>
-          <a:lstStyle>
-            <a:lvl1pPr>
-              <a:defRPr sz="6000"/>
-            </a:lvl1pPr>
-          </a:lstStyle>
-          <a:p>
-            <a:r>
-              <a:rPr lang="en-US"/>
-              <a:t>Click to edit Master title style</a:t>
-            </a:r>
-          </a:p>
-        </p:txBody>
-      </p:sp>
-      <p:sp>
-        <p:nvSpPr>
-          <p:cNvPr id="3" name="Text Placeholder 2">
-            <a:extLst>
-              <a:ext uri="{FF2B5EF4-FFF2-40B4-BE49-F238E27FC236}">
-                <a16:creationId xmlns:a16="http://schemas.microsoft.com/office/drawing/2014/main" id="{6A305BFC-C101-4738-AF45-4F0A2257D298}"/>
-              </a:ext>
-            </a:extLst>
-          </p:cNvPr>
-          <p:cNvSpPr>
-            <a:spLocks noGrp="1"/>
-          </p:cNvSpPr>
-          <p:nvPr>
-            <p:ph type="body" idx="1"/>
-          </p:nvPr>
-        </p:nvSpPr>
-        <p:spPr>
-          <a:xfrm>
-            <a:off x="831850" y="4589463"/>
-            <a:ext cx="10515600" cy="1500187"/>
-          </a:xfrm>
+          <a:prstGeom prst="rect">
+            <a:avLst/>
+          </a:prstGeom>
         </p:spPr>
         <p:txBody>
           <a:bodyPr/>
-          <a:lstStyle>
-            <a:lvl1pPr marL="0" indent="0">
-              <a:buNone/>
-              <a:defRPr sz="2400">
-                <a:solidFill>
-                  <a:schemeClr val="tx1">
-                    <a:tint val="75000"/>
-                  </a:schemeClr>
-                </a:solidFill>
-              </a:defRPr>
-            </a:lvl1pPr>
-            <a:lvl2pPr marL="457200" indent="0">
-              <a:buNone/>
-              <a:defRPr sz="2000">
-                <a:solidFill>
-                  <a:schemeClr val="tx1">
-                    <a:tint val="75000"/>
-                  </a:schemeClr>
-                </a:solidFill>
-              </a:defRPr>
-            </a:lvl2pPr>
-            <a:lvl3pPr marL="914400" indent="0">
-              <a:buNone/>
-              <a:defRPr sz="1800">
-                <a:solidFill>
-                  <a:schemeClr val="tx1">
-                    <a:tint val="75000"/>
-                  </a:schemeClr>
-                </a:solidFill>
-              </a:defRPr>
-            </a:lvl3pPr>
-            <a:lvl4pPr marL="1371600" indent="0">
-              <a:buNone/>
-              <a:defRPr sz="1600">
-                <a:solidFill>
-                  <a:schemeClr val="tx1">
-                    <a:tint val="75000"/>
-                  </a:schemeClr>
-                </a:solidFill>
-              </a:defRPr>
-            </a:lvl4pPr>
-            <a:lvl5pPr marL="1828800" indent="0">
-              <a:buNone/>
-              <a:defRPr sz="1600">
-                <a:solidFill>
-                  <a:schemeClr val="tx1">
-                    <a:tint val="75000"/>
-                  </a:schemeClr>
-                </a:solidFill>
-              </a:defRPr>
-            </a:lvl5pPr>
-            <a:lvl6pPr marL="2286000" indent="0">
-              <a:buNone/>
-              <a:defRPr sz="1600">
-                <a:solidFill>
-                  <a:schemeClr val="tx1">
-                    <a:tint val="75000"/>
-                  </a:schemeClr>
-                </a:solidFill>
-              </a:defRPr>
-            </a:lvl6pPr>
-            <a:lvl7pPr marL="2743200" indent="0">
-              <a:buNone/>
-              <a:defRPr sz="1600">
-                <a:solidFill>
-                  <a:schemeClr val="tx1">
-                    <a:tint val="75000"/>
-                  </a:schemeClr>
-                </a:solidFill>
-              </a:defRPr>
-            </a:lvl7pPr>
-            <a:lvl8pPr marL="3200400" indent="0">
-              <a:buNone/>
-              <a:defRPr sz="1600">
-                <a:solidFill>
-                  <a:schemeClr val="tx1">
-                    <a:tint val="75000"/>
-                  </a:schemeClr>
-                </a:solidFill>
-              </a:defRPr>
-            </a:lvl8pPr>
-            <a:lvl9pPr marL="3657600" indent="0">
-              <a:buNone/>
-              <a:defRPr sz="1600">
-                <a:solidFill>
-                  <a:schemeClr val="tx1">
-                    <a:tint val="75000"/>
-                  </a:schemeClr>
-                </a:solidFill>
-              </a:defRPr>
-            </a:lvl9pPr>
-          </a:lstStyle>
-          <a:p>
-            <a:pPr lvl="0"/>
+          <a:lstStyle/>
+          <a:p>
             <a:r>
               <a:rPr lang="en-US"/>
-              <a:t>Click to edit Master text styles</a:t>
-            </a:r>
-          </a:p>
-        </p:txBody>
-      </p:sp>
-      <p:sp>
-        <p:nvSpPr>
-          <p:cNvPr id="4" name="Date Placeholder 3">
-            <a:extLst>
-              <a:ext uri="{FF2B5EF4-FFF2-40B4-BE49-F238E27FC236}">
-                <a16:creationId xmlns:a16="http://schemas.microsoft.com/office/drawing/2014/main" id="{BB9A1E1F-46D4-49A9-B5FA-BC5F387FF98B}"/>
-              </a:ext>
-            </a:extLst>
-          </p:cNvPr>
-          <p:cNvSpPr>
-            <a:spLocks noGrp="1"/>
-          </p:cNvSpPr>
-          <p:nvPr>
-            <p:ph type="dt" sz="half" idx="10"/>
-          </p:nvPr>
-        </p:nvSpPr>
-        <p:spPr/>
-        <p:txBody>
-          <a:bodyPr/>
-          <a:lstStyle/>
-          <a:p>
-            <a:fld id="{4036D906-24D5-4DAF-BF6E-4E33F265CDAD}" type="datetimeFigureOut">
-              <a:rPr lang="en-US" smtClean="0"/>
-              <a:t>4/15/2020</a:t>
-            </a:fld>
-            <a:endParaRPr lang="en-US"/>
-          </a:p>
-        </p:txBody>
-      </p:sp>
-      <p:sp>
-        <p:nvSpPr>
-          <p:cNvPr id="5" name="Footer Placeholder 4">
-            <a:extLst>
-              <a:ext uri="{FF2B5EF4-FFF2-40B4-BE49-F238E27FC236}">
-                <a16:creationId xmlns:a16="http://schemas.microsoft.com/office/drawing/2014/main" id="{3BAABD98-C291-4FCC-98D6-FDC982D81084}"/>
-              </a:ext>
-            </a:extLst>
-          </p:cNvPr>
-          <p:cNvSpPr>
-            <a:spLocks noGrp="1"/>
-          </p:cNvSpPr>
-          <p:nvPr>
-            <p:ph type="ftr" sz="quarter" idx="11"/>
-          </p:nvPr>
-        </p:nvSpPr>
-        <p:spPr/>
-        <p:txBody>
-          <a:bodyPr/>
-          <a:lstStyle/>
-          <a:p>
-            <a:endParaRPr lang="en-US"/>
-          </a:p>
-        </p:txBody>
-      </p:sp>
-      <p:sp>
-        <p:nvSpPr>
-          <p:cNvPr id="6" name="Slide Number Placeholder 5">
-            <a:extLst>
-              <a:ext uri="{FF2B5EF4-FFF2-40B4-BE49-F238E27FC236}">
-                <a16:creationId xmlns:a16="http://schemas.microsoft.com/office/drawing/2014/main" id="{2C9A628E-84E7-41FC-80C1-BA470916BBA1}"/>
-              </a:ext>
-            </a:extLst>
-          </p:cNvPr>
-          <p:cNvSpPr>
-            <a:spLocks noGrp="1"/>
-          </p:cNvSpPr>
-          <p:nvPr>
-            <p:ph type="sldNum" sz="quarter" idx="12"/>
-          </p:nvPr>
-        </p:nvSpPr>
-        <p:spPr/>
-        <p:txBody>
-          <a:bodyPr/>
-          <a:lstStyle/>
-          <a:p>
-            <a:fld id="{DAE21BBA-8137-4F87-A1AB-9B87866F9985}" type="slidenum">
-              <a:rPr lang="en-US" smtClean="0"/>
-              <a:t>‹#›</a:t>
-            </a:fld>
-            <a:endParaRPr lang="en-US"/>
+              <a:t>Click to edit Master title style</a:t>
+            </a:r>
           </a:p>
         </p:txBody>
       </p:sp>
     </p:spTree>
     <p:extLst>
       <p:ext uri="{BB962C8B-B14F-4D97-AF65-F5344CB8AC3E}">
-        <p14:creationId xmlns:p14="http://schemas.microsoft.com/office/powerpoint/2010/main" val="1740260479"/>
+        <p14:creationId xmlns:p14="http://schemas.microsoft.com/office/powerpoint/2010/main" val="1073069076"/>
       </p:ext>
     </p:extLst>
   </p:cSld>
@@ -1256,7 +1985,7 @@
 </file>
 
 <file path=ppt/slideLayouts/slideLayout4.xml><?xml version="1.0" encoding="utf-8"?>
-<p:sldLayout xmlns:a="http://schemas.openxmlformats.org/drawingml/2006/main" xmlns:r="http://schemas.openxmlformats.org/officeDocument/2006/relationships" xmlns:p="http://schemas.openxmlformats.org/presentationml/2006/main" type="twoObj" preserve="1">
+<p:sldLayout xmlns:a="http://schemas.openxmlformats.org/drawingml/2006/main" xmlns:r="http://schemas.openxmlformats.org/officeDocument/2006/relationships" xmlns:p="http://schemas.openxmlformats.org/presentationml/2006/main" preserve="1" userDrawn="1">
   <p:cSld name="Two Content">
     <p:spTree>
       <p:nvGrpSpPr>
@@ -1274,13 +2003,7 @@
       </p:grpSpPr>
       <p:sp>
         <p:nvSpPr>
-          <p:cNvPr id="2" name="Title 1">
-            <a:extLst>
-              <a:ext uri="{FF2B5EF4-FFF2-40B4-BE49-F238E27FC236}">
-                <a16:creationId xmlns:a16="http://schemas.microsoft.com/office/drawing/2014/main" id="{C10CD2DF-091B-4BFD-A3A5-9C7C3D49A3C8}"/>
-              </a:ext>
-            </a:extLst>
-          </p:cNvPr>
+          <p:cNvPr id="2" name="Title 1"/>
           <p:cNvSpPr>
             <a:spLocks noGrp="1"/>
           </p:cNvSpPr>
@@ -1288,13 +2011,29 @@
             <p:ph type="title"/>
           </p:nvPr>
         </p:nvSpPr>
-        <p:spPr/>
+        <p:spPr>
+          <a:xfrm>
+            <a:off x="609600" y="274638"/>
+            <a:ext cx="10972800" cy="1143000"/>
+          </a:xfrm>
+          <a:prstGeom prst="rect">
+            <a:avLst/>
+          </a:prstGeom>
+        </p:spPr>
         <p:txBody>
           <a:bodyPr/>
-          <a:lstStyle/>
-          <a:p>
-            <a:r>
-              <a:rPr lang="en-US"/>
+          <a:lstStyle>
+            <a:lvl1pPr>
+              <a:defRPr b="0">
+                <a:solidFill>
+                  <a:schemeClr val="tx1"/>
+                </a:solidFill>
+              </a:defRPr>
+            </a:lvl1pPr>
+          </a:lstStyle>
+          <a:p>
+            <a:r>
+              <a:rPr lang="en-US" dirty="0"/>
               <a:t>Click to edit Master title style</a:t>
             </a:r>
           </a:p>
@@ -1302,13 +2041,7 @@
       </p:sp>
       <p:sp>
         <p:nvSpPr>
-          <p:cNvPr id="3" name="Content Placeholder 2">
-            <a:extLst>
-              <a:ext uri="{FF2B5EF4-FFF2-40B4-BE49-F238E27FC236}">
-                <a16:creationId xmlns:a16="http://schemas.microsoft.com/office/drawing/2014/main" id="{044DF718-6EC7-4AF1-9BB4-13AE468DBD6C}"/>
-              </a:ext>
-            </a:extLst>
-          </p:cNvPr>
+          <p:cNvPr id="3" name="Content Placeholder 2"/>
           <p:cNvSpPr>
             <a:spLocks noGrp="1"/>
           </p:cNvSpPr>
@@ -1318,13 +2051,44 @@
         </p:nvSpPr>
         <p:spPr>
           <a:xfrm>
-            <a:off x="838200" y="1825625"/>
-            <a:ext cx="5181600" cy="4351338"/>
+            <a:off x="609600" y="1600203"/>
+            <a:ext cx="5384800" cy="4525963"/>
           </a:xfrm>
+          <a:prstGeom prst="rect">
+            <a:avLst/>
+          </a:prstGeom>
         </p:spPr>
         <p:txBody>
           <a:bodyPr/>
-          <a:lstStyle/>
+          <a:lstStyle>
+            <a:lvl1pPr>
+              <a:defRPr sz="2800"/>
+            </a:lvl1pPr>
+            <a:lvl2pPr>
+              <a:defRPr sz="2400"/>
+            </a:lvl2pPr>
+            <a:lvl3pPr>
+              <a:defRPr sz="2000"/>
+            </a:lvl3pPr>
+            <a:lvl4pPr>
+              <a:defRPr sz="1800"/>
+            </a:lvl4pPr>
+            <a:lvl5pPr>
+              <a:defRPr sz="1800"/>
+            </a:lvl5pPr>
+            <a:lvl6pPr>
+              <a:defRPr sz="1800"/>
+            </a:lvl6pPr>
+            <a:lvl7pPr>
+              <a:defRPr sz="1800"/>
+            </a:lvl7pPr>
+            <a:lvl8pPr>
+              <a:defRPr sz="1800"/>
+            </a:lvl8pPr>
+            <a:lvl9pPr>
+              <a:defRPr sz="1800"/>
+            </a:lvl9pPr>
+          </a:lstStyle>
           <a:p>
             <a:pPr lvl="0"/>
             <a:r>
@@ -1364,13 +2128,7 @@
       </p:sp>
       <p:sp>
         <p:nvSpPr>
-          <p:cNvPr id="4" name="Content Placeholder 3">
-            <a:extLst>
-              <a:ext uri="{FF2B5EF4-FFF2-40B4-BE49-F238E27FC236}">
-                <a16:creationId xmlns:a16="http://schemas.microsoft.com/office/drawing/2014/main" id="{3F41E853-CC1C-41BF-8809-C50760C1F64B}"/>
-              </a:ext>
-            </a:extLst>
-          </p:cNvPr>
+          <p:cNvPr id="4" name="Content Placeholder 3"/>
           <p:cNvSpPr>
             <a:spLocks noGrp="1"/>
           </p:cNvSpPr>
@@ -1380,13 +2138,44 @@
         </p:nvSpPr>
         <p:spPr>
           <a:xfrm>
-            <a:off x="6172200" y="1825625"/>
-            <a:ext cx="5181600" cy="4351338"/>
+            <a:off x="6197600" y="1600203"/>
+            <a:ext cx="5384800" cy="4525963"/>
           </a:xfrm>
+          <a:prstGeom prst="rect">
+            <a:avLst/>
+          </a:prstGeom>
         </p:spPr>
         <p:txBody>
           <a:bodyPr/>
-          <a:lstStyle/>
+          <a:lstStyle>
+            <a:lvl1pPr>
+              <a:defRPr sz="2800"/>
+            </a:lvl1pPr>
+            <a:lvl2pPr>
+              <a:defRPr sz="2400"/>
+            </a:lvl2pPr>
+            <a:lvl3pPr>
+              <a:defRPr sz="2000"/>
+            </a:lvl3pPr>
+            <a:lvl4pPr>
+              <a:defRPr sz="1800"/>
+            </a:lvl4pPr>
+            <a:lvl5pPr>
+              <a:defRPr sz="1800"/>
+            </a:lvl5pPr>
+            <a:lvl6pPr>
+              <a:defRPr sz="1800"/>
+            </a:lvl6pPr>
+            <a:lvl7pPr>
+              <a:defRPr sz="1800"/>
+            </a:lvl7pPr>
+            <a:lvl8pPr>
+              <a:defRPr sz="1800"/>
+            </a:lvl8pPr>
+            <a:lvl9pPr>
+              <a:defRPr sz="1800"/>
+            </a:lvl9pPr>
+          </a:lstStyle>
           <a:p>
             <a:pPr lvl="0"/>
             <a:r>
@@ -1426,13 +2215,7 @@
       </p:sp>
       <p:sp>
         <p:nvSpPr>
-          <p:cNvPr id="5" name="Date Placeholder 4">
-            <a:extLst>
-              <a:ext uri="{FF2B5EF4-FFF2-40B4-BE49-F238E27FC236}">
-                <a16:creationId xmlns:a16="http://schemas.microsoft.com/office/drawing/2014/main" id="{5993885C-A39C-43EE-8074-AB3804F6036F}"/>
-              </a:ext>
-            </a:extLst>
-          </p:cNvPr>
+          <p:cNvPr id="5" name="Date Placeholder 4"/>
           <p:cNvSpPr>
             <a:spLocks noGrp="1"/>
           </p:cNvSpPr>
@@ -1445,9 +2228,9 @@
           <a:bodyPr/>
           <a:lstStyle/>
           <a:p>
-            <a:fld id="{4036D906-24D5-4DAF-BF6E-4E33F265CDAD}" type="datetimeFigureOut">
+            <a:fld id="{241EB5C9-1307-BA42-ABA2-0BC069CD8E7F}" type="datetimeFigureOut">
               <a:rPr lang="en-US" smtClean="0"/>
-              <a:t>4/15/2020</a:t>
+              <a:t>4/17/2020</a:t>
             </a:fld>
             <a:endParaRPr lang="en-US"/>
           </a:p>
@@ -1455,13 +2238,7 @@
       </p:sp>
       <p:sp>
         <p:nvSpPr>
-          <p:cNvPr id="6" name="Footer Placeholder 5">
-            <a:extLst>
-              <a:ext uri="{FF2B5EF4-FFF2-40B4-BE49-F238E27FC236}">
-                <a16:creationId xmlns:a16="http://schemas.microsoft.com/office/drawing/2014/main" id="{8F8364AF-D93B-433B-AD86-4C38E5B8BF9A}"/>
-              </a:ext>
-            </a:extLst>
-          </p:cNvPr>
+          <p:cNvPr id="6" name="Footer Placeholder 5"/>
           <p:cNvSpPr>
             <a:spLocks noGrp="1"/>
           </p:cNvSpPr>
@@ -1469,40 +2246,19 @@
             <p:ph type="ftr" sz="quarter" idx="11"/>
           </p:nvPr>
         </p:nvSpPr>
-        <p:spPr/>
+        <p:spPr>
+          <a:xfrm>
+            <a:off x="4165600" y="6356353"/>
+            <a:ext cx="3860800" cy="365125"/>
+          </a:xfrm>
+          <a:prstGeom prst="rect">
+            <a:avLst/>
+          </a:prstGeom>
+        </p:spPr>
         <p:txBody>
           <a:bodyPr/>
           <a:lstStyle/>
           <a:p>
-            <a:endParaRPr lang="en-US"/>
-          </a:p>
-        </p:txBody>
-      </p:sp>
-      <p:sp>
-        <p:nvSpPr>
-          <p:cNvPr id="7" name="Slide Number Placeholder 6">
-            <a:extLst>
-              <a:ext uri="{FF2B5EF4-FFF2-40B4-BE49-F238E27FC236}">
-                <a16:creationId xmlns:a16="http://schemas.microsoft.com/office/drawing/2014/main" id="{C4161FFD-1589-444A-8C52-062CC48E6FB3}"/>
-              </a:ext>
-            </a:extLst>
-          </p:cNvPr>
-          <p:cNvSpPr>
-            <a:spLocks noGrp="1"/>
-          </p:cNvSpPr>
-          <p:nvPr>
-            <p:ph type="sldNum" sz="quarter" idx="12"/>
-          </p:nvPr>
-        </p:nvSpPr>
-        <p:spPr/>
-        <p:txBody>
-          <a:bodyPr/>
-          <a:lstStyle/>
-          <a:p>
-            <a:fld id="{DAE21BBA-8137-4F87-A1AB-9B87866F9985}" type="slidenum">
-              <a:rPr lang="en-US" smtClean="0"/>
-              <a:t>‹#›</a:t>
-            </a:fld>
             <a:endParaRPr lang="en-US"/>
           </a:p>
         </p:txBody>
@@ -1510,7 +2266,7 @@
     </p:spTree>
     <p:extLst>
       <p:ext uri="{BB962C8B-B14F-4D97-AF65-F5344CB8AC3E}">
-        <p14:creationId xmlns:p14="http://schemas.microsoft.com/office/powerpoint/2010/main" val="2206736105"/>
+        <p14:creationId xmlns:p14="http://schemas.microsoft.com/office/powerpoint/2010/main" val="2619886245"/>
       </p:ext>
     </p:extLst>
   </p:cSld>
@@ -1539,13 +2295,7 @@
       </p:grpSpPr>
       <p:sp>
         <p:nvSpPr>
-          <p:cNvPr id="2" name="Title 1">
-            <a:extLst>
-              <a:ext uri="{FF2B5EF4-FFF2-40B4-BE49-F238E27FC236}">
-                <a16:creationId xmlns:a16="http://schemas.microsoft.com/office/drawing/2014/main" id="{4C3E41E3-E843-4EF5-8DFC-791B8CC84C23}"/>
-              </a:ext>
-            </a:extLst>
-          </p:cNvPr>
+          <p:cNvPr id="2" name="Title 1"/>
           <p:cNvSpPr>
             <a:spLocks noGrp="1"/>
           </p:cNvSpPr>
@@ -1553,32 +2303,26 @@
             <p:ph type="title"/>
           </p:nvPr>
         </p:nvSpPr>
-        <p:spPr>
-          <a:xfrm>
-            <a:off x="839788" y="365125"/>
-            <a:ext cx="10515600" cy="1325563"/>
-          </a:xfrm>
-        </p:spPr>
+        <p:spPr/>
         <p:txBody>
           <a:bodyPr/>
-          <a:lstStyle/>
-          <a:p>
-            <a:r>
-              <a:rPr lang="en-US"/>
+          <a:lstStyle>
+            <a:lvl1pPr>
+              <a:defRPr/>
+            </a:lvl1pPr>
+          </a:lstStyle>
+          <a:p>
+            <a:r>
+              <a:rPr lang="en-US" smtClean="0"/>
               <a:t>Click to edit Master title style</a:t>
             </a:r>
+            <a:endParaRPr lang="en-US"/>
           </a:p>
         </p:txBody>
       </p:sp>
       <p:sp>
         <p:nvSpPr>
-          <p:cNvPr id="3" name="Text Placeholder 2">
-            <a:extLst>
-              <a:ext uri="{FF2B5EF4-FFF2-40B4-BE49-F238E27FC236}">
-                <a16:creationId xmlns:a16="http://schemas.microsoft.com/office/drawing/2014/main" id="{3E0AF130-11A5-4C9C-B503-F8AB34B9EDE1}"/>
-              </a:ext>
-            </a:extLst>
-          </p:cNvPr>
+          <p:cNvPr id="3" name="Text Placeholder 2"/>
           <p:cNvSpPr>
             <a:spLocks noGrp="1"/>
           </p:cNvSpPr>
@@ -1588,8 +2332,8 @@
         </p:nvSpPr>
         <p:spPr>
           <a:xfrm>
-            <a:off x="839788" y="1681163"/>
-            <a:ext cx="5157787" cy="823912"/>
+            <a:off x="457200" y="1535113"/>
+            <a:ext cx="4040188" cy="639762"/>
           </a:xfrm>
         </p:spPr>
         <p:txBody>
@@ -1635,7 +2379,7 @@
           <a:p>
             <a:pPr lvl="0"/>
             <a:r>
-              <a:rPr lang="en-US"/>
+              <a:rPr lang="en-US" smtClean="0"/>
               <a:t>Click to edit Master text styles</a:t>
             </a:r>
           </a:p>
@@ -1643,13 +2387,7 @@
       </p:sp>
       <p:sp>
         <p:nvSpPr>
-          <p:cNvPr id="4" name="Content Placeholder 3">
-            <a:extLst>
-              <a:ext uri="{FF2B5EF4-FFF2-40B4-BE49-F238E27FC236}">
-                <a16:creationId xmlns:a16="http://schemas.microsoft.com/office/drawing/2014/main" id="{8D48FF00-12A6-451B-A6C8-2C9A29B6A1EE}"/>
-              </a:ext>
-            </a:extLst>
-          </p:cNvPr>
+          <p:cNvPr id="4" name="Content Placeholder 3"/>
           <p:cNvSpPr>
             <a:spLocks noGrp="1"/>
           </p:cNvSpPr>
@@ -1659,59 +2397,82 @@
         </p:nvSpPr>
         <p:spPr>
           <a:xfrm>
-            <a:off x="839788" y="2505075"/>
-            <a:ext cx="5157787" cy="3684588"/>
+            <a:off x="457200" y="2174875"/>
+            <a:ext cx="4040188" cy="3951288"/>
           </a:xfrm>
         </p:spPr>
         <p:txBody>
           <a:bodyPr/>
-          <a:lstStyle/>
+          <a:lstStyle>
+            <a:lvl1pPr>
+              <a:defRPr sz="2400"/>
+            </a:lvl1pPr>
+            <a:lvl2pPr>
+              <a:defRPr sz="2000"/>
+            </a:lvl2pPr>
+            <a:lvl3pPr>
+              <a:defRPr sz="1800"/>
+            </a:lvl3pPr>
+            <a:lvl4pPr>
+              <a:defRPr sz="1600"/>
+            </a:lvl4pPr>
+            <a:lvl5pPr>
+              <a:defRPr sz="1600"/>
+            </a:lvl5pPr>
+            <a:lvl6pPr>
+              <a:defRPr sz="1600"/>
+            </a:lvl6pPr>
+            <a:lvl7pPr>
+              <a:defRPr sz="1600"/>
+            </a:lvl7pPr>
+            <a:lvl8pPr>
+              <a:defRPr sz="1600"/>
+            </a:lvl8pPr>
+            <a:lvl9pPr>
+              <a:defRPr sz="1600"/>
+            </a:lvl9pPr>
+          </a:lstStyle>
           <a:p>
             <a:pPr lvl="0"/>
             <a:r>
-              <a:rPr lang="en-US"/>
+              <a:rPr lang="en-US" smtClean="0"/>
               <a:t>Click to edit Master text styles</a:t>
             </a:r>
           </a:p>
           <a:p>
             <a:pPr lvl="1"/>
             <a:r>
-              <a:rPr lang="en-US"/>
+              <a:rPr lang="en-US" smtClean="0"/>
               <a:t>Second level</a:t>
             </a:r>
           </a:p>
           <a:p>
             <a:pPr lvl="2"/>
             <a:r>
-              <a:rPr lang="en-US"/>
+              <a:rPr lang="en-US" smtClean="0"/>
               <a:t>Third level</a:t>
             </a:r>
           </a:p>
           <a:p>
             <a:pPr lvl="3"/>
             <a:r>
-              <a:rPr lang="en-US"/>
+              <a:rPr lang="en-US" smtClean="0"/>
               <a:t>Fourth level</a:t>
             </a:r>
           </a:p>
           <a:p>
             <a:pPr lvl="4"/>
             <a:r>
-              <a:rPr lang="en-US"/>
+              <a:rPr lang="en-US" smtClean="0"/>
               <a:t>Fifth level</a:t>
             </a:r>
+            <a:endParaRPr lang="en-US"/>
           </a:p>
         </p:txBody>
       </p:sp>
       <p:sp>
         <p:nvSpPr>
-          <p:cNvPr id="5" name="Text Placeholder 4">
-            <a:extLst>
-              <a:ext uri="{FF2B5EF4-FFF2-40B4-BE49-F238E27FC236}">
-                <a16:creationId xmlns:a16="http://schemas.microsoft.com/office/drawing/2014/main" id="{F9BB9F16-2547-448A-BAFE-26BE42836866}"/>
-              </a:ext>
-            </a:extLst>
-          </p:cNvPr>
+          <p:cNvPr id="5" name="Text Placeholder 4"/>
           <p:cNvSpPr>
             <a:spLocks noGrp="1"/>
           </p:cNvSpPr>
@@ -1721,8 +2482,8 @@
         </p:nvSpPr>
         <p:spPr>
           <a:xfrm>
-            <a:off x="6172200" y="1681163"/>
-            <a:ext cx="5183188" cy="823912"/>
+            <a:off x="4645025" y="1535113"/>
+            <a:ext cx="4041775" cy="639762"/>
           </a:xfrm>
         </p:spPr>
         <p:txBody>
@@ -1768,7 +2529,7 @@
           <a:p>
             <a:pPr lvl="0"/>
             <a:r>
-              <a:rPr lang="en-US"/>
+              <a:rPr lang="en-US" smtClean="0"/>
               <a:t>Click to edit Master text styles</a:t>
             </a:r>
           </a:p>
@@ -1776,13 +2537,7 @@
       </p:sp>
       <p:sp>
         <p:nvSpPr>
-          <p:cNvPr id="6" name="Content Placeholder 5">
-            <a:extLst>
-              <a:ext uri="{FF2B5EF4-FFF2-40B4-BE49-F238E27FC236}">
-                <a16:creationId xmlns:a16="http://schemas.microsoft.com/office/drawing/2014/main" id="{F2ED34B2-A291-4EC0-8FAA-114642479203}"/>
-              </a:ext>
-            </a:extLst>
-          </p:cNvPr>
+          <p:cNvPr id="6" name="Content Placeholder 5"/>
           <p:cNvSpPr>
             <a:spLocks noGrp="1"/>
           </p:cNvSpPr>
@@ -1792,59 +2547,82 @@
         </p:nvSpPr>
         <p:spPr>
           <a:xfrm>
-            <a:off x="6172200" y="2505075"/>
-            <a:ext cx="5183188" cy="3684588"/>
+            <a:off x="4645025" y="2174875"/>
+            <a:ext cx="4041775" cy="3951288"/>
           </a:xfrm>
         </p:spPr>
         <p:txBody>
           <a:bodyPr/>
-          <a:lstStyle/>
+          <a:lstStyle>
+            <a:lvl1pPr>
+              <a:defRPr sz="2400"/>
+            </a:lvl1pPr>
+            <a:lvl2pPr>
+              <a:defRPr sz="2000"/>
+            </a:lvl2pPr>
+            <a:lvl3pPr>
+              <a:defRPr sz="1800"/>
+            </a:lvl3pPr>
+            <a:lvl4pPr>
+              <a:defRPr sz="1600"/>
+            </a:lvl4pPr>
+            <a:lvl5pPr>
+              <a:defRPr sz="1600"/>
+            </a:lvl5pPr>
+            <a:lvl6pPr>
+              <a:defRPr sz="1600"/>
+            </a:lvl6pPr>
+            <a:lvl7pPr>
+              <a:defRPr sz="1600"/>
+            </a:lvl7pPr>
+            <a:lvl8pPr>
+              <a:defRPr sz="1600"/>
+            </a:lvl8pPr>
+            <a:lvl9pPr>
+              <a:defRPr sz="1600"/>
+            </a:lvl9pPr>
+          </a:lstStyle>
           <a:p>
             <a:pPr lvl="0"/>
             <a:r>
-              <a:rPr lang="en-US"/>
+              <a:rPr lang="en-US" smtClean="0"/>
               <a:t>Click to edit Master text styles</a:t>
             </a:r>
           </a:p>
           <a:p>
             <a:pPr lvl="1"/>
             <a:r>
-              <a:rPr lang="en-US"/>
+              <a:rPr lang="en-US" smtClean="0"/>
               <a:t>Second level</a:t>
             </a:r>
           </a:p>
           <a:p>
             <a:pPr lvl="2"/>
             <a:r>
-              <a:rPr lang="en-US"/>
+              <a:rPr lang="en-US" smtClean="0"/>
               <a:t>Third level</a:t>
             </a:r>
           </a:p>
           <a:p>
             <a:pPr lvl="3"/>
             <a:r>
-              <a:rPr lang="en-US"/>
+              <a:rPr lang="en-US" smtClean="0"/>
               <a:t>Fourth level</a:t>
             </a:r>
           </a:p>
           <a:p>
             <a:pPr lvl="4"/>
             <a:r>
-              <a:rPr lang="en-US"/>
+              <a:rPr lang="en-US" smtClean="0"/>
               <a:t>Fifth level</a:t>
             </a:r>
+            <a:endParaRPr lang="en-US"/>
           </a:p>
         </p:txBody>
       </p:sp>
       <p:sp>
         <p:nvSpPr>
-          <p:cNvPr id="7" name="Date Placeholder 6">
-            <a:extLst>
-              <a:ext uri="{FF2B5EF4-FFF2-40B4-BE49-F238E27FC236}">
-                <a16:creationId xmlns:a16="http://schemas.microsoft.com/office/drawing/2014/main" id="{5EADE943-F013-4317-83A4-3E543BB381B1}"/>
-              </a:ext>
-            </a:extLst>
-          </p:cNvPr>
+          <p:cNvPr id="7" name="Date Placeholder 6"/>
           <p:cNvSpPr>
             <a:spLocks noGrp="1"/>
           </p:cNvSpPr>
@@ -1857,9 +2635,9 @@
           <a:bodyPr/>
           <a:lstStyle/>
           <a:p>
-            <a:fld id="{4036D906-24D5-4DAF-BF6E-4E33F265CDAD}" type="datetimeFigureOut">
+            <a:fld id="{241EB5C9-1307-BA42-ABA2-0BC069CD8E7F}" type="datetimeFigureOut">
               <a:rPr lang="en-US" smtClean="0"/>
-              <a:t>4/15/2020</a:t>
+              <a:t>2/17/2018</a:t>
             </a:fld>
             <a:endParaRPr lang="en-US"/>
           </a:p>
@@ -1867,13 +2645,7 @@
       </p:sp>
       <p:sp>
         <p:nvSpPr>
-          <p:cNvPr id="8" name="Footer Placeholder 7">
-            <a:extLst>
-              <a:ext uri="{FF2B5EF4-FFF2-40B4-BE49-F238E27FC236}">
-                <a16:creationId xmlns:a16="http://schemas.microsoft.com/office/drawing/2014/main" id="{33DAF762-B7BB-4693-B168-3D61177FF107}"/>
-              </a:ext>
-            </a:extLst>
-          </p:cNvPr>
+          <p:cNvPr id="8" name="Footer Placeholder 7"/>
           <p:cNvSpPr>
             <a:spLocks noGrp="1"/>
           </p:cNvSpPr>
@@ -1892,13 +2664,7 @@
       </p:sp>
       <p:sp>
         <p:nvSpPr>
-          <p:cNvPr id="9" name="Slide Number Placeholder 8">
-            <a:extLst>
-              <a:ext uri="{FF2B5EF4-FFF2-40B4-BE49-F238E27FC236}">
-                <a16:creationId xmlns:a16="http://schemas.microsoft.com/office/drawing/2014/main" id="{B276E463-CA8E-4A4B-B25C-1BCFC88A0974}"/>
-              </a:ext>
-            </a:extLst>
-          </p:cNvPr>
+          <p:cNvPr id="9" name="Slide Number Placeholder 8"/>
           <p:cNvSpPr>
             <a:spLocks noGrp="1"/>
           </p:cNvSpPr>
@@ -1911,7 +2677,7 @@
           <a:bodyPr/>
           <a:lstStyle/>
           <a:p>
-            <a:fld id="{DAE21BBA-8137-4F87-A1AB-9B87866F9985}" type="slidenum">
+            <a:fld id="{C5EF2332-01BF-834F-8236-50238282D533}" type="slidenum">
               <a:rPr lang="en-US" smtClean="0"/>
               <a:t>‹#›</a:t>
             </a:fld>
@@ -1922,7 +2688,7 @@
     </p:spTree>
     <p:extLst>
       <p:ext uri="{BB962C8B-B14F-4D97-AF65-F5344CB8AC3E}">
-        <p14:creationId xmlns:p14="http://schemas.microsoft.com/office/powerpoint/2010/main" val="1681009278"/>
+        <p14:creationId xmlns:p14="http://schemas.microsoft.com/office/powerpoint/2010/main" val="2535793967"/>
       </p:ext>
     </p:extLst>
   </p:cSld>
@@ -1951,13 +2717,7 @@
       </p:grpSpPr>
       <p:sp>
         <p:nvSpPr>
-          <p:cNvPr id="2" name="Title 1">
-            <a:extLst>
-              <a:ext uri="{FF2B5EF4-FFF2-40B4-BE49-F238E27FC236}">
-                <a16:creationId xmlns:a16="http://schemas.microsoft.com/office/drawing/2014/main" id="{00C22694-B1A9-4E0D-AAA9-B1666C4B4D63}"/>
-              </a:ext>
-            </a:extLst>
-          </p:cNvPr>
+          <p:cNvPr id="2" name="Title 1"/>
           <p:cNvSpPr>
             <a:spLocks noGrp="1"/>
           </p:cNvSpPr>
@@ -1971,21 +2731,16 @@
           <a:lstStyle/>
           <a:p>
             <a:r>
-              <a:rPr lang="en-US"/>
+              <a:rPr lang="en-US" smtClean="0"/>
               <a:t>Click to edit Master title style</a:t>
             </a:r>
+            <a:endParaRPr lang="en-US"/>
           </a:p>
         </p:txBody>
       </p:sp>
       <p:sp>
         <p:nvSpPr>
-          <p:cNvPr id="3" name="Date Placeholder 2">
-            <a:extLst>
-              <a:ext uri="{FF2B5EF4-FFF2-40B4-BE49-F238E27FC236}">
-                <a16:creationId xmlns:a16="http://schemas.microsoft.com/office/drawing/2014/main" id="{627E9E9B-D465-4A9A-B63E-0927E2E5C7BD}"/>
-              </a:ext>
-            </a:extLst>
-          </p:cNvPr>
+          <p:cNvPr id="3" name="Date Placeholder 2"/>
           <p:cNvSpPr>
             <a:spLocks noGrp="1"/>
           </p:cNvSpPr>
@@ -1998,9 +2753,9 @@
           <a:bodyPr/>
           <a:lstStyle/>
           <a:p>
-            <a:fld id="{4036D906-24D5-4DAF-BF6E-4E33F265CDAD}" type="datetimeFigureOut">
+            <a:fld id="{241EB5C9-1307-BA42-ABA2-0BC069CD8E7F}" type="datetimeFigureOut">
               <a:rPr lang="en-US" smtClean="0"/>
-              <a:t>4/15/2020</a:t>
+              <a:t>2/17/2018</a:t>
             </a:fld>
             <a:endParaRPr lang="en-US"/>
           </a:p>
@@ -2008,13 +2763,7 @@
       </p:sp>
       <p:sp>
         <p:nvSpPr>
-          <p:cNvPr id="4" name="Footer Placeholder 3">
-            <a:extLst>
-              <a:ext uri="{FF2B5EF4-FFF2-40B4-BE49-F238E27FC236}">
-                <a16:creationId xmlns:a16="http://schemas.microsoft.com/office/drawing/2014/main" id="{7A0078BE-6808-44E1-9E56-0CEFF4247042}"/>
-              </a:ext>
-            </a:extLst>
-          </p:cNvPr>
+          <p:cNvPr id="4" name="Footer Placeholder 3"/>
           <p:cNvSpPr>
             <a:spLocks noGrp="1"/>
           </p:cNvSpPr>
@@ -2033,13 +2782,7 @@
       </p:sp>
       <p:sp>
         <p:nvSpPr>
-          <p:cNvPr id="5" name="Slide Number Placeholder 4">
-            <a:extLst>
-              <a:ext uri="{FF2B5EF4-FFF2-40B4-BE49-F238E27FC236}">
-                <a16:creationId xmlns:a16="http://schemas.microsoft.com/office/drawing/2014/main" id="{CC0A4FB7-1BAC-4C1F-AF1E-7F8CCFBF7ECA}"/>
-              </a:ext>
-            </a:extLst>
-          </p:cNvPr>
+          <p:cNvPr id="5" name="Slide Number Placeholder 4"/>
           <p:cNvSpPr>
             <a:spLocks noGrp="1"/>
           </p:cNvSpPr>
@@ -2052,7 +2795,7 @@
           <a:bodyPr/>
           <a:lstStyle/>
           <a:p>
-            <a:fld id="{DAE21BBA-8137-4F87-A1AB-9B87866F9985}" type="slidenum">
+            <a:fld id="{C5EF2332-01BF-834F-8236-50238282D533}" type="slidenum">
               <a:rPr lang="en-US" smtClean="0"/>
               <a:t>‹#›</a:t>
             </a:fld>
@@ -2063,7 +2806,7 @@
     </p:spTree>
     <p:extLst>
       <p:ext uri="{BB962C8B-B14F-4D97-AF65-F5344CB8AC3E}">
-        <p14:creationId xmlns:p14="http://schemas.microsoft.com/office/powerpoint/2010/main" val="512686434"/>
+        <p14:creationId xmlns:p14="http://schemas.microsoft.com/office/powerpoint/2010/main" val="3472721253"/>
       </p:ext>
     </p:extLst>
   </p:cSld>
@@ -2092,13 +2835,7 @@
       </p:grpSpPr>
       <p:sp>
         <p:nvSpPr>
-          <p:cNvPr id="2" name="Date Placeholder 1">
-            <a:extLst>
-              <a:ext uri="{FF2B5EF4-FFF2-40B4-BE49-F238E27FC236}">
-                <a16:creationId xmlns:a16="http://schemas.microsoft.com/office/drawing/2014/main" id="{3222DDD1-B917-4CF0-954D-DF8826C08B1B}"/>
-              </a:ext>
-            </a:extLst>
-          </p:cNvPr>
+          <p:cNvPr id="2" name="Date Placeholder 1"/>
           <p:cNvSpPr>
             <a:spLocks noGrp="1"/>
           </p:cNvSpPr>
@@ -2111,9 +2848,9 @@
           <a:bodyPr/>
           <a:lstStyle/>
           <a:p>
-            <a:fld id="{4036D906-24D5-4DAF-BF6E-4E33F265CDAD}" type="datetimeFigureOut">
+            <a:fld id="{241EB5C9-1307-BA42-ABA2-0BC069CD8E7F}" type="datetimeFigureOut">
               <a:rPr lang="en-US" smtClean="0"/>
-              <a:t>4/15/2020</a:t>
+              <a:t>2/17/2018</a:t>
             </a:fld>
             <a:endParaRPr lang="en-US"/>
           </a:p>
@@ -2121,13 +2858,7 @@
       </p:sp>
       <p:sp>
         <p:nvSpPr>
-          <p:cNvPr id="3" name="Footer Placeholder 2">
-            <a:extLst>
-              <a:ext uri="{FF2B5EF4-FFF2-40B4-BE49-F238E27FC236}">
-                <a16:creationId xmlns:a16="http://schemas.microsoft.com/office/drawing/2014/main" id="{7499E926-30A7-4519-8932-245D3A494886}"/>
-              </a:ext>
-            </a:extLst>
-          </p:cNvPr>
+          <p:cNvPr id="3" name="Footer Placeholder 2"/>
           <p:cNvSpPr>
             <a:spLocks noGrp="1"/>
           </p:cNvSpPr>
@@ -2146,13 +2877,7 @@
       </p:sp>
       <p:sp>
         <p:nvSpPr>
-          <p:cNvPr id="4" name="Slide Number Placeholder 3">
-            <a:extLst>
-              <a:ext uri="{FF2B5EF4-FFF2-40B4-BE49-F238E27FC236}">
-                <a16:creationId xmlns:a16="http://schemas.microsoft.com/office/drawing/2014/main" id="{5AB2578C-C649-4D49-89DE-605E3A291E9A}"/>
-              </a:ext>
-            </a:extLst>
-          </p:cNvPr>
+          <p:cNvPr id="4" name="Slide Number Placeholder 3"/>
           <p:cNvSpPr>
             <a:spLocks noGrp="1"/>
           </p:cNvSpPr>
@@ -2165,7 +2890,7 @@
           <a:bodyPr/>
           <a:lstStyle/>
           <a:p>
-            <a:fld id="{DAE21BBA-8137-4F87-A1AB-9B87866F9985}" type="slidenum">
+            <a:fld id="{C5EF2332-01BF-834F-8236-50238282D533}" type="slidenum">
               <a:rPr lang="en-US" smtClean="0"/>
               <a:t>‹#›</a:t>
             </a:fld>
@@ -2176,7 +2901,7 @@
     </p:spTree>
     <p:extLst>
       <p:ext uri="{BB962C8B-B14F-4D97-AF65-F5344CB8AC3E}">
-        <p14:creationId xmlns:p14="http://schemas.microsoft.com/office/powerpoint/2010/main" val="1520871316"/>
+        <p14:creationId xmlns:p14="http://schemas.microsoft.com/office/powerpoint/2010/main" val="2130901097"/>
       </p:ext>
     </p:extLst>
   </p:cSld>
@@ -2205,13 +2930,7 @@
       </p:grpSpPr>
       <p:sp>
         <p:nvSpPr>
-          <p:cNvPr id="2" name="Title 1">
-            <a:extLst>
-              <a:ext uri="{FF2B5EF4-FFF2-40B4-BE49-F238E27FC236}">
-                <a16:creationId xmlns:a16="http://schemas.microsoft.com/office/drawing/2014/main" id="{D54599AA-1C22-47FF-B791-5C2C0EC16A99}"/>
-              </a:ext>
-            </a:extLst>
-          </p:cNvPr>
+          <p:cNvPr id="2" name="Title 1"/>
           <p:cNvSpPr>
             <a:spLocks noGrp="1"/>
           </p:cNvSpPr>
@@ -2221,34 +2940,29 @@
         </p:nvSpPr>
         <p:spPr>
           <a:xfrm>
-            <a:off x="839788" y="457200"/>
-            <a:ext cx="3932237" cy="1600200"/>
+            <a:off x="457200" y="273050"/>
+            <a:ext cx="3008313" cy="1162050"/>
           </a:xfrm>
         </p:spPr>
         <p:txBody>
           <a:bodyPr anchor="b"/>
           <a:lstStyle>
-            <a:lvl1pPr>
-              <a:defRPr sz="3200"/>
+            <a:lvl1pPr algn="l">
+              <a:defRPr sz="2000" b="1"/>
             </a:lvl1pPr>
           </a:lstStyle>
           <a:p>
             <a:r>
-              <a:rPr lang="en-US"/>
+              <a:rPr lang="en-US" smtClean="0"/>
               <a:t>Click to edit Master title style</a:t>
             </a:r>
+            <a:endParaRPr lang="en-US"/>
           </a:p>
         </p:txBody>
       </p:sp>
       <p:sp>
         <p:nvSpPr>
-          <p:cNvPr id="3" name="Content Placeholder 2">
-            <a:extLst>
-              <a:ext uri="{FF2B5EF4-FFF2-40B4-BE49-F238E27FC236}">
-                <a16:creationId xmlns:a16="http://schemas.microsoft.com/office/drawing/2014/main" id="{0C3969E1-892B-4B3A-8329-ED1D6315DF89}"/>
-              </a:ext>
-            </a:extLst>
-          </p:cNvPr>
+          <p:cNvPr id="3" name="Content Placeholder 2"/>
           <p:cNvSpPr>
             <a:spLocks noGrp="1"/>
           </p:cNvSpPr>
@@ -2258,8 +2972,8 @@
         </p:nvSpPr>
         <p:spPr>
           <a:xfrm>
-            <a:off x="5183188" y="987425"/>
-            <a:ext cx="6172200" cy="4873625"/>
+            <a:off x="3575050" y="273050"/>
+            <a:ext cx="5111750" cy="5853113"/>
           </a:xfrm>
         </p:spPr>
         <p:txBody>
@@ -2296,49 +3010,44 @@
           <a:p>
             <a:pPr lvl="0"/>
             <a:r>
-              <a:rPr lang="en-US"/>
+              <a:rPr lang="en-US" smtClean="0"/>
               <a:t>Click to edit Master text styles</a:t>
             </a:r>
           </a:p>
           <a:p>
             <a:pPr lvl="1"/>
             <a:r>
-              <a:rPr lang="en-US"/>
+              <a:rPr lang="en-US" smtClean="0"/>
               <a:t>Second level</a:t>
             </a:r>
           </a:p>
           <a:p>
             <a:pPr lvl="2"/>
             <a:r>
-              <a:rPr lang="en-US"/>
+              <a:rPr lang="en-US" smtClean="0"/>
               <a:t>Third level</a:t>
             </a:r>
           </a:p>
           <a:p>
             <a:pPr lvl="3"/>
             <a:r>
-              <a:rPr lang="en-US"/>
+              <a:rPr lang="en-US" smtClean="0"/>
               <a:t>Fourth level</a:t>
             </a:r>
           </a:p>
           <a:p>
             <a:pPr lvl="4"/>
             <a:r>
-              <a:rPr lang="en-US"/>
+              <a:rPr lang="en-US" smtClean="0"/>
               <a:t>Fifth level</a:t>
             </a:r>
+            <a:endParaRPr lang="en-US"/>
           </a:p>
         </p:txBody>
       </p:sp>
       <p:sp>
         <p:nvSpPr>
-          <p:cNvPr id="4" name="Text Placeholder 3">
-            <a:extLst>
-              <a:ext uri="{FF2B5EF4-FFF2-40B4-BE49-F238E27FC236}">
-                <a16:creationId xmlns:a16="http://schemas.microsoft.com/office/drawing/2014/main" id="{96A76DCA-A3E2-4515-B8BC-D8200EE17702}"/>
-              </a:ext>
-            </a:extLst>
-          </p:cNvPr>
+          <p:cNvPr id="4" name="Text Placeholder 3"/>
           <p:cNvSpPr>
             <a:spLocks noGrp="1"/>
           </p:cNvSpPr>
@@ -2348,8 +3057,8 @@
         </p:nvSpPr>
         <p:spPr>
           <a:xfrm>
-            <a:off x="839788" y="2057400"/>
-            <a:ext cx="3932237" cy="3811588"/>
+            <a:off x="457200" y="1435100"/>
+            <a:ext cx="3008313" cy="4691063"/>
           </a:xfrm>
         </p:spPr>
         <p:txBody>
@@ -2357,45 +3066,45 @@
           <a:lstStyle>
             <a:lvl1pPr marL="0" indent="0">
               <a:buNone/>
-              <a:defRPr sz="1600"/>
+              <a:defRPr sz="1400"/>
             </a:lvl1pPr>
             <a:lvl2pPr marL="457200" indent="0">
               <a:buNone/>
-              <a:defRPr sz="1400"/>
+              <a:defRPr sz="1200"/>
             </a:lvl2pPr>
             <a:lvl3pPr marL="914400" indent="0">
               <a:buNone/>
-              <a:defRPr sz="1200"/>
+              <a:defRPr sz="1000"/>
             </a:lvl3pPr>
             <a:lvl4pPr marL="1371600" indent="0">
               <a:buNone/>
-              <a:defRPr sz="1000"/>
+              <a:defRPr sz="900"/>
             </a:lvl4pPr>
             <a:lvl5pPr marL="1828800" indent="0">
               <a:buNone/>
-              <a:defRPr sz="1000"/>
+              <a:defRPr sz="900"/>
             </a:lvl5pPr>
             <a:lvl6pPr marL="2286000" indent="0">
               <a:buNone/>
-              <a:defRPr sz="1000"/>
+              <a:defRPr sz="900"/>
             </a:lvl6pPr>
             <a:lvl7pPr marL="2743200" indent="0">
               <a:buNone/>
-              <a:defRPr sz="1000"/>
+              <a:defRPr sz="900"/>
             </a:lvl7pPr>
             <a:lvl8pPr marL="3200400" indent="0">
               <a:buNone/>
-              <a:defRPr sz="1000"/>
+              <a:defRPr sz="900"/>
             </a:lvl8pPr>
             <a:lvl9pPr marL="3657600" indent="0">
               <a:buNone/>
-              <a:defRPr sz="1000"/>
+              <a:defRPr sz="900"/>
             </a:lvl9pPr>
           </a:lstStyle>
           <a:p>
             <a:pPr lvl="0"/>
             <a:r>
-              <a:rPr lang="en-US"/>
+              <a:rPr lang="en-US" smtClean="0"/>
               <a:t>Click to edit Master text styles</a:t>
             </a:r>
           </a:p>
@@ -2403,13 +3112,7 @@
       </p:sp>
       <p:sp>
         <p:nvSpPr>
-          <p:cNvPr id="5" name="Date Placeholder 4">
-            <a:extLst>
-              <a:ext uri="{FF2B5EF4-FFF2-40B4-BE49-F238E27FC236}">
-                <a16:creationId xmlns:a16="http://schemas.microsoft.com/office/drawing/2014/main" id="{FED0D47D-4CD9-41C7-A402-1634C5C53A10}"/>
-              </a:ext>
-            </a:extLst>
-          </p:cNvPr>
+          <p:cNvPr id="5" name="Date Placeholder 4"/>
           <p:cNvSpPr>
             <a:spLocks noGrp="1"/>
           </p:cNvSpPr>
@@ -2422,9 +3125,9 @@
           <a:bodyPr/>
           <a:lstStyle/>
           <a:p>
-            <a:fld id="{4036D906-24D5-4DAF-BF6E-4E33F265CDAD}" type="datetimeFigureOut">
+            <a:fld id="{241EB5C9-1307-BA42-ABA2-0BC069CD8E7F}" type="datetimeFigureOut">
               <a:rPr lang="en-US" smtClean="0"/>
-              <a:t>4/15/2020</a:t>
+              <a:t>2/17/2018</a:t>
             </a:fld>
             <a:endParaRPr lang="en-US"/>
           </a:p>
@@ -2432,13 +3135,7 @@
       </p:sp>
       <p:sp>
         <p:nvSpPr>
-          <p:cNvPr id="6" name="Footer Placeholder 5">
-            <a:extLst>
-              <a:ext uri="{FF2B5EF4-FFF2-40B4-BE49-F238E27FC236}">
-                <a16:creationId xmlns:a16="http://schemas.microsoft.com/office/drawing/2014/main" id="{24234B13-F2BB-4004-8F17-29EFA56E8C2D}"/>
-              </a:ext>
-            </a:extLst>
-          </p:cNvPr>
+          <p:cNvPr id="6" name="Footer Placeholder 5"/>
           <p:cNvSpPr>
             <a:spLocks noGrp="1"/>
           </p:cNvSpPr>
@@ -2457,13 +3154,7 @@
       </p:sp>
       <p:sp>
         <p:nvSpPr>
-          <p:cNvPr id="7" name="Slide Number Placeholder 6">
-            <a:extLst>
-              <a:ext uri="{FF2B5EF4-FFF2-40B4-BE49-F238E27FC236}">
-                <a16:creationId xmlns:a16="http://schemas.microsoft.com/office/drawing/2014/main" id="{76BC0011-37DD-4667-A0BD-493D8600A322}"/>
-              </a:ext>
-            </a:extLst>
-          </p:cNvPr>
+          <p:cNvPr id="7" name="Slide Number Placeholder 6"/>
           <p:cNvSpPr>
             <a:spLocks noGrp="1"/>
           </p:cNvSpPr>
@@ -2476,7 +3167,7 @@
           <a:bodyPr/>
           <a:lstStyle/>
           <a:p>
-            <a:fld id="{DAE21BBA-8137-4F87-A1AB-9B87866F9985}" type="slidenum">
+            <a:fld id="{C5EF2332-01BF-834F-8236-50238282D533}" type="slidenum">
               <a:rPr lang="en-US" smtClean="0"/>
               <a:t>‹#›</a:t>
             </a:fld>
@@ -2487,7 +3178,7 @@
     </p:spTree>
     <p:extLst>
       <p:ext uri="{BB962C8B-B14F-4D97-AF65-F5344CB8AC3E}">
-        <p14:creationId xmlns:p14="http://schemas.microsoft.com/office/powerpoint/2010/main" val="1717586327"/>
+        <p14:creationId xmlns:p14="http://schemas.microsoft.com/office/powerpoint/2010/main" val="3540895647"/>
       </p:ext>
     </p:extLst>
   </p:cSld>
@@ -2516,13 +3207,7 @@
       </p:grpSpPr>
       <p:sp>
         <p:nvSpPr>
-          <p:cNvPr id="2" name="Title 1">
-            <a:extLst>
-              <a:ext uri="{FF2B5EF4-FFF2-40B4-BE49-F238E27FC236}">
-                <a16:creationId xmlns:a16="http://schemas.microsoft.com/office/drawing/2014/main" id="{F65BB7B4-7FFB-4365-884D-D44FDFD8FEAD}"/>
-              </a:ext>
-            </a:extLst>
-          </p:cNvPr>
+          <p:cNvPr id="2" name="Title 1"/>
           <p:cNvSpPr>
             <a:spLocks noGrp="1"/>
           </p:cNvSpPr>
@@ -2532,34 +3217,29 @@
         </p:nvSpPr>
         <p:spPr>
           <a:xfrm>
-            <a:off x="839788" y="457200"/>
-            <a:ext cx="3932237" cy="1600200"/>
+            <a:off x="1792288" y="4800600"/>
+            <a:ext cx="5486400" cy="566738"/>
           </a:xfrm>
         </p:spPr>
         <p:txBody>
           <a:bodyPr anchor="b"/>
           <a:lstStyle>
-            <a:lvl1pPr>
-              <a:defRPr sz="3200"/>
+            <a:lvl1pPr algn="l">
+              <a:defRPr sz="2000" b="1"/>
             </a:lvl1pPr>
           </a:lstStyle>
           <a:p>
             <a:r>
-              <a:rPr lang="en-US"/>
+              <a:rPr lang="en-US" smtClean="0"/>
               <a:t>Click to edit Master title style</a:t>
             </a:r>
+            <a:endParaRPr lang="en-US"/>
           </a:p>
         </p:txBody>
       </p:sp>
       <p:sp>
         <p:nvSpPr>
-          <p:cNvPr id="3" name="Picture Placeholder 2">
-            <a:extLst>
-              <a:ext uri="{FF2B5EF4-FFF2-40B4-BE49-F238E27FC236}">
-                <a16:creationId xmlns:a16="http://schemas.microsoft.com/office/drawing/2014/main" id="{AFDE510C-0516-4656-99D5-AD5CD9E9C4E8}"/>
-              </a:ext>
-            </a:extLst>
-          </p:cNvPr>
+          <p:cNvPr id="3" name="Picture Placeholder 2"/>
           <p:cNvSpPr>
             <a:spLocks noGrp="1"/>
           </p:cNvSpPr>
@@ -2569,8 +3249,8 @@
         </p:nvSpPr>
         <p:spPr>
           <a:xfrm>
-            <a:off x="5183188" y="987425"/>
-            <a:ext cx="6172200" cy="4873625"/>
+            <a:off x="1792288" y="612775"/>
+            <a:ext cx="5486400" cy="4114800"/>
           </a:xfrm>
         </p:spPr>
         <p:txBody>
@@ -2620,13 +3300,7 @@
       </p:sp>
       <p:sp>
         <p:nvSpPr>
-          <p:cNvPr id="4" name="Text Placeholder 3">
-            <a:extLst>
-              <a:ext uri="{FF2B5EF4-FFF2-40B4-BE49-F238E27FC236}">
-                <a16:creationId xmlns:a16="http://schemas.microsoft.com/office/drawing/2014/main" id="{1CFAF488-3AB2-4531-95CB-9B874BCC8C2F}"/>
-              </a:ext>
-            </a:extLst>
-          </p:cNvPr>
+          <p:cNvPr id="4" name="Text Placeholder 3"/>
           <p:cNvSpPr>
             <a:spLocks noGrp="1"/>
           </p:cNvSpPr>
@@ -2636,8 +3310,8 @@
         </p:nvSpPr>
         <p:spPr>
           <a:xfrm>
-            <a:off x="839788" y="2057400"/>
-            <a:ext cx="3932237" cy="3811588"/>
+            <a:off x="1792288" y="5367338"/>
+            <a:ext cx="5486400" cy="804862"/>
           </a:xfrm>
         </p:spPr>
         <p:txBody>
@@ -2645,45 +3319,45 @@
           <a:lstStyle>
             <a:lvl1pPr marL="0" indent="0">
               <a:buNone/>
-              <a:defRPr sz="1600"/>
+              <a:defRPr sz="1400"/>
             </a:lvl1pPr>
             <a:lvl2pPr marL="457200" indent="0">
               <a:buNone/>
-              <a:defRPr sz="1400"/>
+              <a:defRPr sz="1200"/>
             </a:lvl2pPr>
             <a:lvl3pPr marL="914400" indent="0">
               <a:buNone/>
-              <a:defRPr sz="1200"/>
+              <a:defRPr sz="1000"/>
             </a:lvl3pPr>
             <a:lvl4pPr marL="1371600" indent="0">
               <a:buNone/>
-              <a:defRPr sz="1000"/>
+              <a:defRPr sz="900"/>
             </a:lvl4pPr>
             <a:lvl5pPr marL="1828800" indent="0">
               <a:buNone/>
-              <a:defRPr sz="1000"/>
+              <a:defRPr sz="900"/>
             </a:lvl5pPr>
             <a:lvl6pPr marL="2286000" indent="0">
               <a:buNone/>
-              <a:defRPr sz="1000"/>
+              <a:defRPr sz="900"/>
             </a:lvl6pPr>
             <a:lvl7pPr marL="2743200" indent="0">
               <a:buNone/>
-              <a:defRPr sz="1000"/>
+              <a:defRPr sz="900"/>
             </a:lvl7pPr>
             <a:lvl8pPr marL="3200400" indent="0">
               <a:buNone/>
-              <a:defRPr sz="1000"/>
+              <a:defRPr sz="900"/>
             </a:lvl8pPr>
             <a:lvl9pPr marL="3657600" indent="0">
               <a:buNone/>
-              <a:defRPr sz="1000"/>
+              <a:defRPr sz="900"/>
             </a:lvl9pPr>
           </a:lstStyle>
           <a:p>
             <a:pPr lvl="0"/>
             <a:r>
-              <a:rPr lang="en-US"/>
+              <a:rPr lang="en-US" smtClean="0"/>
               <a:t>Click to edit Master text styles</a:t>
             </a:r>
           </a:p>
@@ -2691,13 +3365,7 @@
       </p:sp>
       <p:sp>
         <p:nvSpPr>
-          <p:cNvPr id="5" name="Date Placeholder 4">
-            <a:extLst>
-              <a:ext uri="{FF2B5EF4-FFF2-40B4-BE49-F238E27FC236}">
-                <a16:creationId xmlns:a16="http://schemas.microsoft.com/office/drawing/2014/main" id="{A561E8CF-268B-4AAA-85BC-87A69F2F7CEA}"/>
-              </a:ext>
-            </a:extLst>
-          </p:cNvPr>
+          <p:cNvPr id="5" name="Date Placeholder 4"/>
           <p:cNvSpPr>
             <a:spLocks noGrp="1"/>
           </p:cNvSpPr>
@@ -2710,9 +3378,9 @@
           <a:bodyPr/>
           <a:lstStyle/>
           <a:p>
-            <a:fld id="{4036D906-24D5-4DAF-BF6E-4E33F265CDAD}" type="datetimeFigureOut">
+            <a:fld id="{241EB5C9-1307-BA42-ABA2-0BC069CD8E7F}" type="datetimeFigureOut">
               <a:rPr lang="en-US" smtClean="0"/>
-              <a:t>4/15/2020</a:t>
+              <a:t>2/17/2018</a:t>
             </a:fld>
             <a:endParaRPr lang="en-US"/>
           </a:p>
@@ -2720,13 +3388,7 @@
       </p:sp>
       <p:sp>
         <p:nvSpPr>
-          <p:cNvPr id="6" name="Footer Placeholder 5">
-            <a:extLst>
-              <a:ext uri="{FF2B5EF4-FFF2-40B4-BE49-F238E27FC236}">
-                <a16:creationId xmlns:a16="http://schemas.microsoft.com/office/drawing/2014/main" id="{6BBD1754-B6F2-40E3-8798-D28F2B5FCA4D}"/>
-              </a:ext>
-            </a:extLst>
-          </p:cNvPr>
+          <p:cNvPr id="6" name="Footer Placeholder 5"/>
           <p:cNvSpPr>
             <a:spLocks noGrp="1"/>
           </p:cNvSpPr>
@@ -2745,13 +3407,7 @@
       </p:sp>
       <p:sp>
         <p:nvSpPr>
-          <p:cNvPr id="7" name="Slide Number Placeholder 6">
-            <a:extLst>
-              <a:ext uri="{FF2B5EF4-FFF2-40B4-BE49-F238E27FC236}">
-                <a16:creationId xmlns:a16="http://schemas.microsoft.com/office/drawing/2014/main" id="{C4EE570A-7AFD-4E99-82E9-80CCAC922CEA}"/>
-              </a:ext>
-            </a:extLst>
-          </p:cNvPr>
+          <p:cNvPr id="7" name="Slide Number Placeholder 6"/>
           <p:cNvSpPr>
             <a:spLocks noGrp="1"/>
           </p:cNvSpPr>
@@ -2764,7 +3420,7 @@
           <a:bodyPr/>
           <a:lstStyle/>
           <a:p>
-            <a:fld id="{DAE21BBA-8137-4F87-A1AB-9B87866F9985}" type="slidenum">
+            <a:fld id="{C5EF2332-01BF-834F-8236-50238282D533}" type="slidenum">
               <a:rPr lang="en-US" smtClean="0"/>
               <a:t>‹#›</a:t>
             </a:fld>
@@ -2775,7 +3431,7 @@
     </p:spTree>
     <p:extLst>
       <p:ext uri="{BB962C8B-B14F-4D97-AF65-F5344CB8AC3E}">
-        <p14:creationId xmlns:p14="http://schemas.microsoft.com/office/powerpoint/2010/main" val="1187057987"/>
+        <p14:creationId xmlns:p14="http://schemas.microsoft.com/office/powerpoint/2010/main" val="3566899855"/>
       </p:ext>
     </p:extLst>
   </p:cSld>
@@ -2809,48 +3465,86 @@
       </p:grpSpPr>
       <p:sp>
         <p:nvSpPr>
-          <p:cNvPr id="2" name="Title Placeholder 1">
-            <a:extLst>
-              <a:ext uri="{FF2B5EF4-FFF2-40B4-BE49-F238E27FC236}">
-                <a16:creationId xmlns:a16="http://schemas.microsoft.com/office/drawing/2014/main" id="{FC130A4F-B131-435E-8745-59D3E71688EC}"/>
-              </a:ext>
-            </a:extLst>
-          </p:cNvPr>
+          <p:cNvPr id="4" name="Date Placeholder 3"/>
           <p:cNvSpPr>
             <a:spLocks noGrp="1"/>
           </p:cNvSpPr>
           <p:nvPr>
-            <p:ph type="title"/>
+            <p:ph type="dt" sz="half" idx="2"/>
           </p:nvPr>
         </p:nvSpPr>
         <p:spPr>
           <a:xfrm>
-            <a:off x="838200" y="365125"/>
-            <a:ext cx="10515600" cy="1325563"/>
+            <a:off x="609600" y="6356353"/>
+            <a:ext cx="2844800" cy="365125"/>
           </a:xfrm>
           <a:prstGeom prst="rect">
             <a:avLst/>
           </a:prstGeom>
         </p:spPr>
         <p:txBody>
-          <a:bodyPr vert="horz" lIns="91440" tIns="45720" rIns="91440" bIns="45720" rtlCol="0" anchor="ctr">
-            <a:normAutofit/>
-          </a:bodyPr>
-          <a:lstStyle/>
-          <a:p>
-            <a:r>
-              <a:rPr lang="en-US" dirty="0"/>
-              <a:t>Click to edit Master title style</a:t>
-            </a:r>
+          <a:bodyPr vert="horz" lIns="91440" tIns="45720" rIns="91440" bIns="45720" rtlCol="0" anchor="ctr"/>
+          <a:lstStyle>
+            <a:lvl1pPr algn="l">
+              <a:defRPr sz="1200">
+                <a:solidFill>
+                  <a:schemeClr val="tx1">
+                    <a:tint val="75000"/>
+                  </a:schemeClr>
+                </a:solidFill>
+              </a:defRPr>
+            </a:lvl1pPr>
+          </a:lstStyle>
+          <a:p>
+            <a:fld id="{241EB5C9-1307-BA42-ABA2-0BC069CD8E7F}" type="datetimeFigureOut">
+              <a:rPr lang="en-US" smtClean="0"/>
+              <a:t>4/17/2020</a:t>
+            </a:fld>
+            <a:endParaRPr lang="en-US"/>
           </a:p>
         </p:txBody>
       </p:sp>
+      <p:pic>
+        <p:nvPicPr>
+          <p:cNvPr id="12" name="Picture 11">
+            <a:extLst>
+              <a:ext uri="{FF2B5EF4-FFF2-40B4-BE49-F238E27FC236}">
+                <a16:creationId xmlns:a16="http://schemas.microsoft.com/office/drawing/2014/main" id="{2DE72B46-08CB-4561-95B0-25B9F3459C1A}"/>
+              </a:ext>
+            </a:extLst>
+          </p:cNvPr>
+          <p:cNvPicPr>
+            <a:picLocks noChangeAspect="1"/>
+          </p:cNvPicPr>
+          <p:nvPr userDrawn="1"/>
+        </p:nvPicPr>
+        <p:blipFill rotWithShape="1">
+          <a:blip r:embed="rId6" cstate="print">
+            <a:extLst>
+              <a:ext uri="{28A0092B-C50C-407E-A947-70E740481C1C}">
+                <a14:useLocalDpi xmlns:a14="http://schemas.microsoft.com/office/drawing/2010/main" val="0"/>
+              </a:ext>
+            </a:extLst>
+          </a:blip>
+          <a:srcRect l="8858" t="35400" r="8863" b="35672"/>
+          <a:stretch/>
+        </p:blipFill>
+        <p:spPr>
+          <a:xfrm>
+            <a:off x="9419477" y="687872"/>
+            <a:ext cx="1934323" cy="680068"/>
+          </a:xfrm>
+          <a:prstGeom prst="rect">
+            <a:avLst/>
+          </a:prstGeom>
+        </p:spPr>
+      </p:pic>
       <p:sp>
         <p:nvSpPr>
-          <p:cNvPr id="3" name="Text Placeholder 2">
+          <p:cNvPr id="16" name="Text Placeholder 2">
             <a:extLst>
               <a:ext uri="{FF2B5EF4-FFF2-40B4-BE49-F238E27FC236}">
-                <a16:creationId xmlns:a16="http://schemas.microsoft.com/office/drawing/2014/main" id="{49C5BF83-D3C3-4983-8231-8B6B19879B7D}"/>
+                <a16:creationId xmlns:a16="http://schemas.microsoft.com/office/drawing/2014/main" id="{85F4514D-A721-4162-BD02-478D7C7847AE}"/>
               </a:ext>
             </a:extLst>
           </p:cNvPr>
@@ -2912,182 +3606,10 @@
           </a:p>
         </p:txBody>
       </p:sp>
-      <p:sp>
-        <p:nvSpPr>
-          <p:cNvPr id="4" name="Date Placeholder 3">
-            <a:extLst>
-              <a:ext uri="{FF2B5EF4-FFF2-40B4-BE49-F238E27FC236}">
-                <a16:creationId xmlns:a16="http://schemas.microsoft.com/office/drawing/2014/main" id="{63BC5DF7-1D52-4360-95D3-DC17FB41A3D4}"/>
-              </a:ext>
-            </a:extLst>
-          </p:cNvPr>
-          <p:cNvSpPr>
-            <a:spLocks noGrp="1"/>
-          </p:cNvSpPr>
-          <p:nvPr>
-            <p:ph type="dt" sz="half" idx="2"/>
-          </p:nvPr>
-        </p:nvSpPr>
-        <p:spPr>
-          <a:xfrm>
-            <a:off x="838200" y="6356350"/>
-            <a:ext cx="2743200" cy="365125"/>
-          </a:xfrm>
-          <a:prstGeom prst="rect">
-            <a:avLst/>
-          </a:prstGeom>
-        </p:spPr>
-        <p:txBody>
-          <a:bodyPr vert="horz" lIns="91440" tIns="45720" rIns="91440" bIns="45720" rtlCol="0" anchor="ctr"/>
-          <a:lstStyle>
-            <a:lvl1pPr algn="l">
-              <a:defRPr sz="1200">
-                <a:solidFill>
-                  <a:schemeClr val="tx1">
-                    <a:tint val="75000"/>
-                  </a:schemeClr>
-                </a:solidFill>
-              </a:defRPr>
-            </a:lvl1pPr>
-          </a:lstStyle>
-          <a:p>
-            <a:fld id="{4036D906-24D5-4DAF-BF6E-4E33F265CDAD}" type="datetimeFigureOut">
-              <a:rPr lang="en-US" smtClean="0"/>
-              <a:t>4/15/2020</a:t>
-            </a:fld>
-            <a:endParaRPr lang="en-US"/>
-          </a:p>
-        </p:txBody>
-      </p:sp>
-      <p:sp>
-        <p:nvSpPr>
-          <p:cNvPr id="5" name="Footer Placeholder 4">
-            <a:extLst>
-              <a:ext uri="{FF2B5EF4-FFF2-40B4-BE49-F238E27FC236}">
-                <a16:creationId xmlns:a16="http://schemas.microsoft.com/office/drawing/2014/main" id="{A98218CC-115E-471E-81E6-19EA882C0CCB}"/>
-              </a:ext>
-            </a:extLst>
-          </p:cNvPr>
-          <p:cNvSpPr>
-            <a:spLocks noGrp="1"/>
-          </p:cNvSpPr>
-          <p:nvPr>
-            <p:ph type="ftr" sz="quarter" idx="3"/>
-          </p:nvPr>
-        </p:nvSpPr>
-        <p:spPr>
-          <a:xfrm>
-            <a:off x="4038600" y="6356350"/>
-            <a:ext cx="4114800" cy="365125"/>
-          </a:xfrm>
-          <a:prstGeom prst="rect">
-            <a:avLst/>
-          </a:prstGeom>
-        </p:spPr>
-        <p:txBody>
-          <a:bodyPr vert="horz" lIns="91440" tIns="45720" rIns="91440" bIns="45720" rtlCol="0" anchor="ctr"/>
-          <a:lstStyle>
-            <a:lvl1pPr algn="ctr">
-              <a:defRPr sz="1200">
-                <a:solidFill>
-                  <a:schemeClr val="tx1">
-                    <a:tint val="75000"/>
-                  </a:schemeClr>
-                </a:solidFill>
-              </a:defRPr>
-            </a:lvl1pPr>
-          </a:lstStyle>
-          <a:p>
-            <a:endParaRPr lang="en-US"/>
-          </a:p>
-        </p:txBody>
-      </p:sp>
-      <p:sp>
-        <p:nvSpPr>
-          <p:cNvPr id="6" name="Slide Number Placeholder 5">
-            <a:extLst>
-              <a:ext uri="{FF2B5EF4-FFF2-40B4-BE49-F238E27FC236}">
-                <a16:creationId xmlns:a16="http://schemas.microsoft.com/office/drawing/2014/main" id="{F3BA7ECB-E2C9-462E-BEA0-29A902CDBF49}"/>
-              </a:ext>
-            </a:extLst>
-          </p:cNvPr>
-          <p:cNvSpPr>
-            <a:spLocks noGrp="1"/>
-          </p:cNvSpPr>
-          <p:nvPr>
-            <p:ph type="sldNum" sz="quarter" idx="4"/>
-          </p:nvPr>
-        </p:nvSpPr>
-        <p:spPr>
-          <a:xfrm>
-            <a:off x="8610600" y="6356350"/>
-            <a:ext cx="2743200" cy="365125"/>
-          </a:xfrm>
-          <a:prstGeom prst="rect">
-            <a:avLst/>
-          </a:prstGeom>
-        </p:spPr>
-        <p:txBody>
-          <a:bodyPr vert="horz" lIns="91440" tIns="45720" rIns="91440" bIns="45720" rtlCol="0" anchor="ctr"/>
-          <a:lstStyle>
-            <a:lvl1pPr algn="r">
-              <a:defRPr sz="1200">
-                <a:solidFill>
-                  <a:schemeClr val="tx1">
-                    <a:tint val="75000"/>
-                  </a:schemeClr>
-                </a:solidFill>
-              </a:defRPr>
-            </a:lvl1pPr>
-          </a:lstStyle>
-          <a:p>
-            <a:fld id="{DAE21BBA-8137-4F87-A1AB-9B87866F9985}" type="slidenum">
-              <a:rPr lang="en-US" smtClean="0"/>
-              <a:t>‹#›</a:t>
-            </a:fld>
-            <a:endParaRPr lang="en-US"/>
-          </a:p>
-        </p:txBody>
-      </p:sp>
-      <p:pic>
-        <p:nvPicPr>
-          <p:cNvPr id="7" name="Picture 6">
-            <a:extLst>
-              <a:ext uri="{FF2B5EF4-FFF2-40B4-BE49-F238E27FC236}">
-                <a16:creationId xmlns:a16="http://schemas.microsoft.com/office/drawing/2014/main" id="{DCE7FE2E-EB49-4A46-8E55-360D6953D283}"/>
-              </a:ext>
-            </a:extLst>
-          </p:cNvPr>
-          <p:cNvPicPr>
-            <a:picLocks noChangeAspect="1"/>
-          </p:cNvPicPr>
-          <p:nvPr userDrawn="1"/>
-        </p:nvPicPr>
-        <p:blipFill rotWithShape="1">
-          <a:blip r:embed="rId13" cstate="print">
-            <a:extLst>
-              <a:ext uri="{28A0092B-C50C-407E-A947-70E740481C1C}">
-                <a14:useLocalDpi xmlns:a14="http://schemas.microsoft.com/office/drawing/2010/main" val="0"/>
-              </a:ext>
-            </a:extLst>
-          </a:blip>
-          <a:srcRect l="8858" t="35400" r="8863" b="35672"/>
-          <a:stretch/>
-        </p:blipFill>
-        <p:spPr>
-          <a:xfrm>
-            <a:off x="9419477" y="687872"/>
-            <a:ext cx="1934323" cy="680068"/>
-          </a:xfrm>
-          <a:prstGeom prst="rect">
-            <a:avLst/>
-          </a:prstGeom>
-        </p:spPr>
-      </p:pic>
     </p:spTree>
     <p:extLst>
       <p:ext uri="{BB962C8B-B14F-4D97-AF65-F5344CB8AC3E}">
-        <p14:creationId xmlns:p14="http://schemas.microsoft.com/office/powerpoint/2010/main" val="3796251403"/>
+        <p14:creationId xmlns:p14="http://schemas.microsoft.com/office/powerpoint/2010/main" val="3676200875"/>
       </p:ext>
     </p:extLst>
   </p:cSld>
@@ -3097,20 +3619,10 @@
     <p:sldLayoutId id="2147483650" r:id="rId2"/>
     <p:sldLayoutId id="2147483651" r:id="rId3"/>
     <p:sldLayoutId id="2147483652" r:id="rId4"/>
-    <p:sldLayoutId id="2147483653" r:id="rId5"/>
-    <p:sldLayoutId id="2147483654" r:id="rId6"/>
-    <p:sldLayoutId id="2147483655" r:id="rId7"/>
-    <p:sldLayoutId id="2147483656" r:id="rId8"/>
-    <p:sldLayoutId id="2147483657" r:id="rId9"/>
-    <p:sldLayoutId id="2147483658" r:id="rId10"/>
-    <p:sldLayoutId id="2147483659" r:id="rId11"/>
   </p:sldLayoutIdLst>
   <p:txStyles>
     <p:titleStyle>
-      <a:lvl1pPr algn="l" defTabSz="914400" rtl="0" eaLnBrk="1" latinLnBrk="0" hangingPunct="1">
-        <a:lnSpc>
-          <a:spcPct val="90000"/>
-        </a:lnSpc>
+      <a:lvl1pPr algn="l" defTabSz="457200" rtl="0" eaLnBrk="1" latinLnBrk="0" hangingPunct="1">
         <a:spcBef>
           <a:spcPct val="0"/>
         </a:spcBef>
@@ -3119,113 +3631,95 @@
           <a:solidFill>
             <a:schemeClr val="tx1"/>
           </a:solidFill>
-          <a:latin typeface="Segoe UI Light" panose="020B0502040204020203" pitchFamily="34" charset="0"/>
+          <a:latin typeface="+mj-lt"/>
           <a:ea typeface="+mj-ea"/>
-          <a:cs typeface="Segoe UI Light" panose="020B0502040204020203" pitchFamily="34" charset="0"/>
+          <a:cs typeface="+mj-cs"/>
         </a:defRPr>
       </a:lvl1pPr>
     </p:titleStyle>
     <p:bodyStyle>
-      <a:lvl1pPr marL="228600" indent="-228600" algn="l" defTabSz="914400" rtl="0" eaLnBrk="1" latinLnBrk="0" hangingPunct="1">
-        <a:lnSpc>
-          <a:spcPct val="90000"/>
-        </a:lnSpc>
+      <a:lvl1pPr marL="342900" indent="-342900" algn="l" defTabSz="457200" rtl="0" eaLnBrk="1" latinLnBrk="0" hangingPunct="1">
         <a:spcBef>
-          <a:spcPts val="1000"/>
+          <a:spcPct val="20000"/>
         </a:spcBef>
-        <a:buFont typeface="Arial" panose="020B0604020202020204" pitchFamily="34" charset="0"/>
+        <a:buFont typeface="Arial"/>
         <a:buChar char="•"/>
+        <a:defRPr sz="3200" kern="1200">
+          <a:solidFill>
+            <a:schemeClr val="tx1"/>
+          </a:solidFill>
+          <a:latin typeface="+mn-lt"/>
+          <a:ea typeface="+mn-ea"/>
+          <a:cs typeface="+mn-cs"/>
+        </a:defRPr>
+      </a:lvl1pPr>
+      <a:lvl2pPr marL="742950" indent="-285750" algn="l" defTabSz="457200" rtl="0" eaLnBrk="1" latinLnBrk="0" hangingPunct="1">
+        <a:spcBef>
+          <a:spcPct val="20000"/>
+        </a:spcBef>
+        <a:buFont typeface="Arial"/>
+        <a:buChar char="–"/>
         <a:defRPr sz="2800" kern="1200">
           <a:solidFill>
             <a:schemeClr val="tx1"/>
           </a:solidFill>
-          <a:latin typeface="Segoe UI" panose="020B0502040204020203" pitchFamily="34" charset="0"/>
+          <a:latin typeface="+mn-lt"/>
           <a:ea typeface="+mn-ea"/>
-          <a:cs typeface="Segoe UI" panose="020B0502040204020203" pitchFamily="34" charset="0"/>
+          <a:cs typeface="+mn-cs"/>
         </a:defRPr>
-      </a:lvl1pPr>
-      <a:lvl2pPr marL="685800" indent="-228600" algn="l" defTabSz="914400" rtl="0" eaLnBrk="1" latinLnBrk="0" hangingPunct="1">
-        <a:lnSpc>
-          <a:spcPct val="90000"/>
-        </a:lnSpc>
+      </a:lvl2pPr>
+      <a:lvl3pPr marL="1143000" indent="-228600" algn="l" defTabSz="457200" rtl="0" eaLnBrk="1" latinLnBrk="0" hangingPunct="1">
         <a:spcBef>
-          <a:spcPts val="500"/>
+          <a:spcPct val="20000"/>
         </a:spcBef>
-        <a:buFont typeface="Arial" panose="020B0604020202020204" pitchFamily="34" charset="0"/>
+        <a:buFont typeface="Arial"/>
         <a:buChar char="•"/>
         <a:defRPr sz="2400" kern="1200">
           <a:solidFill>
             <a:schemeClr val="tx1"/>
           </a:solidFill>
-          <a:latin typeface="Segoe UI" panose="020B0502040204020203" pitchFamily="34" charset="0"/>
+          <a:latin typeface="+mn-lt"/>
           <a:ea typeface="+mn-ea"/>
-          <a:cs typeface="Segoe UI" panose="020B0502040204020203" pitchFamily="34" charset="0"/>
+          <a:cs typeface="+mn-cs"/>
         </a:defRPr>
-      </a:lvl2pPr>
-      <a:lvl3pPr marL="1143000" indent="-228600" algn="l" defTabSz="914400" rtl="0" eaLnBrk="1" latinLnBrk="0" hangingPunct="1">
-        <a:lnSpc>
-          <a:spcPct val="90000"/>
-        </a:lnSpc>
+      </a:lvl3pPr>
+      <a:lvl4pPr marL="1600200" indent="-228600" algn="l" defTabSz="457200" rtl="0" eaLnBrk="1" latinLnBrk="0" hangingPunct="1">
         <a:spcBef>
-          <a:spcPts val="500"/>
+          <a:spcPct val="20000"/>
         </a:spcBef>
-        <a:buFont typeface="Arial" panose="020B0604020202020204" pitchFamily="34" charset="0"/>
-        <a:buChar char="•"/>
+        <a:buFont typeface="Arial"/>
+        <a:buChar char="–"/>
         <a:defRPr sz="2000" kern="1200">
           <a:solidFill>
             <a:schemeClr val="tx1"/>
           </a:solidFill>
-          <a:latin typeface="Segoe UI" panose="020B0502040204020203" pitchFamily="34" charset="0"/>
+          <a:latin typeface="+mn-lt"/>
           <a:ea typeface="+mn-ea"/>
-          <a:cs typeface="Segoe UI" panose="020B0502040204020203" pitchFamily="34" charset="0"/>
+          <a:cs typeface="+mn-cs"/>
         </a:defRPr>
-      </a:lvl3pPr>
-      <a:lvl4pPr marL="1600200" indent="-228600" algn="l" defTabSz="914400" rtl="0" eaLnBrk="1" latinLnBrk="0" hangingPunct="1">
-        <a:lnSpc>
-          <a:spcPct val="90000"/>
-        </a:lnSpc>
+      </a:lvl4pPr>
+      <a:lvl5pPr marL="2057400" indent="-228600" algn="l" defTabSz="457200" rtl="0" eaLnBrk="1" latinLnBrk="0" hangingPunct="1">
         <a:spcBef>
-          <a:spcPts val="500"/>
+          <a:spcPct val="20000"/>
         </a:spcBef>
-        <a:buFont typeface="Arial" panose="020B0604020202020204" pitchFamily="34" charset="0"/>
-        <a:buChar char="•"/>
-        <a:defRPr sz="1800" kern="1200">
+        <a:buFont typeface="Arial"/>
+        <a:buChar char="»"/>
+        <a:defRPr sz="2000" kern="1200">
           <a:solidFill>
             <a:schemeClr val="tx1"/>
           </a:solidFill>
-          <a:latin typeface="Segoe UI" panose="020B0502040204020203" pitchFamily="34" charset="0"/>
+          <a:latin typeface="+mn-lt"/>
           <a:ea typeface="+mn-ea"/>
-          <a:cs typeface="Segoe UI" panose="020B0502040204020203" pitchFamily="34" charset="0"/>
-        </a:defRPr>
-      </a:lvl4pPr>
-      <a:lvl5pPr marL="2057400" indent="-228600" algn="l" defTabSz="914400" rtl="0" eaLnBrk="1" latinLnBrk="0" hangingPunct="1">
-        <a:lnSpc>
-          <a:spcPct val="90000"/>
-        </a:lnSpc>
-        <a:spcBef>
-          <a:spcPts val="500"/>
-        </a:spcBef>
-        <a:buFont typeface="Arial" panose="020B0604020202020204" pitchFamily="34" charset="0"/>
-        <a:buChar char="•"/>
-        <a:defRPr sz="1800" kern="1200">
-          <a:solidFill>
-            <a:schemeClr val="tx1"/>
-          </a:solidFill>
-          <a:latin typeface="Segoe UI" panose="020B0502040204020203" pitchFamily="34" charset="0"/>
-          <a:ea typeface="+mn-ea"/>
-          <a:cs typeface="Segoe UI" panose="020B0502040204020203" pitchFamily="34" charset="0"/>
+          <a:cs typeface="+mn-cs"/>
         </a:defRPr>
       </a:lvl5pPr>
-      <a:lvl6pPr marL="2514600" indent="-228600" algn="l" defTabSz="914400" rtl="0" eaLnBrk="1" latinLnBrk="0" hangingPunct="1">
-        <a:lnSpc>
-          <a:spcPct val="90000"/>
-        </a:lnSpc>
+      <a:lvl6pPr marL="2514600" indent="-228600" algn="l" defTabSz="457200" rtl="0" eaLnBrk="1" latinLnBrk="0" hangingPunct="1">
         <a:spcBef>
-          <a:spcPts val="500"/>
+          <a:spcPct val="20000"/>
         </a:spcBef>
-        <a:buFont typeface="Arial" panose="020B0604020202020204" pitchFamily="34" charset="0"/>
+        <a:buFont typeface="Arial"/>
         <a:buChar char="•"/>
-        <a:defRPr sz="1800" kern="1200">
+        <a:defRPr sz="2000" kern="1200">
           <a:solidFill>
             <a:schemeClr val="tx1"/>
           </a:solidFill>
@@ -3234,16 +3728,13 @@
           <a:cs typeface="+mn-cs"/>
         </a:defRPr>
       </a:lvl6pPr>
-      <a:lvl7pPr marL="2971800" indent="-228600" algn="l" defTabSz="914400" rtl="0" eaLnBrk="1" latinLnBrk="0" hangingPunct="1">
-        <a:lnSpc>
-          <a:spcPct val="90000"/>
-        </a:lnSpc>
+      <a:lvl7pPr marL="2971800" indent="-228600" algn="l" defTabSz="457200" rtl="0" eaLnBrk="1" latinLnBrk="0" hangingPunct="1">
         <a:spcBef>
-          <a:spcPts val="500"/>
+          <a:spcPct val="20000"/>
         </a:spcBef>
-        <a:buFont typeface="Arial" panose="020B0604020202020204" pitchFamily="34" charset="0"/>
+        <a:buFont typeface="Arial"/>
         <a:buChar char="•"/>
-        <a:defRPr sz="1800" kern="1200">
+        <a:defRPr sz="2000" kern="1200">
           <a:solidFill>
             <a:schemeClr val="tx1"/>
           </a:solidFill>
@@ -3252,16 +3743,13 @@
           <a:cs typeface="+mn-cs"/>
         </a:defRPr>
       </a:lvl7pPr>
-      <a:lvl8pPr marL="3429000" indent="-228600" algn="l" defTabSz="914400" rtl="0" eaLnBrk="1" latinLnBrk="0" hangingPunct="1">
-        <a:lnSpc>
-          <a:spcPct val="90000"/>
-        </a:lnSpc>
+      <a:lvl8pPr marL="3429000" indent="-228600" algn="l" defTabSz="457200" rtl="0" eaLnBrk="1" latinLnBrk="0" hangingPunct="1">
         <a:spcBef>
-          <a:spcPts val="500"/>
+          <a:spcPct val="20000"/>
         </a:spcBef>
-        <a:buFont typeface="Arial" panose="020B0604020202020204" pitchFamily="34" charset="0"/>
+        <a:buFont typeface="Arial"/>
         <a:buChar char="•"/>
-        <a:defRPr sz="1800" kern="1200">
+        <a:defRPr sz="2000" kern="1200">
           <a:solidFill>
             <a:schemeClr val="tx1"/>
           </a:solidFill>
@@ -3270,16 +3758,13 @@
           <a:cs typeface="+mn-cs"/>
         </a:defRPr>
       </a:lvl8pPr>
-      <a:lvl9pPr marL="3886200" indent="-228600" algn="l" defTabSz="914400" rtl="0" eaLnBrk="1" latinLnBrk="0" hangingPunct="1">
-        <a:lnSpc>
-          <a:spcPct val="90000"/>
-        </a:lnSpc>
+      <a:lvl9pPr marL="3886200" indent="-228600" algn="l" defTabSz="457200" rtl="0" eaLnBrk="1" latinLnBrk="0" hangingPunct="1">
         <a:spcBef>
-          <a:spcPts val="500"/>
+          <a:spcPct val="20000"/>
         </a:spcBef>
-        <a:buFont typeface="Arial" panose="020B0604020202020204" pitchFamily="34" charset="0"/>
+        <a:buFont typeface="Arial"/>
         <a:buChar char="•"/>
-        <a:defRPr sz="1800" kern="1200">
+        <a:defRPr sz="2000" kern="1200">
           <a:solidFill>
             <a:schemeClr val="tx1"/>
           </a:solidFill>
@@ -3293,7 +3778,7 @@
       <a:defPPr>
         <a:defRPr lang="en-US"/>
       </a:defPPr>
-      <a:lvl1pPr marL="0" algn="l" defTabSz="914400" rtl="0" eaLnBrk="1" latinLnBrk="0" hangingPunct="1">
+      <a:lvl1pPr marL="0" algn="l" defTabSz="457200" rtl="0" eaLnBrk="1" latinLnBrk="0" hangingPunct="1">
         <a:defRPr sz="1800" kern="1200">
           <a:solidFill>
             <a:schemeClr val="tx1"/>
@@ -3303,7 +3788,7 @@
           <a:cs typeface="+mn-cs"/>
         </a:defRPr>
       </a:lvl1pPr>
-      <a:lvl2pPr marL="457200" algn="l" defTabSz="914400" rtl="0" eaLnBrk="1" latinLnBrk="0" hangingPunct="1">
+      <a:lvl2pPr marL="457200" algn="l" defTabSz="457200" rtl="0" eaLnBrk="1" latinLnBrk="0" hangingPunct="1">
         <a:defRPr sz="1800" kern="1200">
           <a:solidFill>
             <a:schemeClr val="tx1"/>
@@ -3313,7 +3798,7 @@
           <a:cs typeface="+mn-cs"/>
         </a:defRPr>
       </a:lvl2pPr>
-      <a:lvl3pPr marL="914400" algn="l" defTabSz="914400" rtl="0" eaLnBrk="1" latinLnBrk="0" hangingPunct="1">
+      <a:lvl3pPr marL="914400" algn="l" defTabSz="457200" rtl="0" eaLnBrk="1" latinLnBrk="0" hangingPunct="1">
         <a:defRPr sz="1800" kern="1200">
           <a:solidFill>
             <a:schemeClr val="tx1"/>
@@ -3323,7 +3808,7 @@
           <a:cs typeface="+mn-cs"/>
         </a:defRPr>
       </a:lvl3pPr>
-      <a:lvl4pPr marL="1371600" algn="l" defTabSz="914400" rtl="0" eaLnBrk="1" latinLnBrk="0" hangingPunct="1">
+      <a:lvl4pPr marL="1371600" algn="l" defTabSz="457200" rtl="0" eaLnBrk="1" latinLnBrk="0" hangingPunct="1">
         <a:defRPr sz="1800" kern="1200">
           <a:solidFill>
             <a:schemeClr val="tx1"/>
@@ -3333,7 +3818,7 @@
           <a:cs typeface="+mn-cs"/>
         </a:defRPr>
       </a:lvl4pPr>
-      <a:lvl5pPr marL="1828800" algn="l" defTabSz="914400" rtl="0" eaLnBrk="1" latinLnBrk="0" hangingPunct="1">
+      <a:lvl5pPr marL="1828800" algn="l" defTabSz="457200" rtl="0" eaLnBrk="1" latinLnBrk="0" hangingPunct="1">
         <a:defRPr sz="1800" kern="1200">
           <a:solidFill>
             <a:schemeClr val="tx1"/>
@@ -3343,7 +3828,7 @@
           <a:cs typeface="+mn-cs"/>
         </a:defRPr>
       </a:lvl5pPr>
-      <a:lvl6pPr marL="2286000" algn="l" defTabSz="914400" rtl="0" eaLnBrk="1" latinLnBrk="0" hangingPunct="1">
+      <a:lvl6pPr marL="2286000" algn="l" defTabSz="457200" rtl="0" eaLnBrk="1" latinLnBrk="0" hangingPunct="1">
         <a:defRPr sz="1800" kern="1200">
           <a:solidFill>
             <a:schemeClr val="tx1"/>
@@ -3353,7 +3838,7 @@
           <a:cs typeface="+mn-cs"/>
         </a:defRPr>
       </a:lvl6pPr>
-      <a:lvl7pPr marL="2743200" algn="l" defTabSz="914400" rtl="0" eaLnBrk="1" latinLnBrk="0" hangingPunct="1">
+      <a:lvl7pPr marL="2743200" algn="l" defTabSz="457200" rtl="0" eaLnBrk="1" latinLnBrk="0" hangingPunct="1">
         <a:defRPr sz="1800" kern="1200">
           <a:solidFill>
             <a:schemeClr val="tx1"/>
@@ -3363,7 +3848,7 @@
           <a:cs typeface="+mn-cs"/>
         </a:defRPr>
       </a:lvl7pPr>
-      <a:lvl8pPr marL="3200400" algn="l" defTabSz="914400" rtl="0" eaLnBrk="1" latinLnBrk="0" hangingPunct="1">
+      <a:lvl8pPr marL="3200400" algn="l" defTabSz="457200" rtl="0" eaLnBrk="1" latinLnBrk="0" hangingPunct="1">
         <a:defRPr sz="1800" kern="1200">
           <a:solidFill>
             <a:schemeClr val="tx1"/>
@@ -3373,7 +3858,7 @@
           <a:cs typeface="+mn-cs"/>
         </a:defRPr>
       </a:lvl8pPr>
-      <a:lvl9pPr marL="3657600" algn="l" defTabSz="914400" rtl="0" eaLnBrk="1" latinLnBrk="0" hangingPunct="1">
+      <a:lvl9pPr marL="3657600" algn="l" defTabSz="457200" rtl="0" eaLnBrk="1" latinLnBrk="0" hangingPunct="1">
         <a:defRPr sz="1800" kern="1200">
           <a:solidFill>
             <a:schemeClr val="tx1"/>
@@ -3407,10 +3892,10 @@
       </p:grpSpPr>
       <p:sp>
         <p:nvSpPr>
-          <p:cNvPr id="2" name="Title 1">
+          <p:cNvPr id="24" name="Title 1">
             <a:extLst>
               <a:ext uri="{FF2B5EF4-FFF2-40B4-BE49-F238E27FC236}">
-                <a16:creationId xmlns:a16="http://schemas.microsoft.com/office/drawing/2014/main" id="{5EE2210C-D8FC-4318-A7C6-35D841DBCB2E}"/>
+                <a16:creationId xmlns:a16="http://schemas.microsoft.com/office/drawing/2014/main" id="{0D7A203E-9D86-435D-BA54-5CC93375DD30}"/>
               </a:ext>
             </a:extLst>
           </p:cNvPr>
@@ -3423,9 +3908,12 @@
         </p:nvSpPr>
         <p:spPr>
           <a:xfrm>
-            <a:off x="676102" y="2169621"/>
-            <a:ext cx="5940829" cy="1356967"/>
+            <a:off x="533400" y="2169621"/>
+            <a:ext cx="8610600" cy="1356967"/>
           </a:xfrm>
+          <a:prstGeom prst="rect">
+            <a:avLst/>
+          </a:prstGeom>
         </p:spPr>
         <p:txBody>
           <a:bodyPr/>
@@ -3475,10 +3963,10 @@
       </p:sp>
       <p:sp>
         <p:nvSpPr>
-          <p:cNvPr id="3" name="Subtitle 2">
+          <p:cNvPr id="9" name="Subtitle 2">
             <a:extLst>
               <a:ext uri="{FF2B5EF4-FFF2-40B4-BE49-F238E27FC236}">
-                <a16:creationId xmlns:a16="http://schemas.microsoft.com/office/drawing/2014/main" id="{6AEF19E3-1CA0-4568-A1B4-1669B8BDE0D0}"/>
+                <a16:creationId xmlns:a16="http://schemas.microsoft.com/office/drawing/2014/main" id="{3D17F202-16EF-4F58-9581-D0DAAE11F7A7}"/>
               </a:ext>
             </a:extLst>
           </p:cNvPr>
@@ -3491,9 +3979,12 @@
         </p:nvSpPr>
         <p:spPr>
           <a:xfrm>
-            <a:off x="676102" y="3635289"/>
-            <a:ext cx="5940829" cy="1655762"/>
+            <a:off x="533400" y="3602038"/>
+            <a:ext cx="8610600" cy="1655762"/>
           </a:xfrm>
+          <a:prstGeom prst="rect">
+            <a:avLst/>
+          </a:prstGeom>
         </p:spPr>
         <p:txBody>
           <a:bodyPr/>
@@ -3535,37 +4026,72 @@
           </a:p>
         </p:txBody>
       </p:sp>
-      <p:sp>
-        <p:nvSpPr>
-          <p:cNvPr id="4" name="Date Placeholder 3">
+      <p:sp/>
+      <p:pic>
+        <p:nvPicPr>
+          <p:cNvPr id="10" name="Picture 9">
             <a:extLst>
               <a:ext uri="{FF2B5EF4-FFF2-40B4-BE49-F238E27FC236}">
-                <a16:creationId xmlns:a16="http://schemas.microsoft.com/office/drawing/2014/main" id="{E8D417D1-5547-46FB-9130-34B5F691BB50}"/>
+                <a16:creationId xmlns:a16="http://schemas.microsoft.com/office/drawing/2014/main" id="{83E260F2-2DF3-4003-B004-AA8AE13C045B}"/>
               </a:ext>
             </a:extLst>
           </p:cNvPr>
-          <p:cNvSpPr>
-            <a:spLocks noGrp="1"/>
-          </p:cNvSpPr>
-          <p:nvPr>
-            <p:ph type="dt" sz="half" idx="10"/>
-          </p:nvPr>
-        </p:nvSpPr>
-        <p:spPr/>
-        <p:txBody>
-          <a:bodyPr/>
-          <a:lstStyle/>
-          <a:p>
-            <a:pPr lvl="0" marL="0" indent="0">
-              <a:buNone/>
-            </a:pPr>
-            <a:r>
-              <a:rPr/>
-              <a:t>2020-04-17</a:t>
-            </a:r>
-          </a:p>
-        </p:txBody>
-      </p:sp>
+          <p:cNvPicPr>
+            <a:picLocks noChangeAspect="1"/>
+          </p:cNvPicPr>
+          <p:nvPr userDrawn="1"/>
+        </p:nvPicPr>
+        <p:blipFill rotWithShape="1">
+          <a:blip r:embed="rId2">
+            <a:extLst>
+              <a:ext uri="{28A0092B-C50C-407E-A947-70E740481C1C}">
+                <a14:useLocalDpi xmlns:a14="http://schemas.microsoft.com/office/drawing/2010/main" val="0"/>
+              </a:ext>
+            </a:extLst>
+          </a:blip>
+          <a:srcRect l="8858" t="35400" r="8863" b="35672"/>
+          <a:stretch/>
+        </p:blipFill>
+        <p:spPr>
+          <a:xfrm>
+            <a:off x="501081" y="356682"/>
+            <a:ext cx="4305380" cy="1513682"/>
+          </a:xfrm>
+          <a:prstGeom prst="rect">
+            <a:avLst/>
+          </a:prstGeom>
+        </p:spPr>
+      </p:pic>
+      <p:pic>
+        <p:nvPicPr>
+          <p:cNvPr id="25" name="Picture 24">
+            <a:extLst>
+              <a:ext uri="{FF2B5EF4-FFF2-40B4-BE49-F238E27FC236}">
+                <a16:creationId xmlns:a16="http://schemas.microsoft.com/office/drawing/2014/main" id="{90E09BBF-9609-4AD5-97D1-E4C398E29482}"/>
+              </a:ext>
+            </a:extLst>
+          </p:cNvPr>
+          <p:cNvPicPr>
+            <a:picLocks noChangeAspect="1"/>
+          </p:cNvPicPr>
+          <p:nvPr userDrawn="1"/>
+        </p:nvPicPr>
+        <p:blipFill>
+          <a:blip r:embed="rId3"/>
+          <a:stretch>
+            <a:fillRect/>
+          </a:stretch>
+        </p:blipFill>
+        <p:spPr>
+          <a:xfrm>
+            <a:off x="9686924" y="6429378"/>
+            <a:ext cx="1431161" cy="365125"/>
+          </a:xfrm>
+          <a:prstGeom prst="rect">
+            <a:avLst/>
+          </a:prstGeom>
+        </p:spPr>
+      </p:pic>
     </p:spTree>
   </p:cSld>
 </p:sld>
@@ -3590,10 +4116,10 @@
       </p:grpSpPr>
       <p:sp>
         <p:nvSpPr>
-          <p:cNvPr id="2" name="Title 1">
+          <p:cNvPr id="15" name="Title 1">
             <a:extLst>
               <a:ext uri="{FF2B5EF4-FFF2-40B4-BE49-F238E27FC236}">
-                <a16:creationId xmlns:a16="http://schemas.microsoft.com/office/drawing/2014/main" id="{CBAF8A09-F820-4DA7-9E82-F639A19B66D7}"/>
+                <a16:creationId xmlns:a16="http://schemas.microsoft.com/office/drawing/2014/main" id="{FF0B0DC7-AAE0-4DD0-B6A3-68117DEBAEC5}"/>
               </a:ext>
             </a:extLst>
           </p:cNvPr>
@@ -3604,7 +4130,15 @@
             <p:ph type="title"/>
           </p:nvPr>
         </p:nvSpPr>
-        <p:spPr/>
+        <p:spPr>
+          <a:xfrm>
+            <a:off x="838200" y="365125"/>
+            <a:ext cx="10515600" cy="1325563"/>
+          </a:xfrm>
+          <a:prstGeom prst="rect">
+            <a:avLst/>
+          </a:prstGeom>
+        </p:spPr>
         <p:txBody>
           <a:bodyPr/>
           <a:lstStyle/>
@@ -4491,13 +5025,7 @@
       </p:grpSpPr>
       <p:sp>
         <p:nvSpPr>
-          <p:cNvPr id="2" name="Title 1">
-            <a:extLst>
-              <a:ext uri="{FF2B5EF4-FFF2-40B4-BE49-F238E27FC236}">
-                <a16:creationId xmlns:a16="http://schemas.microsoft.com/office/drawing/2014/main" id="{C10CD2DF-091B-4BFD-A3A5-9C7C3D49A3C8}"/>
-              </a:ext>
-            </a:extLst>
-          </p:cNvPr>
+          <p:cNvPr id="2" name="Title 1"/>
           <p:cNvSpPr>
             <a:spLocks noGrp="1"/>
           </p:cNvSpPr>
@@ -4505,7 +5033,15 @@
             <p:ph type="title"/>
           </p:nvPr>
         </p:nvSpPr>
-        <p:spPr/>
+        <p:spPr>
+          <a:xfrm>
+            <a:off x="609600" y="274638"/>
+            <a:ext cx="10972800" cy="1143000"/>
+          </a:xfrm>
+          <a:prstGeom prst="rect">
+            <a:avLst/>
+          </a:prstGeom>
+        </p:spPr>
         <p:txBody>
           <a:bodyPr/>
           <a:lstStyle/>
@@ -4536,8 +5072,8 @@
         </p:blipFill>
         <p:spPr bwMode="auto">
           <a:xfrm>
-            <a:off x="838200" y="1917700"/>
-            <a:ext cx="5181600" cy="4140200"/>
+            <a:off x="609600" y="1701800"/>
+            <a:ext cx="5384800" cy="4305300"/>
           </a:xfrm>
           <a:prstGeom prst="rect">
             <a:avLst/>
@@ -4566,8 +5102,8 @@
         </p:blipFill>
         <p:spPr bwMode="auto">
           <a:xfrm>
-            <a:off x="6172200" y="1917700"/>
-            <a:ext cx="5181600" cy="4140200"/>
+            <a:off x="6197600" y="1701800"/>
+            <a:ext cx="5384800" cy="4305300"/>
           </a:xfrm>
           <a:prstGeom prst="rect">
             <a:avLst/>
@@ -4604,13 +5140,7 @@
       </p:grpSpPr>
       <p:sp>
         <p:nvSpPr>
-          <p:cNvPr id="2" name="Title 1">
-            <a:extLst>
-              <a:ext uri="{FF2B5EF4-FFF2-40B4-BE49-F238E27FC236}">
-                <a16:creationId xmlns:a16="http://schemas.microsoft.com/office/drawing/2014/main" id="{C10CD2DF-091B-4BFD-A3A5-9C7C3D49A3C8}"/>
-              </a:ext>
-            </a:extLst>
-          </p:cNvPr>
+          <p:cNvPr id="2" name="Title 1"/>
           <p:cNvSpPr>
             <a:spLocks noGrp="1"/>
           </p:cNvSpPr>
@@ -4618,7 +5148,15 @@
             <p:ph type="title"/>
           </p:nvPr>
         </p:nvSpPr>
-        <p:spPr/>
+        <p:spPr>
+          <a:xfrm>
+            <a:off x="609600" y="274638"/>
+            <a:ext cx="10972800" cy="1143000"/>
+          </a:xfrm>
+          <a:prstGeom prst="rect">
+            <a:avLst/>
+          </a:prstGeom>
+        </p:spPr>
         <p:txBody>
           <a:bodyPr/>
           <a:lstStyle/>
@@ -4660,8 +5198,8 @@
           </p:nvPr>
         </p:nvGraphicFramePr>
         <p:xfrm>
-          <a:off x="838200" y="1816100"/>
-          <a:ext cx="5181600" cy="4343400"/>
+          <a:off x="609600" y="1600200"/>
+          <a:ext cx="5384800" cy="4521200"/>
         </p:xfrm>
         <a:graphic>
           <a:graphicData uri="http://schemas.openxmlformats.org/drawingml/2006/table">
@@ -4670,10 +5208,10 @@
                 <a:tableStyleId>{5C22544A-7EE6-4342-B048-85BDC9FD1C3A}</a:tableStyleId>
               </a:tblPr>
               <a:tblGrid>
-                <a:gridCol w="1295400"/>
-                <a:gridCol w="1295400"/>
-                <a:gridCol w="1295400"/>
-                <a:gridCol w="1295400"/>
+                <a:gridCol w="1346200"/>
+                <a:gridCol w="1346200"/>
+                <a:gridCol w="1346200"/>
+                <a:gridCol w="1346200"/>
               </a:tblGrid>
               <a:tr h="0">
                 <a:tc>
@@ -5707,8 +6245,8 @@
         </p:blipFill>
         <p:spPr bwMode="auto">
           <a:xfrm>
-            <a:off x="6172200" y="1917700"/>
-            <a:ext cx="5181600" cy="4140200"/>
+            <a:off x="6197600" y="1701800"/>
+            <a:ext cx="5384800" cy="4305300"/>
           </a:xfrm>
           <a:prstGeom prst="rect">
             <a:avLst/>
@@ -5743,7 +6281,7 @@
         <a:srgbClr val="FFFFFF"/>
       </a:lt2>
       <a:accent1>
-        <a:srgbClr val="505050"/>
+        <a:srgbClr val="33C0CD"/>
       </a:accent1>
       <a:accent2>
         <a:srgbClr val="007579"/>
@@ -5769,12 +6307,12 @@
     </a:clrScheme>
     <a:fontScheme name="Office">
       <a:majorFont>
-        <a:latin typeface="Calibri Light" panose="020F0302020204030204"/>
+        <a:latin typeface="Calibri"/>
         <a:ea typeface=""/>
         <a:cs typeface=""/>
-        <a:font script="Jpan" typeface="游ゴシック Light"/>
+        <a:font script="Jpan" typeface="ＭＳ Ｐゴシック"/>
         <a:font script="Hang" typeface="맑은 고딕"/>
-        <a:font script="Hans" typeface="等线 Light"/>
+        <a:font script="Hans" typeface="宋体"/>
         <a:font script="Hant" typeface="新細明體"/>
         <a:font script="Arab" typeface="Times New Roman"/>
         <a:font script="Hebr" typeface="Times New Roman"/>
@@ -5802,31 +6340,14 @@
         <a:font script="Viet" typeface="Times New Roman"/>
         <a:font script="Uigh" typeface="Microsoft Uighur"/>
         <a:font script="Geor" typeface="Sylfaen"/>
-        <a:font script="Armn" typeface="Arial"/>
-        <a:font script="Bugi" typeface="Leelawadee UI"/>
-        <a:font script="Bopo" typeface="Microsoft JhengHei"/>
-        <a:font script="Java" typeface="Javanese Text"/>
-        <a:font script="Lisu" typeface="Segoe UI"/>
-        <a:font script="Mymr" typeface="Myanmar Text"/>
-        <a:font script="Nkoo" typeface="Ebrima"/>
-        <a:font script="Olck" typeface="Nirmala UI"/>
-        <a:font script="Osma" typeface="Ebrima"/>
-        <a:font script="Phag" typeface="Phagspa"/>
-        <a:font script="Syrn" typeface="Estrangelo Edessa"/>
-        <a:font script="Syrj" typeface="Estrangelo Edessa"/>
-        <a:font script="Syre" typeface="Estrangelo Edessa"/>
-        <a:font script="Sora" typeface="Nirmala UI"/>
-        <a:font script="Tale" typeface="Microsoft Tai Le"/>
-        <a:font script="Talu" typeface="Microsoft New Tai Lue"/>
-        <a:font script="Tfng" typeface="Ebrima"/>
       </a:majorFont>
       <a:minorFont>
-        <a:latin typeface="Calibri" panose="020F0502020204030204"/>
+        <a:latin typeface="Calibri"/>
         <a:ea typeface=""/>
         <a:cs typeface=""/>
-        <a:font script="Jpan" typeface="游ゴシック"/>
+        <a:font script="Jpan" typeface="ＭＳ Ｐゴシック"/>
         <a:font script="Hang" typeface="맑은 고딕"/>
-        <a:font script="Hans" typeface="等线"/>
+        <a:font script="Hans" typeface="宋体"/>
         <a:font script="Hant" typeface="新細明體"/>
         <a:font script="Arab" typeface="Arial"/>
         <a:font script="Hebr" typeface="Arial"/>
@@ -5854,23 +6375,6 @@
         <a:font script="Viet" typeface="Arial"/>
         <a:font script="Uigh" typeface="Microsoft Uighur"/>
         <a:font script="Geor" typeface="Sylfaen"/>
-        <a:font script="Armn" typeface="Arial"/>
-        <a:font script="Bugi" typeface="Leelawadee UI"/>
-        <a:font script="Bopo" typeface="Microsoft JhengHei"/>
-        <a:font script="Java" typeface="Javanese Text"/>
-        <a:font script="Lisu" typeface="Segoe UI"/>
-        <a:font script="Mymr" typeface="Myanmar Text"/>
-        <a:font script="Nkoo" typeface="Ebrima"/>
-        <a:font script="Olck" typeface="Nirmala UI"/>
-        <a:font script="Osma" typeface="Ebrima"/>
-        <a:font script="Phag" typeface="Phagspa"/>
-        <a:font script="Syrn" typeface="Estrangelo Edessa"/>
-        <a:font script="Syrj" typeface="Estrangelo Edessa"/>
-        <a:font script="Syre" typeface="Estrangelo Edessa"/>
-        <a:font script="Sora" typeface="Nirmala UI"/>
-        <a:font script="Tale" typeface="Microsoft Tai Le"/>
-        <a:font script="Talu" typeface="Microsoft New Tai Lue"/>
-        <a:font script="Tfng" typeface="Ebrima"/>
       </a:minorFont>
     </a:fontScheme>
     <a:fmtScheme name="Office">
@@ -5882,140 +6386,204 @@
           <a:gsLst>
             <a:gs pos="0">
               <a:schemeClr val="phClr">
-                <a:lumMod val="110000"/>
-                <a:satMod val="105000"/>
-                <a:tint val="67000"/>
+                <a:tint val="50000"/>
+                <a:satMod val="300000"/>
               </a:schemeClr>
             </a:gs>
-            <a:gs pos="50000">
+            <a:gs pos="35000">
               <a:schemeClr val="phClr">
-                <a:lumMod val="105000"/>
-                <a:satMod val="103000"/>
-                <a:tint val="73000"/>
+                <a:tint val="37000"/>
+                <a:satMod val="300000"/>
               </a:schemeClr>
             </a:gs>
             <a:gs pos="100000">
               <a:schemeClr val="phClr">
-                <a:lumMod val="105000"/>
-                <a:satMod val="109000"/>
-                <a:tint val="81000"/>
+                <a:tint val="15000"/>
+                <a:satMod val="350000"/>
               </a:schemeClr>
             </a:gs>
           </a:gsLst>
-          <a:lin ang="5400000" scaled="0"/>
+          <a:lin ang="16200000" scaled="1"/>
         </a:gradFill>
         <a:gradFill rotWithShape="1">
           <a:gsLst>
             <a:gs pos="0">
               <a:schemeClr val="phClr">
-                <a:satMod val="103000"/>
-                <a:lumMod val="102000"/>
-                <a:tint val="94000"/>
-              </a:schemeClr>
-            </a:gs>
-            <a:gs pos="50000">
-              <a:schemeClr val="phClr">
-                <a:satMod val="110000"/>
-                <a:lumMod val="100000"/>
+                <a:tint val="100000"/>
                 <a:shade val="100000"/>
+                <a:satMod val="130000"/>
               </a:schemeClr>
             </a:gs>
             <a:gs pos="100000">
               <a:schemeClr val="phClr">
-                <a:lumMod val="99000"/>
-                <a:satMod val="120000"/>
-                <a:shade val="78000"/>
+                <a:tint val="50000"/>
+                <a:shade val="100000"/>
+                <a:satMod val="350000"/>
               </a:schemeClr>
             </a:gs>
           </a:gsLst>
-          <a:lin ang="5400000" scaled="0"/>
+          <a:lin ang="16200000" scaled="0"/>
         </a:gradFill>
       </a:fillStyleLst>
       <a:lnStyleLst>
-        <a:ln w="6350" cap="flat" cmpd="sng" algn="ctr">
+        <a:ln w="9525" cap="flat" cmpd="sng" algn="ctr">
+          <a:solidFill>
+            <a:schemeClr val="phClr">
+              <a:shade val="95000"/>
+              <a:satMod val="105000"/>
+            </a:schemeClr>
+          </a:solidFill>
+          <a:prstDash val="solid"/>
+        </a:ln>
+        <a:ln w="25400" cap="flat" cmpd="sng" algn="ctr">
           <a:solidFill>
             <a:schemeClr val="phClr"/>
           </a:solidFill>
           <a:prstDash val="solid"/>
-          <a:miter lim="800000"/>
         </a:ln>
-        <a:ln w="12700" cap="flat" cmpd="sng" algn="ctr">
+        <a:ln w="38100" cap="flat" cmpd="sng" algn="ctr">
           <a:solidFill>
             <a:schemeClr val="phClr"/>
           </a:solidFill>
           <a:prstDash val="solid"/>
-          <a:miter lim="800000"/>
-        </a:ln>
-        <a:ln w="19050" cap="flat" cmpd="sng" algn="ctr">
-          <a:solidFill>
-            <a:schemeClr val="phClr"/>
-          </a:solidFill>
-          <a:prstDash val="solid"/>
-          <a:miter lim="800000"/>
         </a:ln>
       </a:lnStyleLst>
       <a:effectStyleLst>
         <a:effectStyle>
-          <a:effectLst/>
-        </a:effectStyle>
-        <a:effectStyle>
-          <a:effectLst/>
+          <a:effectLst>
+            <a:outerShdw blurRad="40000" dist="20000" dir="5400000" rotWithShape="0">
+              <a:srgbClr val="000000">
+                <a:alpha val="38000"/>
+              </a:srgbClr>
+            </a:outerShdw>
+          </a:effectLst>
         </a:effectStyle>
         <a:effectStyle>
           <a:effectLst>
-            <a:outerShdw blurRad="57150" dist="19050" dir="5400000" algn="ctr" rotWithShape="0">
+            <a:outerShdw blurRad="40000" dist="23000" dir="5400000" rotWithShape="0">
               <a:srgbClr val="000000">
-                <a:alpha val="63000"/>
+                <a:alpha val="35000"/>
               </a:srgbClr>
             </a:outerShdw>
           </a:effectLst>
+        </a:effectStyle>
+        <a:effectStyle>
+          <a:effectLst>
+            <a:outerShdw blurRad="40000" dist="23000" dir="5400000" rotWithShape="0">
+              <a:srgbClr val="000000">
+                <a:alpha val="35000"/>
+              </a:srgbClr>
+            </a:outerShdw>
+          </a:effectLst>
+          <a:scene3d>
+            <a:camera prst="orthographicFront">
+              <a:rot lat="0" lon="0" rev="0"/>
+            </a:camera>
+            <a:lightRig rig="threePt" dir="t">
+              <a:rot lat="0" lon="0" rev="1200000"/>
+            </a:lightRig>
+          </a:scene3d>
+          <a:sp3d>
+            <a:bevelT w="63500" h="25400"/>
+          </a:sp3d>
         </a:effectStyle>
       </a:effectStyleLst>
       <a:bgFillStyleLst>
         <a:solidFill>
           <a:schemeClr val="phClr"/>
         </a:solidFill>
-        <a:solidFill>
-          <a:schemeClr val="phClr">
-            <a:tint val="95000"/>
-            <a:satMod val="170000"/>
-          </a:schemeClr>
-        </a:solidFill>
         <a:gradFill rotWithShape="1">
           <a:gsLst>
             <a:gs pos="0">
               <a:schemeClr val="phClr">
-                <a:tint val="93000"/>
-                <a:satMod val="150000"/>
-                <a:shade val="98000"/>
-                <a:lumMod val="102000"/>
+                <a:tint val="40000"/>
+                <a:satMod val="350000"/>
               </a:schemeClr>
             </a:gs>
-            <a:gs pos="50000">
+            <a:gs pos="40000">
               <a:schemeClr val="phClr">
-                <a:tint val="98000"/>
-                <a:satMod val="130000"/>
-                <a:shade val="90000"/>
-                <a:lumMod val="103000"/>
+                <a:tint val="45000"/>
+                <a:shade val="99000"/>
+                <a:satMod val="350000"/>
               </a:schemeClr>
             </a:gs>
             <a:gs pos="100000">
               <a:schemeClr val="phClr">
-                <a:shade val="63000"/>
-                <a:satMod val="120000"/>
+                <a:shade val="20000"/>
+                <a:satMod val="255000"/>
               </a:schemeClr>
             </a:gs>
           </a:gsLst>
-          <a:lin ang="5400000" scaled="0"/>
+          <a:path path="circle">
+            <a:fillToRect l="50000" t="-80000" r="50000" b="180000"/>
+          </a:path>
+        </a:gradFill>
+        <a:gradFill rotWithShape="1">
+          <a:gsLst>
+            <a:gs pos="0">
+              <a:schemeClr val="phClr">
+                <a:tint val="80000"/>
+                <a:satMod val="300000"/>
+              </a:schemeClr>
+            </a:gs>
+            <a:gs pos="100000">
+              <a:schemeClr val="phClr">
+                <a:shade val="30000"/>
+                <a:satMod val="200000"/>
+              </a:schemeClr>
+            </a:gs>
+          </a:gsLst>
+          <a:path path="circle">
+            <a:fillToRect l="50000" t="50000" r="50000" b="50000"/>
+          </a:path>
         </a:gradFill>
       </a:bgFillStyleLst>
     </a:fmtScheme>
   </a:themeElements>
-  <a:objectDefaults/>
+  <a:objectDefaults>
+    <a:spDef>
+      <a:spPr/>
+      <a:bodyPr/>
+      <a:lstStyle/>
+      <a:style>
+        <a:lnRef idx="1">
+          <a:schemeClr val="accent1"/>
+        </a:lnRef>
+        <a:fillRef idx="3">
+          <a:schemeClr val="accent1"/>
+        </a:fillRef>
+        <a:effectRef idx="2">
+          <a:schemeClr val="accent1"/>
+        </a:effectRef>
+        <a:fontRef idx="minor">
+          <a:schemeClr val="lt1"/>
+        </a:fontRef>
+      </a:style>
+    </a:spDef>
+    <a:lnDef>
+      <a:spPr/>
+      <a:bodyPr/>
+      <a:lstStyle/>
+      <a:style>
+        <a:lnRef idx="2">
+          <a:schemeClr val="accent1"/>
+        </a:lnRef>
+        <a:fillRef idx="0">
+          <a:schemeClr val="accent1"/>
+        </a:fillRef>
+        <a:effectRef idx="1">
+          <a:schemeClr val="accent1"/>
+        </a:effectRef>
+        <a:fontRef idx="minor">
+          <a:schemeClr val="tx1"/>
+        </a:fontRef>
+      </a:style>
+    </a:lnDef>
+  </a:objectDefaults>
   <a:extraClrSchemeLst/>
   <a:extLst>
     <a:ext uri="{05A4C25C-085E-4340-85A3-A5531E510DB2}">
-      <thm15:themeFamily xmlns:thm15="http://schemas.microsoft.com/office/thememl/2012/main" name="PASS_Template_2.potx" id="{5129E4C9-1705-4D1A-B6F3-58D74DD254B5}" vid="{9FA0115E-57FA-44EE-A65E-2A3F51BFBDDA}"/>
+      <thm15:themeFamily xmlns:thm15="http://schemas.microsoft.com/office/thememl/2012/main" name="PASS_Template.potx" id="{FCB32CBE-5F24-47BD-9CF1-536F8C438EAF}" vid="{310DBEBE-E7CA-447B-A05C-79688EEE0068}"/>
     </a:ext>
   </a:extLst>
 </a:theme>

</xml_diff>